<commit_message>
modify BitDemo.java for better understanding
</commit_message>
<xml_diff>
--- a/doc/Introduction Java.pptx
+++ b/doc/Introduction Java.pptx
@@ -231,7 +231,7 @@
           <a:p>
             <a:fld id="{CEF4331A-2CE4-4AB0-A7D5-8B785A83497D}" type="datetimeFigureOut">
               <a:rPr lang="zh-CN" altLang="en-US" smtClean="0"/>
-              <a:t>2019/1/18</a:t>
+              <a:t>2019/2/16</a:t>
             </a:fld>
             <a:endParaRPr lang="zh-CN" altLang="en-US"/>
           </a:p>
@@ -2186,7 +2186,7 @@
                 <a:ea typeface="+mn-ea"/>
                 <a:cs typeface="+mn-cs"/>
               </a:rPr>
-              <a:t>~ (bitwise compliment) Not operator</a:t>
+              <a:t>~ (bitwise compliment) Not operator x = ~y;</a:t>
             </a:r>
             <a:endParaRPr lang="zh-CN" altLang="en-US"/>
           </a:p>
@@ -3934,7 +3934,7 @@
           <a:noFill/>
           <a:extLst>
             <a:ext uri="{909E8E84-426E-40dd-AFC4-6F175D3DCCD1}">
-              <a14:hiddenFill xmlns:a14="http://schemas.microsoft.com/office/drawing/2010/main" xmlns="">
+              <a14:hiddenFill xmlns="" xmlns:a14="http://schemas.microsoft.com/office/drawing/2010/main">
                 <a:solidFill>
                   <a:srgbClr val="FFFFFF"/>
                 </a:solidFill>
@@ -3994,7 +3994,7 @@
             </a:ln>
             <a:extLst>
               <a:ext uri="{91240B29-F687-4f45-9708-019B960494DF}">
-                <a14:hiddenLine xmlns:a14="http://schemas.microsoft.com/office/drawing/2010/main" xmlns="" w="9525">
+                <a14:hiddenLine xmlns="" xmlns:a14="http://schemas.microsoft.com/office/drawing/2010/main" w="9525">
                   <a:solidFill>
                     <a:srgbClr val="000000"/>
                   </a:solidFill>
@@ -4084,7 +4084,7 @@
             </a:ln>
             <a:extLst>
               <a:ext uri="{91240B29-F687-4f45-9708-019B960494DF}">
-                <a14:hiddenLine xmlns:a14="http://schemas.microsoft.com/office/drawing/2010/main" xmlns="" w="9525">
+                <a14:hiddenLine xmlns="" xmlns:a14="http://schemas.microsoft.com/office/drawing/2010/main" w="9525">
                   <a:solidFill>
                     <a:srgbClr val="000000"/>
                   </a:solidFill>
@@ -4174,7 +4174,7 @@
             </a:ln>
             <a:extLst>
               <a:ext uri="{91240B29-F687-4f45-9708-019B960494DF}">
-                <a14:hiddenLine xmlns:a14="http://schemas.microsoft.com/office/drawing/2010/main" xmlns="" w="9525">
+                <a14:hiddenLine xmlns="" xmlns:a14="http://schemas.microsoft.com/office/drawing/2010/main" w="9525">
                   <a:solidFill>
                     <a:srgbClr val="000000"/>
                   </a:solidFill>
@@ -4208,7 +4208,7 @@
             </a:ln>
             <a:extLst>
               <a:ext uri="{91240B29-F687-4f45-9708-019B960494DF}">
-                <a14:hiddenLine xmlns:a14="http://schemas.microsoft.com/office/drawing/2010/main" xmlns="" w="9525">
+                <a14:hiddenLine xmlns="" xmlns:a14="http://schemas.microsoft.com/office/drawing/2010/main" w="9525">
                   <a:solidFill>
                     <a:srgbClr val="000000"/>
                   </a:solidFill>
@@ -4298,7 +4298,7 @@
             </a:ln>
             <a:extLst>
               <a:ext uri="{91240B29-F687-4f45-9708-019B960494DF}">
-                <a14:hiddenLine xmlns:a14="http://schemas.microsoft.com/office/drawing/2010/main" xmlns="" w="9525">
+                <a14:hiddenLine xmlns="" xmlns:a14="http://schemas.microsoft.com/office/drawing/2010/main" w="9525">
                   <a:solidFill>
                     <a:srgbClr val="000000"/>
                   </a:solidFill>
@@ -4360,7 +4360,7 @@
             </a:ln>
             <a:extLst>
               <a:ext uri="{91240B29-F687-4f45-9708-019B960494DF}">
-                <a14:hiddenLine xmlns:a14="http://schemas.microsoft.com/office/drawing/2010/main" xmlns="" w="9525">
+                <a14:hiddenLine xmlns="" xmlns:a14="http://schemas.microsoft.com/office/drawing/2010/main" w="9525">
                   <a:solidFill>
                     <a:srgbClr val="000000"/>
                   </a:solidFill>
@@ -4422,7 +4422,7 @@
             </a:ln>
             <a:extLst>
               <a:ext uri="{91240B29-F687-4f45-9708-019B960494DF}">
-                <a14:hiddenLine xmlns:a14="http://schemas.microsoft.com/office/drawing/2010/main" xmlns="" w="9525">
+                <a14:hiddenLine xmlns="" xmlns:a14="http://schemas.microsoft.com/office/drawing/2010/main" w="9525">
                   <a:solidFill>
                     <a:srgbClr val="000000"/>
                   </a:solidFill>
@@ -4512,7 +4512,7 @@
             </a:ln>
             <a:extLst>
               <a:ext uri="{91240B29-F687-4f45-9708-019B960494DF}">
-                <a14:hiddenLine xmlns:a14="http://schemas.microsoft.com/office/drawing/2010/main" xmlns="" w="9525">
+                <a14:hiddenLine xmlns="" xmlns:a14="http://schemas.microsoft.com/office/drawing/2010/main" w="9525">
                   <a:solidFill>
                     <a:srgbClr val="000000"/>
                   </a:solidFill>
@@ -4574,7 +4574,7 @@
             </a:ln>
             <a:extLst>
               <a:ext uri="{91240B29-F687-4f45-9708-019B960494DF}">
-                <a14:hiddenLine xmlns:a14="http://schemas.microsoft.com/office/drawing/2010/main" xmlns="" w="9525">
+                <a14:hiddenLine xmlns="" xmlns:a14="http://schemas.microsoft.com/office/drawing/2010/main" w="9525">
                   <a:solidFill>
                     <a:srgbClr val="000000"/>
                   </a:solidFill>
@@ -4636,7 +4636,7 @@
             </a:ln>
             <a:extLst>
               <a:ext uri="{91240B29-F687-4f45-9708-019B960494DF}">
-                <a14:hiddenLine xmlns:a14="http://schemas.microsoft.com/office/drawing/2010/main" xmlns="" w="9525">
+                <a14:hiddenLine xmlns="" xmlns:a14="http://schemas.microsoft.com/office/drawing/2010/main" w="9525">
                   <a:solidFill>
                     <a:srgbClr val="000000"/>
                   </a:solidFill>
@@ -4726,7 +4726,7 @@
             </a:ln>
             <a:extLst>
               <a:ext uri="{91240B29-F687-4f45-9708-019B960494DF}">
-                <a14:hiddenLine xmlns:a14="http://schemas.microsoft.com/office/drawing/2010/main" xmlns="" w="9525">
+                <a14:hiddenLine xmlns="" xmlns:a14="http://schemas.microsoft.com/office/drawing/2010/main" w="9525">
                   <a:solidFill>
                     <a:srgbClr val="000000"/>
                   </a:solidFill>
@@ -4816,7 +4816,7 @@
             </a:ln>
             <a:extLst>
               <a:ext uri="{91240B29-F687-4f45-9708-019B960494DF}">
-                <a14:hiddenLine xmlns:a14="http://schemas.microsoft.com/office/drawing/2010/main" xmlns="" w="9525">
+                <a14:hiddenLine xmlns="" xmlns:a14="http://schemas.microsoft.com/office/drawing/2010/main" w="9525">
                   <a:solidFill>
                     <a:srgbClr val="000000"/>
                   </a:solidFill>
@@ -4878,7 +4878,7 @@
             </a:ln>
             <a:extLst>
               <a:ext uri="{91240B29-F687-4f45-9708-019B960494DF}">
-                <a14:hiddenLine xmlns:a14="http://schemas.microsoft.com/office/drawing/2010/main" xmlns="" w="9525">
+                <a14:hiddenLine xmlns="" xmlns:a14="http://schemas.microsoft.com/office/drawing/2010/main" w="9525">
                   <a:solidFill>
                     <a:srgbClr val="000000"/>
                   </a:solidFill>
@@ -4988,7 +4988,7 @@
             </a:ln>
             <a:extLst>
               <a:ext uri="{91240B29-F687-4f45-9708-019B960494DF}">
-                <a14:hiddenLine xmlns:a14="http://schemas.microsoft.com/office/drawing/2010/main" xmlns="" w="9525">
+                <a14:hiddenLine xmlns="" xmlns:a14="http://schemas.microsoft.com/office/drawing/2010/main" w="9525">
                   <a:solidFill>
                     <a:srgbClr val="000000"/>
                   </a:solidFill>
@@ -5050,7 +5050,7 @@
             </a:ln>
             <a:extLst>
               <a:ext uri="{91240B29-F687-4f45-9708-019B960494DF}">
-                <a14:hiddenLine xmlns:a14="http://schemas.microsoft.com/office/drawing/2010/main" xmlns="" w="9525">
+                <a14:hiddenLine xmlns="" xmlns:a14="http://schemas.microsoft.com/office/drawing/2010/main" w="9525">
                   <a:solidFill>
                     <a:srgbClr val="000000"/>
                   </a:solidFill>
@@ -5140,7 +5140,7 @@
             </a:ln>
             <a:extLst>
               <a:ext uri="{91240B29-F687-4f45-9708-019B960494DF}">
-                <a14:hiddenLine xmlns:a14="http://schemas.microsoft.com/office/drawing/2010/main" xmlns="" w="9525">
+                <a14:hiddenLine xmlns="" xmlns:a14="http://schemas.microsoft.com/office/drawing/2010/main" w="9525">
                   <a:solidFill>
                     <a:srgbClr val="000000"/>
                   </a:solidFill>
@@ -5230,7 +5230,7 @@
             </a:ln>
             <a:extLst>
               <a:ext uri="{91240B29-F687-4f45-9708-019B960494DF}">
-                <a14:hiddenLine xmlns:a14="http://schemas.microsoft.com/office/drawing/2010/main" xmlns="" w="9525">
+                <a14:hiddenLine xmlns="" xmlns:a14="http://schemas.microsoft.com/office/drawing/2010/main" w="9525">
                   <a:solidFill>
                     <a:srgbClr val="000000"/>
                   </a:solidFill>
@@ -5292,7 +5292,7 @@
             </a:ln>
             <a:extLst>
               <a:ext uri="{91240B29-F687-4f45-9708-019B960494DF}">
-                <a14:hiddenLine xmlns:a14="http://schemas.microsoft.com/office/drawing/2010/main" xmlns="" w="9525">
+                <a14:hiddenLine xmlns="" xmlns:a14="http://schemas.microsoft.com/office/drawing/2010/main" w="9525">
                   <a:solidFill>
                     <a:srgbClr val="000000"/>
                   </a:solidFill>
@@ -5382,7 +5382,7 @@
             </a:ln>
             <a:extLst>
               <a:ext uri="{91240B29-F687-4f45-9708-019B960494DF}">
-                <a14:hiddenLine xmlns:a14="http://schemas.microsoft.com/office/drawing/2010/main" xmlns="" w="9525">
+                <a14:hiddenLine xmlns="" xmlns:a14="http://schemas.microsoft.com/office/drawing/2010/main" w="9525">
                   <a:solidFill>
                     <a:srgbClr val="000000"/>
                   </a:solidFill>
@@ -5472,7 +5472,7 @@
             </a:ln>
             <a:extLst>
               <a:ext uri="{91240B29-F687-4f45-9708-019B960494DF}">
-                <a14:hiddenLine xmlns:a14="http://schemas.microsoft.com/office/drawing/2010/main" xmlns="" w="9525">
+                <a14:hiddenLine xmlns="" xmlns:a14="http://schemas.microsoft.com/office/drawing/2010/main" w="9525">
                   <a:solidFill>
                     <a:srgbClr val="000000"/>
                   </a:solidFill>
@@ -5528,7 +5528,7 @@
             </a:ln>
             <a:extLst>
               <a:ext uri="{91240B29-F687-4f45-9708-019B960494DF}">
-                <a14:hiddenLine xmlns:a14="http://schemas.microsoft.com/office/drawing/2010/main" xmlns="" w="9525">
+                <a14:hiddenLine xmlns="" xmlns:a14="http://schemas.microsoft.com/office/drawing/2010/main" w="9525">
                   <a:solidFill>
                     <a:srgbClr val="000000"/>
                   </a:solidFill>
@@ -5618,7 +5618,7 @@
             </a:ln>
             <a:extLst>
               <a:ext uri="{91240B29-F687-4f45-9708-019B960494DF}">
-                <a14:hiddenLine xmlns:a14="http://schemas.microsoft.com/office/drawing/2010/main" xmlns="" w="9525">
+                <a14:hiddenLine xmlns="" xmlns:a14="http://schemas.microsoft.com/office/drawing/2010/main" w="9525">
                   <a:solidFill>
                     <a:srgbClr val="000000"/>
                   </a:solidFill>
@@ -5674,7 +5674,7 @@
             </a:ln>
             <a:extLst>
               <a:ext uri="{91240B29-F687-4f45-9708-019B960494DF}">
-                <a14:hiddenLine xmlns:a14="http://schemas.microsoft.com/office/drawing/2010/main" xmlns="" w="9525">
+                <a14:hiddenLine xmlns="" xmlns:a14="http://schemas.microsoft.com/office/drawing/2010/main" w="9525">
                   <a:solidFill>
                     <a:srgbClr val="000000"/>
                   </a:solidFill>
@@ -5764,7 +5764,7 @@
             </a:ln>
             <a:extLst>
               <a:ext uri="{91240B29-F687-4f45-9708-019B960494DF}">
-                <a14:hiddenLine xmlns:a14="http://schemas.microsoft.com/office/drawing/2010/main" xmlns="" w="9525">
+                <a14:hiddenLine xmlns="" xmlns:a14="http://schemas.microsoft.com/office/drawing/2010/main" w="9525">
                   <a:solidFill>
                     <a:srgbClr val="000000"/>
                   </a:solidFill>
@@ -5832,7 +5832,7 @@
             </a:ln>
             <a:extLst>
               <a:ext uri="{91240B29-F687-4f45-9708-019B960494DF}">
-                <a14:hiddenLine xmlns:a14="http://schemas.microsoft.com/office/drawing/2010/main" xmlns="" w="9525">
+                <a14:hiddenLine xmlns="" xmlns:a14="http://schemas.microsoft.com/office/drawing/2010/main" w="9525">
                   <a:solidFill>
                     <a:srgbClr val="000000"/>
                   </a:solidFill>
@@ -5922,7 +5922,7 @@
             </a:ln>
             <a:extLst>
               <a:ext uri="{91240B29-F687-4f45-9708-019B960494DF}">
-                <a14:hiddenLine xmlns:a14="http://schemas.microsoft.com/office/drawing/2010/main" xmlns="" w="9525">
+                <a14:hiddenLine xmlns="" xmlns:a14="http://schemas.microsoft.com/office/drawing/2010/main" w="9525">
                   <a:solidFill>
                     <a:srgbClr val="000000"/>
                   </a:solidFill>
@@ -5990,7 +5990,7 @@
             </a:ln>
             <a:extLst>
               <a:ext uri="{91240B29-F687-4f45-9708-019B960494DF}">
-                <a14:hiddenLine xmlns:a14="http://schemas.microsoft.com/office/drawing/2010/main" xmlns="" w="9525">
+                <a14:hiddenLine xmlns="" xmlns:a14="http://schemas.microsoft.com/office/drawing/2010/main" w="9525">
                   <a:solidFill>
                     <a:srgbClr val="000000"/>
                   </a:solidFill>
@@ -6080,7 +6080,7 @@
             </a:ln>
             <a:extLst>
               <a:ext uri="{91240B29-F687-4f45-9708-019B960494DF}">
-                <a14:hiddenLine xmlns:a14="http://schemas.microsoft.com/office/drawing/2010/main" xmlns="" w="9525">
+                <a14:hiddenLine xmlns="" xmlns:a14="http://schemas.microsoft.com/office/drawing/2010/main" w="9525">
                   <a:solidFill>
                     <a:srgbClr val="000000"/>
                   </a:solidFill>
@@ -6114,7 +6114,7 @@
             </a:ln>
             <a:extLst>
               <a:ext uri="{91240B29-F687-4f45-9708-019B960494DF}">
-                <a14:hiddenLine xmlns:a14="http://schemas.microsoft.com/office/drawing/2010/main" xmlns="" w="9525">
+                <a14:hiddenLine xmlns="" xmlns:a14="http://schemas.microsoft.com/office/drawing/2010/main" w="9525">
                   <a:solidFill>
                     <a:srgbClr val="000000"/>
                   </a:solidFill>
@@ -6204,7 +6204,7 @@
             </a:ln>
             <a:extLst>
               <a:ext uri="{91240B29-F687-4f45-9708-019B960494DF}">
-                <a14:hiddenLine xmlns:a14="http://schemas.microsoft.com/office/drawing/2010/main" xmlns="" w="9525">
+                <a14:hiddenLine xmlns="" xmlns:a14="http://schemas.microsoft.com/office/drawing/2010/main" w="9525">
                   <a:solidFill>
                     <a:srgbClr val="000000"/>
                   </a:solidFill>
@@ -6266,7 +6266,7 @@
             </a:ln>
             <a:extLst>
               <a:ext uri="{91240B29-F687-4f45-9708-019B960494DF}">
-                <a14:hiddenLine xmlns:a14="http://schemas.microsoft.com/office/drawing/2010/main" xmlns="" w="9525">
+                <a14:hiddenLine xmlns="" xmlns:a14="http://schemas.microsoft.com/office/drawing/2010/main" w="9525">
                   <a:solidFill>
                     <a:srgbClr val="000000"/>
                   </a:solidFill>
@@ -6328,7 +6328,7 @@
             </a:ln>
             <a:extLst>
               <a:ext uri="{91240B29-F687-4f45-9708-019B960494DF}">
-                <a14:hiddenLine xmlns:a14="http://schemas.microsoft.com/office/drawing/2010/main" xmlns="" w="9525">
+                <a14:hiddenLine xmlns="" xmlns:a14="http://schemas.microsoft.com/office/drawing/2010/main" w="9525">
                   <a:solidFill>
                     <a:srgbClr val="000000"/>
                   </a:solidFill>
@@ -6418,7 +6418,7 @@
             </a:ln>
             <a:extLst>
               <a:ext uri="{91240B29-F687-4f45-9708-019B960494DF}">
-                <a14:hiddenLine xmlns:a14="http://schemas.microsoft.com/office/drawing/2010/main" xmlns="" w="9525">
+                <a14:hiddenLine xmlns="" xmlns:a14="http://schemas.microsoft.com/office/drawing/2010/main" w="9525">
                   <a:solidFill>
                     <a:srgbClr val="000000"/>
                   </a:solidFill>
@@ -6486,7 +6486,7 @@
             </a:ln>
             <a:extLst>
               <a:ext uri="{91240B29-F687-4f45-9708-019B960494DF}">
-                <a14:hiddenLine xmlns:a14="http://schemas.microsoft.com/office/drawing/2010/main" xmlns="" w="9525">
+                <a14:hiddenLine xmlns="" xmlns:a14="http://schemas.microsoft.com/office/drawing/2010/main" w="9525">
                   <a:solidFill>
                     <a:srgbClr val="000000"/>
                   </a:solidFill>
@@ -6548,7 +6548,7 @@
             </a:ln>
             <a:extLst>
               <a:ext uri="{91240B29-F687-4f45-9708-019B960494DF}">
-                <a14:hiddenLine xmlns:a14="http://schemas.microsoft.com/office/drawing/2010/main" xmlns="" w="9525">
+                <a14:hiddenLine xmlns="" xmlns:a14="http://schemas.microsoft.com/office/drawing/2010/main" w="9525">
                   <a:solidFill>
                     <a:srgbClr val="000000"/>
                   </a:solidFill>
@@ -6638,7 +6638,7 @@
             </a:ln>
             <a:extLst>
               <a:ext uri="{91240B29-F687-4f45-9708-019B960494DF}">
-                <a14:hiddenLine xmlns:a14="http://schemas.microsoft.com/office/drawing/2010/main" xmlns="" w="9525">
+                <a14:hiddenLine xmlns="" xmlns:a14="http://schemas.microsoft.com/office/drawing/2010/main" w="9525">
                   <a:solidFill>
                     <a:srgbClr val="000000"/>
                   </a:solidFill>
@@ -6700,7 +6700,7 @@
             </a:ln>
             <a:extLst>
               <a:ext uri="{91240B29-F687-4f45-9708-019B960494DF}">
-                <a14:hiddenLine xmlns:a14="http://schemas.microsoft.com/office/drawing/2010/main" xmlns="" w="9525">
+                <a14:hiddenLine xmlns="" xmlns:a14="http://schemas.microsoft.com/office/drawing/2010/main" w="9525">
                   <a:solidFill>
                     <a:srgbClr val="000000"/>
                   </a:solidFill>
@@ -6790,7 +6790,7 @@
             </a:ln>
             <a:extLst>
               <a:ext uri="{91240B29-F687-4f45-9708-019B960494DF}">
-                <a14:hiddenLine xmlns:a14="http://schemas.microsoft.com/office/drawing/2010/main" xmlns="" w="9525">
+                <a14:hiddenLine xmlns="" xmlns:a14="http://schemas.microsoft.com/office/drawing/2010/main" w="9525">
                   <a:solidFill>
                     <a:srgbClr val="000000"/>
                   </a:solidFill>
@@ -6852,7 +6852,7 @@
             </a:ln>
             <a:extLst>
               <a:ext uri="{91240B29-F687-4f45-9708-019B960494DF}">
-                <a14:hiddenLine xmlns:a14="http://schemas.microsoft.com/office/drawing/2010/main" xmlns="" w="9525">
+                <a14:hiddenLine xmlns="" xmlns:a14="http://schemas.microsoft.com/office/drawing/2010/main" w="9525">
                   <a:solidFill>
                     <a:srgbClr val="000000"/>
                   </a:solidFill>
@@ -6942,7 +6942,7 @@
             </a:ln>
             <a:extLst>
               <a:ext uri="{91240B29-F687-4f45-9708-019B960494DF}">
-                <a14:hiddenLine xmlns:a14="http://schemas.microsoft.com/office/drawing/2010/main" xmlns="" w="9525">
+                <a14:hiddenLine xmlns="" xmlns:a14="http://schemas.microsoft.com/office/drawing/2010/main" w="9525">
                   <a:solidFill>
                     <a:srgbClr val="000000"/>
                   </a:solidFill>
@@ -6976,7 +6976,7 @@
             </a:ln>
             <a:extLst>
               <a:ext uri="{91240B29-F687-4f45-9708-019B960494DF}">
-                <a14:hiddenLine xmlns:a14="http://schemas.microsoft.com/office/drawing/2010/main" xmlns="" w="9525">
+                <a14:hiddenLine xmlns="" xmlns:a14="http://schemas.microsoft.com/office/drawing/2010/main" w="9525">
                   <a:solidFill>
                     <a:srgbClr val="000000"/>
                   </a:solidFill>
@@ -7041,7 +7041,7 @@
             </a:ln>
             <a:extLst>
               <a:ext uri="{91240B29-F687-4f45-9708-019B960494DF}">
-                <a14:hiddenLine xmlns:a14="http://schemas.microsoft.com/office/drawing/2010/main" xmlns="" w="9525">
+                <a14:hiddenLine xmlns="" xmlns:a14="http://schemas.microsoft.com/office/drawing/2010/main" w="9525">
                   <a:solidFill>
                     <a:srgbClr val="000000"/>
                   </a:solidFill>
@@ -7131,7 +7131,7 @@
             </a:ln>
             <a:extLst>
               <a:ext uri="{91240B29-F687-4f45-9708-019B960494DF}">
-                <a14:hiddenLine xmlns:a14="http://schemas.microsoft.com/office/drawing/2010/main" xmlns="" w="9525">
+                <a14:hiddenLine xmlns="" xmlns:a14="http://schemas.microsoft.com/office/drawing/2010/main" w="9525">
                   <a:solidFill>
                     <a:srgbClr val="000000"/>
                   </a:solidFill>
@@ -7193,7 +7193,7 @@
             </a:ln>
             <a:extLst>
               <a:ext uri="{91240B29-F687-4f45-9708-019B960494DF}">
-                <a14:hiddenLine xmlns:a14="http://schemas.microsoft.com/office/drawing/2010/main" xmlns="" w="9525">
+                <a14:hiddenLine xmlns="" xmlns:a14="http://schemas.microsoft.com/office/drawing/2010/main" w="9525">
                   <a:solidFill>
                     <a:srgbClr val="000000"/>
                   </a:solidFill>
@@ -7283,7 +7283,7 @@
             </a:ln>
             <a:extLst>
               <a:ext uri="{91240B29-F687-4f45-9708-019B960494DF}">
-                <a14:hiddenLine xmlns:a14="http://schemas.microsoft.com/office/drawing/2010/main" xmlns="" w="9525">
+                <a14:hiddenLine xmlns="" xmlns:a14="http://schemas.microsoft.com/office/drawing/2010/main" w="9525">
                   <a:solidFill>
                     <a:srgbClr val="000000"/>
                   </a:solidFill>
@@ -7373,7 +7373,7 @@
             </a:ln>
             <a:extLst>
               <a:ext uri="{91240B29-F687-4f45-9708-019B960494DF}">
-                <a14:hiddenLine xmlns:a14="http://schemas.microsoft.com/office/drawing/2010/main" xmlns="" w="9525">
+                <a14:hiddenLine xmlns="" xmlns:a14="http://schemas.microsoft.com/office/drawing/2010/main" w="9525">
                   <a:solidFill>
                     <a:srgbClr val="000000"/>
                   </a:solidFill>
@@ -7438,7 +7438,7 @@
             </a:ln>
             <a:extLst>
               <a:ext uri="{91240B29-F687-4f45-9708-019B960494DF}">
-                <a14:hiddenLine xmlns:a14="http://schemas.microsoft.com/office/drawing/2010/main" xmlns="" w="9525">
+                <a14:hiddenLine xmlns="" xmlns:a14="http://schemas.microsoft.com/office/drawing/2010/main" w="9525">
                   <a:solidFill>
                     <a:srgbClr val="000000"/>
                   </a:solidFill>
@@ -7500,7 +7500,7 @@
             </a:ln>
             <a:extLst>
               <a:ext uri="{91240B29-F687-4f45-9708-019B960494DF}">
-                <a14:hiddenLine xmlns:a14="http://schemas.microsoft.com/office/drawing/2010/main" xmlns="" w="9525">
+                <a14:hiddenLine xmlns="" xmlns:a14="http://schemas.microsoft.com/office/drawing/2010/main" w="9525">
                   <a:solidFill>
                     <a:srgbClr val="000000"/>
                   </a:solidFill>
@@ -7590,7 +7590,7 @@
             </a:ln>
             <a:extLst>
               <a:ext uri="{91240B29-F687-4f45-9708-019B960494DF}">
-                <a14:hiddenLine xmlns:a14="http://schemas.microsoft.com/office/drawing/2010/main" xmlns="" w="9525">
+                <a14:hiddenLine xmlns="" xmlns:a14="http://schemas.microsoft.com/office/drawing/2010/main" w="9525">
                   <a:solidFill>
                     <a:srgbClr val="000000"/>
                   </a:solidFill>
@@ -7680,7 +7680,7 @@
             </a:ln>
             <a:extLst>
               <a:ext uri="{91240B29-F687-4f45-9708-019B960494DF}">
-                <a14:hiddenLine xmlns:a14="http://schemas.microsoft.com/office/drawing/2010/main" xmlns="" w="9525">
+                <a14:hiddenLine xmlns="" xmlns:a14="http://schemas.microsoft.com/office/drawing/2010/main" w="9525">
                   <a:solidFill>
                     <a:srgbClr val="000000"/>
                   </a:solidFill>
@@ -7742,7 +7742,7 @@
             </a:ln>
             <a:extLst>
               <a:ext uri="{91240B29-F687-4f45-9708-019B960494DF}">
-                <a14:hiddenLine xmlns:a14="http://schemas.microsoft.com/office/drawing/2010/main" xmlns="" w="9525">
+                <a14:hiddenLine xmlns="" xmlns:a14="http://schemas.microsoft.com/office/drawing/2010/main" w="9525">
                   <a:solidFill>
                     <a:srgbClr val="000000"/>
                   </a:solidFill>
@@ -7862,7 +7862,7 @@
             </a:ln>
             <a:extLst>
               <a:ext uri="{91240B29-F687-4f45-9708-019B960494DF}">
-                <a14:hiddenLine xmlns:a14="http://schemas.microsoft.com/office/drawing/2010/main" xmlns="" w="9525">
+                <a14:hiddenLine xmlns="" xmlns:a14="http://schemas.microsoft.com/office/drawing/2010/main" w="9525">
                   <a:solidFill>
                     <a:srgbClr val="000000"/>
                   </a:solidFill>
@@ -7930,7 +7930,7 @@
             </a:ln>
             <a:extLst>
               <a:ext uri="{91240B29-F687-4f45-9708-019B960494DF}">
-                <a14:hiddenLine xmlns:a14="http://schemas.microsoft.com/office/drawing/2010/main" xmlns="" w="9525">
+                <a14:hiddenLine xmlns="" xmlns:a14="http://schemas.microsoft.com/office/drawing/2010/main" w="9525">
                   <a:solidFill>
                     <a:srgbClr val="000000"/>
                   </a:solidFill>
@@ -8020,7 +8020,7 @@
             </a:ln>
             <a:extLst>
               <a:ext uri="{91240B29-F687-4f45-9708-019B960494DF}">
-                <a14:hiddenLine xmlns:a14="http://schemas.microsoft.com/office/drawing/2010/main" xmlns="" w="9525">
+                <a14:hiddenLine xmlns="" xmlns:a14="http://schemas.microsoft.com/office/drawing/2010/main" w="9525">
                   <a:solidFill>
                     <a:srgbClr val="000000"/>
                   </a:solidFill>
@@ -8160,7 +8160,7 @@
           <a:p>
             <a:fld id="{D840643F-1791-474B-B0E8-F4C29BE3B528}" type="datetimeFigureOut">
               <a:rPr lang="zh-CN" altLang="en-US" smtClean="0"/>
-              <a:t>2019/1/18</a:t>
+              <a:t>2019/2/16</a:t>
             </a:fld>
             <a:endParaRPr lang="zh-CN" altLang="en-US"/>
           </a:p>
@@ -8427,7 +8427,7 @@
           <a:p>
             <a:fld id="{D840643F-1791-474B-B0E8-F4C29BE3B528}" type="datetimeFigureOut">
               <a:rPr lang="zh-CN" altLang="en-US" smtClean="0"/>
-              <a:t>2019/1/18</a:t>
+              <a:t>2019/2/16</a:t>
             </a:fld>
             <a:endParaRPr lang="zh-CN" altLang="en-US"/>
           </a:p>
@@ -8623,7 +8623,7 @@
           <a:p>
             <a:fld id="{D840643F-1791-474B-B0E8-F4C29BE3B528}" type="datetimeFigureOut">
               <a:rPr lang="zh-CN" altLang="en-US" smtClean="0"/>
-              <a:t>2019/1/18</a:t>
+              <a:t>2019/2/16</a:t>
             </a:fld>
             <a:endParaRPr lang="zh-CN" altLang="en-US"/>
           </a:p>
@@ -8886,7 +8886,7 @@
           <a:p>
             <a:fld id="{D840643F-1791-474B-B0E8-F4C29BE3B528}" type="datetimeFigureOut">
               <a:rPr lang="zh-CN" altLang="en-US" smtClean="0"/>
-              <a:t>2019/1/18</a:t>
+              <a:t>2019/2/16</a:t>
             </a:fld>
             <a:endParaRPr lang="zh-CN" altLang="en-US"/>
           </a:p>
@@ -9320,7 +9320,7 @@
           <a:p>
             <a:fld id="{D840643F-1791-474B-B0E8-F4C29BE3B528}" type="datetimeFigureOut">
               <a:rPr lang="zh-CN" altLang="en-US" smtClean="0"/>
-              <a:t>2019/1/18</a:t>
+              <a:t>2019/2/16</a:t>
             </a:fld>
             <a:endParaRPr lang="zh-CN" altLang="en-US"/>
           </a:p>
@@ -9866,7 +9866,7 @@
           <a:p>
             <a:fld id="{D840643F-1791-474B-B0E8-F4C29BE3B528}" type="datetimeFigureOut">
               <a:rPr lang="zh-CN" altLang="en-US" smtClean="0"/>
-              <a:t>2019/1/18</a:t>
+              <a:t>2019/2/16</a:t>
             </a:fld>
             <a:endParaRPr lang="zh-CN" altLang="en-US"/>
           </a:p>
@@ -10586,7 +10586,7 @@
           <a:p>
             <a:fld id="{D840643F-1791-474B-B0E8-F4C29BE3B528}" type="datetimeFigureOut">
               <a:rPr lang="zh-CN" altLang="en-US" smtClean="0"/>
-              <a:t>2019/1/18</a:t>
+              <a:t>2019/2/16</a:t>
             </a:fld>
             <a:endParaRPr lang="zh-CN" altLang="en-US"/>
           </a:p>
@@ -10756,7 +10756,7 @@
           <a:p>
             <a:fld id="{D840643F-1791-474B-B0E8-F4C29BE3B528}" type="datetimeFigureOut">
               <a:rPr lang="zh-CN" altLang="en-US" smtClean="0"/>
-              <a:t>2019/1/18</a:t>
+              <a:t>2019/2/16</a:t>
             </a:fld>
             <a:endParaRPr lang="zh-CN" altLang="en-US"/>
           </a:p>
@@ -10936,7 +10936,7 @@
           <a:p>
             <a:fld id="{D840643F-1791-474B-B0E8-F4C29BE3B528}" type="datetimeFigureOut">
               <a:rPr lang="zh-CN" altLang="en-US" smtClean="0"/>
-              <a:t>2019/1/18</a:t>
+              <a:t>2019/2/16</a:t>
             </a:fld>
             <a:endParaRPr lang="zh-CN" altLang="en-US"/>
           </a:p>
@@ -11106,7 +11106,7 @@
           <a:p>
             <a:fld id="{D840643F-1791-474B-B0E8-F4C29BE3B528}" type="datetimeFigureOut">
               <a:rPr lang="zh-CN" altLang="en-US" smtClean="0"/>
-              <a:t>2019/1/18</a:t>
+              <a:t>2019/2/16</a:t>
             </a:fld>
             <a:endParaRPr lang="zh-CN" altLang="en-US"/>
           </a:p>
@@ -11356,7 +11356,7 @@
           <a:p>
             <a:fld id="{D840643F-1791-474B-B0E8-F4C29BE3B528}" type="datetimeFigureOut">
               <a:rPr lang="zh-CN" altLang="en-US" smtClean="0"/>
-              <a:t>2019/1/18</a:t>
+              <a:t>2019/2/16</a:t>
             </a:fld>
             <a:endParaRPr lang="zh-CN" altLang="en-US"/>
           </a:p>
@@ -11588,7 +11588,7 @@
           <a:p>
             <a:fld id="{D840643F-1791-474B-B0E8-F4C29BE3B528}" type="datetimeFigureOut">
               <a:rPr lang="zh-CN" altLang="en-US" smtClean="0"/>
-              <a:t>2019/1/18</a:t>
+              <a:t>2019/2/16</a:t>
             </a:fld>
             <a:endParaRPr lang="zh-CN" altLang="en-US"/>
           </a:p>
@@ -11969,7 +11969,7 @@
           <a:p>
             <a:fld id="{D840643F-1791-474B-B0E8-F4C29BE3B528}" type="datetimeFigureOut">
               <a:rPr lang="zh-CN" altLang="en-US" smtClean="0"/>
-              <a:t>2019/1/18</a:t>
+              <a:t>2019/2/16</a:t>
             </a:fld>
             <a:endParaRPr lang="zh-CN" altLang="en-US"/>
           </a:p>
@@ -12087,7 +12087,7 @@
           <a:p>
             <a:fld id="{D840643F-1791-474B-B0E8-F4C29BE3B528}" type="datetimeFigureOut">
               <a:rPr lang="zh-CN" altLang="en-US" smtClean="0"/>
-              <a:t>2019/1/18</a:t>
+              <a:t>2019/2/16</a:t>
             </a:fld>
             <a:endParaRPr lang="zh-CN" altLang="en-US"/>
           </a:p>
@@ -12182,7 +12182,7 @@
           <a:p>
             <a:fld id="{D840643F-1791-474B-B0E8-F4C29BE3B528}" type="datetimeFigureOut">
               <a:rPr lang="zh-CN" altLang="en-US" smtClean="0"/>
-              <a:t>2019/1/18</a:t>
+              <a:t>2019/2/16</a:t>
             </a:fld>
             <a:endParaRPr lang="zh-CN" altLang="en-US"/>
           </a:p>
@@ -12431,7 +12431,7 @@
           <a:p>
             <a:fld id="{D840643F-1791-474B-B0E8-F4C29BE3B528}" type="datetimeFigureOut">
               <a:rPr lang="zh-CN" altLang="en-US" smtClean="0"/>
-              <a:t>2019/1/18</a:t>
+              <a:t>2019/2/16</a:t>
             </a:fld>
             <a:endParaRPr lang="zh-CN" altLang="en-US"/>
           </a:p>
@@ -12711,7 +12711,7 @@
           <a:p>
             <a:fld id="{D840643F-1791-474B-B0E8-F4C29BE3B528}" type="datetimeFigureOut">
               <a:rPr lang="zh-CN" altLang="en-US" smtClean="0"/>
-              <a:t>2019/1/18</a:t>
+              <a:t>2019/2/16</a:t>
             </a:fld>
             <a:endParaRPr lang="zh-CN" altLang="en-US"/>
           </a:p>
@@ -12827,7 +12827,7 @@
           <a:noFill/>
           <a:extLst>
             <a:ext uri="{909E8E84-426E-40dd-AFC4-6F175D3DCCD1}">
-              <a14:hiddenFill xmlns:a14="http://schemas.microsoft.com/office/drawing/2010/main" xmlns="">
+              <a14:hiddenFill xmlns="" xmlns:a14="http://schemas.microsoft.com/office/drawing/2010/main">
                 <a:solidFill>
                   <a:srgbClr val="FFFFFF"/>
                 </a:solidFill>
@@ -12901,7 +12901,7 @@
               </a:ln>
               <a:extLst>
                 <a:ext uri="{91240B29-F687-4f45-9708-019B960494DF}">
-                  <a14:hiddenLine xmlns:a14="http://schemas.microsoft.com/office/drawing/2010/main" xmlns="" w="9525">
+                  <a14:hiddenLine xmlns="" xmlns:a14="http://schemas.microsoft.com/office/drawing/2010/main" w="9525">
                     <a:solidFill>
                       <a:srgbClr val="000000"/>
                     </a:solidFill>
@@ -12991,7 +12991,7 @@
               </a:ln>
               <a:extLst>
                 <a:ext uri="{91240B29-F687-4f45-9708-019B960494DF}">
-                  <a14:hiddenLine xmlns:a14="http://schemas.microsoft.com/office/drawing/2010/main" xmlns="" w="9525">
+                  <a14:hiddenLine xmlns="" xmlns:a14="http://schemas.microsoft.com/office/drawing/2010/main" w="9525">
                     <a:solidFill>
                       <a:srgbClr val="000000"/>
                     </a:solidFill>
@@ -13081,7 +13081,7 @@
               </a:ln>
               <a:extLst>
                 <a:ext uri="{91240B29-F687-4f45-9708-019B960494DF}">
-                  <a14:hiddenLine xmlns:a14="http://schemas.microsoft.com/office/drawing/2010/main" xmlns="" w="9525">
+                  <a14:hiddenLine xmlns="" xmlns:a14="http://schemas.microsoft.com/office/drawing/2010/main" w="9525">
                     <a:solidFill>
                       <a:srgbClr val="000000"/>
                     </a:solidFill>
@@ -13143,7 +13143,7 @@
               </a:ln>
               <a:extLst>
                 <a:ext uri="{91240B29-F687-4f45-9708-019B960494DF}">
-                  <a14:hiddenLine xmlns:a14="http://schemas.microsoft.com/office/drawing/2010/main" xmlns="" w="9525">
+                  <a14:hiddenLine xmlns="" xmlns:a14="http://schemas.microsoft.com/office/drawing/2010/main" w="9525">
                     <a:solidFill>
                       <a:srgbClr val="000000"/>
                     </a:solidFill>
@@ -13233,7 +13233,7 @@
               </a:ln>
               <a:extLst>
                 <a:ext uri="{91240B29-F687-4f45-9708-019B960494DF}">
-                  <a14:hiddenLine xmlns:a14="http://schemas.microsoft.com/office/drawing/2010/main" xmlns="" w="9525">
+                  <a14:hiddenLine xmlns="" xmlns:a14="http://schemas.microsoft.com/office/drawing/2010/main" w="9525">
                     <a:solidFill>
                       <a:srgbClr val="000000"/>
                     </a:solidFill>
@@ -13295,7 +13295,7 @@
               </a:ln>
               <a:extLst>
                 <a:ext uri="{91240B29-F687-4f45-9708-019B960494DF}">
-                  <a14:hiddenLine xmlns:a14="http://schemas.microsoft.com/office/drawing/2010/main" xmlns="" w="9525">
+                  <a14:hiddenLine xmlns="" xmlns:a14="http://schemas.microsoft.com/office/drawing/2010/main" w="9525">
                     <a:solidFill>
                       <a:srgbClr val="000000"/>
                     </a:solidFill>
@@ -13357,7 +13357,7 @@
               </a:ln>
               <a:extLst>
                 <a:ext uri="{91240B29-F687-4f45-9708-019B960494DF}">
-                  <a14:hiddenLine xmlns:a14="http://schemas.microsoft.com/office/drawing/2010/main" xmlns="" w="9525">
+                  <a14:hiddenLine xmlns="" xmlns:a14="http://schemas.microsoft.com/office/drawing/2010/main" w="9525">
                     <a:solidFill>
                       <a:srgbClr val="000000"/>
                     </a:solidFill>
@@ -13447,7 +13447,7 @@
               </a:ln>
               <a:extLst>
                 <a:ext uri="{91240B29-F687-4f45-9708-019B960494DF}">
-                  <a14:hiddenLine xmlns:a14="http://schemas.microsoft.com/office/drawing/2010/main" xmlns="" w="9525">
+                  <a14:hiddenLine xmlns="" xmlns:a14="http://schemas.microsoft.com/office/drawing/2010/main" w="9525">
                     <a:solidFill>
                       <a:srgbClr val="000000"/>
                     </a:solidFill>
@@ -13537,7 +13537,7 @@
               </a:ln>
               <a:extLst>
                 <a:ext uri="{91240B29-F687-4f45-9708-019B960494DF}">
-                  <a14:hiddenLine xmlns:a14="http://schemas.microsoft.com/office/drawing/2010/main" xmlns="" w="9525">
+                  <a14:hiddenLine xmlns="" xmlns:a14="http://schemas.microsoft.com/office/drawing/2010/main" w="9525">
                     <a:solidFill>
                       <a:srgbClr val="000000"/>
                     </a:solidFill>
@@ -13599,7 +13599,7 @@
               </a:ln>
               <a:extLst>
                 <a:ext uri="{91240B29-F687-4f45-9708-019B960494DF}">
-                  <a14:hiddenLine xmlns:a14="http://schemas.microsoft.com/office/drawing/2010/main" xmlns="" w="9525">
+                  <a14:hiddenLine xmlns="" xmlns:a14="http://schemas.microsoft.com/office/drawing/2010/main" w="9525">
                     <a:solidFill>
                       <a:srgbClr val="000000"/>
                     </a:solidFill>
@@ -13709,7 +13709,7 @@
               </a:ln>
               <a:extLst>
                 <a:ext uri="{91240B29-F687-4f45-9708-019B960494DF}">
-                  <a14:hiddenLine xmlns:a14="http://schemas.microsoft.com/office/drawing/2010/main" xmlns="" w="9525">
+                  <a14:hiddenLine xmlns="" xmlns:a14="http://schemas.microsoft.com/office/drawing/2010/main" w="9525">
                     <a:solidFill>
                       <a:srgbClr val="000000"/>
                     </a:solidFill>
@@ -13793,7 +13793,7 @@
               </a:ln>
               <a:extLst>
                 <a:ext uri="{91240B29-F687-4f45-9708-019B960494DF}">
-                  <a14:hiddenLine xmlns:a14="http://schemas.microsoft.com/office/drawing/2010/main" xmlns="" w="9525">
+                  <a14:hiddenLine xmlns="" xmlns:a14="http://schemas.microsoft.com/office/drawing/2010/main" w="9525">
                     <a:solidFill>
                       <a:srgbClr val="000000"/>
                     </a:solidFill>
@@ -13855,7 +13855,7 @@
               </a:ln>
               <a:extLst>
                 <a:ext uri="{91240B29-F687-4f45-9708-019B960494DF}">
-                  <a14:hiddenLine xmlns:a14="http://schemas.microsoft.com/office/drawing/2010/main" xmlns="" w="9525">
+                  <a14:hiddenLine xmlns="" xmlns:a14="http://schemas.microsoft.com/office/drawing/2010/main" w="9525">
                     <a:solidFill>
                       <a:srgbClr val="000000"/>
                     </a:solidFill>
@@ -13917,7 +13917,7 @@
               </a:ln>
               <a:extLst>
                 <a:ext uri="{91240B29-F687-4f45-9708-019B960494DF}">
-                  <a14:hiddenLine xmlns:a14="http://schemas.microsoft.com/office/drawing/2010/main" xmlns="" w="9525">
+                  <a14:hiddenLine xmlns="" xmlns:a14="http://schemas.microsoft.com/office/drawing/2010/main" w="9525">
                     <a:solidFill>
                       <a:srgbClr val="000000"/>
                     </a:solidFill>
@@ -14007,7 +14007,7 @@
               </a:ln>
               <a:extLst>
                 <a:ext uri="{91240B29-F687-4f45-9708-019B960494DF}">
-                  <a14:hiddenLine xmlns:a14="http://schemas.microsoft.com/office/drawing/2010/main" xmlns="" w="9525">
+                  <a14:hiddenLine xmlns="" xmlns:a14="http://schemas.microsoft.com/office/drawing/2010/main" w="9525">
                     <a:solidFill>
                       <a:srgbClr val="000000"/>
                     </a:solidFill>
@@ -14041,7 +14041,7 @@
               </a:ln>
               <a:extLst>
                 <a:ext uri="{91240B29-F687-4f45-9708-019B960494DF}">
-                  <a14:hiddenLine xmlns:a14="http://schemas.microsoft.com/office/drawing/2010/main" xmlns="" w="9525">
+                  <a14:hiddenLine xmlns="" xmlns:a14="http://schemas.microsoft.com/office/drawing/2010/main" w="9525">
                     <a:solidFill>
                       <a:srgbClr val="000000"/>
                     </a:solidFill>
@@ -14106,7 +14106,7 @@
               </a:ln>
               <a:extLst>
                 <a:ext uri="{91240B29-F687-4f45-9708-019B960494DF}">
-                  <a14:hiddenLine xmlns:a14="http://schemas.microsoft.com/office/drawing/2010/main" xmlns="" w="9525">
+                  <a14:hiddenLine xmlns="" xmlns:a14="http://schemas.microsoft.com/office/drawing/2010/main" w="9525">
                     <a:solidFill>
                       <a:srgbClr val="000000"/>
                     </a:solidFill>
@@ -14196,7 +14196,7 @@
               </a:ln>
               <a:extLst>
                 <a:ext uri="{91240B29-F687-4f45-9708-019B960494DF}">
-                  <a14:hiddenLine xmlns:a14="http://schemas.microsoft.com/office/drawing/2010/main" xmlns="" w="9525">
+                  <a14:hiddenLine xmlns="" xmlns:a14="http://schemas.microsoft.com/office/drawing/2010/main" w="9525">
                     <a:solidFill>
                       <a:srgbClr val="000000"/>
                     </a:solidFill>
@@ -14258,7 +14258,7 @@
               </a:ln>
               <a:extLst>
                 <a:ext uri="{91240B29-F687-4f45-9708-019B960494DF}">
-                  <a14:hiddenLine xmlns:a14="http://schemas.microsoft.com/office/drawing/2010/main" xmlns="" w="9525">
+                  <a14:hiddenLine xmlns="" xmlns:a14="http://schemas.microsoft.com/office/drawing/2010/main" w="9525">
                     <a:solidFill>
                       <a:srgbClr val="000000"/>
                     </a:solidFill>
@@ -14348,7 +14348,7 @@
               </a:ln>
               <a:extLst>
                 <a:ext uri="{91240B29-F687-4f45-9708-019B960494DF}">
-                  <a14:hiddenLine xmlns:a14="http://schemas.microsoft.com/office/drawing/2010/main" xmlns="" w="9525">
+                  <a14:hiddenLine xmlns="" xmlns:a14="http://schemas.microsoft.com/office/drawing/2010/main" w="9525">
                     <a:solidFill>
                       <a:srgbClr val="000000"/>
                     </a:solidFill>
@@ -14413,7 +14413,7 @@
               </a:ln>
               <a:extLst>
                 <a:ext uri="{91240B29-F687-4f45-9708-019B960494DF}">
-                  <a14:hiddenLine xmlns:a14="http://schemas.microsoft.com/office/drawing/2010/main" xmlns="" w="9525">
+                  <a14:hiddenLine xmlns="" xmlns:a14="http://schemas.microsoft.com/office/drawing/2010/main" w="9525">
                     <a:solidFill>
                       <a:srgbClr val="000000"/>
                     </a:solidFill>
@@ -14475,7 +14475,7 @@
               </a:ln>
               <a:extLst>
                 <a:ext uri="{91240B29-F687-4f45-9708-019B960494DF}">
-                  <a14:hiddenLine xmlns:a14="http://schemas.microsoft.com/office/drawing/2010/main" xmlns="" w="9525">
+                  <a14:hiddenLine xmlns="" xmlns:a14="http://schemas.microsoft.com/office/drawing/2010/main" w="9525">
                     <a:solidFill>
                       <a:srgbClr val="000000"/>
                     </a:solidFill>
@@ -14565,7 +14565,7 @@
               </a:ln>
               <a:extLst>
                 <a:ext uri="{91240B29-F687-4f45-9708-019B960494DF}">
-                  <a14:hiddenLine xmlns:a14="http://schemas.microsoft.com/office/drawing/2010/main" xmlns="" w="9525">
+                  <a14:hiddenLine xmlns="" xmlns:a14="http://schemas.microsoft.com/office/drawing/2010/main" w="9525">
                     <a:solidFill>
                       <a:srgbClr val="000000"/>
                     </a:solidFill>
@@ -14655,7 +14655,7 @@
               </a:ln>
               <a:extLst>
                 <a:ext uri="{91240B29-F687-4f45-9708-019B960494DF}">
-                  <a14:hiddenLine xmlns:a14="http://schemas.microsoft.com/office/drawing/2010/main" xmlns="" w="9525">
+                  <a14:hiddenLine xmlns="" xmlns:a14="http://schemas.microsoft.com/office/drawing/2010/main" w="9525">
                     <a:solidFill>
                       <a:srgbClr val="000000"/>
                     </a:solidFill>
@@ -14720,7 +14720,7 @@
               </a:ln>
               <a:extLst>
                 <a:ext uri="{91240B29-F687-4f45-9708-019B960494DF}">
-                  <a14:hiddenLine xmlns:a14="http://schemas.microsoft.com/office/drawing/2010/main" xmlns="" w="9525">
+                  <a14:hiddenLine xmlns="" xmlns:a14="http://schemas.microsoft.com/office/drawing/2010/main" w="9525">
                     <a:solidFill>
                       <a:srgbClr val="000000"/>
                     </a:solidFill>
@@ -14840,7 +14840,7 @@
               </a:ln>
               <a:extLst>
                 <a:ext uri="{91240B29-F687-4f45-9708-019B960494DF}">
-                  <a14:hiddenLine xmlns:a14="http://schemas.microsoft.com/office/drawing/2010/main" xmlns="" w="9525">
+                  <a14:hiddenLine xmlns="" xmlns:a14="http://schemas.microsoft.com/office/drawing/2010/main" w="9525">
                     <a:solidFill>
                       <a:srgbClr val="000000"/>
                     </a:solidFill>
@@ -14938,7 +14938,7 @@
               </a:ln>
               <a:extLst>
                 <a:ext uri="{91240B29-F687-4f45-9708-019B960494DF}">
-                  <a14:hiddenLine xmlns:a14="http://schemas.microsoft.com/office/drawing/2010/main" xmlns="" w="9525">
+                  <a14:hiddenLine xmlns="" xmlns:a14="http://schemas.microsoft.com/office/drawing/2010/main" w="9525">
                     <a:solidFill>
                       <a:srgbClr val="000000"/>
                     </a:solidFill>
@@ -15053,7 +15053,7 @@
               </a:ln>
               <a:extLst>
                 <a:ext uri="{91240B29-F687-4f45-9708-019B960494DF}">
-                  <a14:hiddenLine xmlns:a14="http://schemas.microsoft.com/office/drawing/2010/main" xmlns="" w="9525">
+                  <a14:hiddenLine xmlns="" xmlns:a14="http://schemas.microsoft.com/office/drawing/2010/main" w="9525">
                     <a:solidFill>
                       <a:srgbClr val="000000"/>
                     </a:solidFill>
@@ -15143,7 +15143,7 @@
               </a:ln>
               <a:extLst>
                 <a:ext uri="{91240B29-F687-4f45-9708-019B960494DF}">
-                  <a14:hiddenLine xmlns:a14="http://schemas.microsoft.com/office/drawing/2010/main" xmlns="" w="9525">
+                  <a14:hiddenLine xmlns="" xmlns:a14="http://schemas.microsoft.com/office/drawing/2010/main" w="9525">
                     <a:solidFill>
                       <a:srgbClr val="000000"/>
                     </a:solidFill>
@@ -15208,7 +15208,7 @@
               </a:ln>
               <a:extLst>
                 <a:ext uri="{91240B29-F687-4f45-9708-019B960494DF}">
-                  <a14:hiddenLine xmlns:a14="http://schemas.microsoft.com/office/drawing/2010/main" xmlns="" w="9525">
+                  <a14:hiddenLine xmlns="" xmlns:a14="http://schemas.microsoft.com/office/drawing/2010/main" w="9525">
                     <a:solidFill>
                       <a:srgbClr val="000000"/>
                     </a:solidFill>
@@ -15298,7 +15298,7 @@
               </a:ln>
               <a:extLst>
                 <a:ext uri="{91240B29-F687-4f45-9708-019B960494DF}">
-                  <a14:hiddenLine xmlns:a14="http://schemas.microsoft.com/office/drawing/2010/main" xmlns="" w="9525">
+                  <a14:hiddenLine xmlns="" xmlns:a14="http://schemas.microsoft.com/office/drawing/2010/main" w="9525">
                     <a:solidFill>
                       <a:srgbClr val="000000"/>
                     </a:solidFill>
@@ -15366,7 +15366,7 @@
               </a:ln>
               <a:extLst>
                 <a:ext uri="{91240B29-F687-4f45-9708-019B960494DF}">
-                  <a14:hiddenLine xmlns:a14="http://schemas.microsoft.com/office/drawing/2010/main" xmlns="" w="9525">
+                  <a14:hiddenLine xmlns="" xmlns:a14="http://schemas.microsoft.com/office/drawing/2010/main" w="9525">
                     <a:solidFill>
                       <a:srgbClr val="000000"/>
                     </a:solidFill>
@@ -15456,7 +15456,7 @@
               </a:ln>
               <a:extLst>
                 <a:ext uri="{91240B29-F687-4f45-9708-019B960494DF}">
-                  <a14:hiddenLine xmlns:a14="http://schemas.microsoft.com/office/drawing/2010/main" xmlns="" w="9525">
+                  <a14:hiddenLine xmlns="" xmlns:a14="http://schemas.microsoft.com/office/drawing/2010/main" w="9525">
                     <a:solidFill>
                       <a:srgbClr val="000000"/>
                     </a:solidFill>
@@ -15524,7 +15524,7 @@
               </a:ln>
               <a:extLst>
                 <a:ext uri="{91240B29-F687-4f45-9708-019B960494DF}">
-                  <a14:hiddenLine xmlns:a14="http://schemas.microsoft.com/office/drawing/2010/main" xmlns="" w="9525">
+                  <a14:hiddenLine xmlns="" xmlns:a14="http://schemas.microsoft.com/office/drawing/2010/main" w="9525">
                     <a:solidFill>
                       <a:srgbClr val="000000"/>
                     </a:solidFill>
@@ -15614,7 +15614,7 @@
               </a:ln>
               <a:extLst>
                 <a:ext uri="{91240B29-F687-4f45-9708-019B960494DF}">
-                  <a14:hiddenLine xmlns:a14="http://schemas.microsoft.com/office/drawing/2010/main" xmlns="" w="9525">
+                  <a14:hiddenLine xmlns="" xmlns:a14="http://schemas.microsoft.com/office/drawing/2010/main" w="9525">
                     <a:solidFill>
                       <a:srgbClr val="000000"/>
                     </a:solidFill>
@@ -15648,7 +15648,7 @@
               </a:ln>
               <a:extLst>
                 <a:ext uri="{91240B29-F687-4f45-9708-019B960494DF}">
-                  <a14:hiddenLine xmlns:a14="http://schemas.microsoft.com/office/drawing/2010/main" xmlns="" w="9525">
+                  <a14:hiddenLine xmlns="" xmlns:a14="http://schemas.microsoft.com/office/drawing/2010/main" w="9525">
                     <a:solidFill>
                       <a:srgbClr val="000000"/>
                     </a:solidFill>
@@ -15788,7 +15788,7 @@
           <a:p>
             <a:fld id="{D840643F-1791-474B-B0E8-F4C29BE3B528}" type="datetimeFigureOut">
               <a:rPr lang="zh-CN" altLang="en-US" smtClean="0"/>
-              <a:t>2019/1/18</a:t>
+              <a:t>2019/2/16</a:t>
             </a:fld>
             <a:endParaRPr lang="zh-CN" altLang="en-US"/>
           </a:p>
@@ -21724,8 +21724,8 @@
           </a:prstGeom>
         </p:spPr>
       </p:pic>
-      <mc:AlternateContent xmlns:mc="http://schemas.openxmlformats.org/markup-compatibility/2006">
-        <mc:Choice xmlns:a14="http://schemas.microsoft.com/office/drawing/2010/main" Requires="a14">
+      <mc:AlternateContent xmlns:mc="http://schemas.openxmlformats.org/markup-compatibility/2006" xmlns:a14="http://schemas.microsoft.com/office/drawing/2010/main">
+        <mc:Choice Requires="a14">
           <p:sp>
             <p:nvSpPr>
               <p:cNvPr id="8" name="Rectangle 7">
@@ -21939,7 +21939,7 @@
             </p:txBody>
           </p:sp>
         </mc:Choice>
-        <mc:Fallback>
+        <mc:Fallback xmlns="">
           <p:sp>
             <p:nvSpPr>
               <p:cNvPr id="8" name="Rectangle 7">
@@ -23628,7 +23628,7 @@
           <a:noFill/>
           <a:extLst>
             <a:ext uri="{909E8E84-426E-40dd-AFC4-6F175D3DCCD1}">
-              <a14:hiddenFill xmlns="" xmlns:a16="http://schemas.microsoft.com/office/drawing/2014/main" xmlns:p14="http://schemas.microsoft.com/office/powerpoint/2010/main" xmlns:a14="http://schemas.microsoft.com/office/drawing/2010/main">
+              <a14:hiddenFill xmlns:a14="http://schemas.microsoft.com/office/drawing/2010/main" xmlns:p14="http://schemas.microsoft.com/office/powerpoint/2010/main" xmlns:a16="http://schemas.microsoft.com/office/drawing/2014/main" xmlns="">
                 <a:solidFill>
                   <a:srgbClr val="FFFFFF"/>
                 </a:solidFill>
@@ -23752,7 +23752,7 @@
           <a:noFill/>
           <a:extLst>
             <a:ext uri="{909E8E84-426E-40dd-AFC4-6F175D3DCCD1}">
-              <a14:hiddenFill xmlns="" xmlns:a16="http://schemas.microsoft.com/office/drawing/2014/main" xmlns:p14="http://schemas.microsoft.com/office/powerpoint/2010/main" xmlns:a14="http://schemas.microsoft.com/office/drawing/2010/main">
+              <a14:hiddenFill xmlns:a14="http://schemas.microsoft.com/office/drawing/2010/main" xmlns:p14="http://schemas.microsoft.com/office/powerpoint/2010/main" xmlns:a16="http://schemas.microsoft.com/office/drawing/2014/main" xmlns="">
                 <a:solidFill>
                   <a:srgbClr val="FFFFFF"/>
                 </a:solidFill>
@@ -24099,7 +24099,7 @@
                   <a:spcPts val="600"/>
                 </a:spcAft>
               </a:pPr>
-              <a:t>1/18/2019</a:t>
+              <a:t>2/16/2019</a:t>
             </a:fld>
             <a:endParaRPr lang="en-US" dirty="0"/>
           </a:p>
@@ -24249,7 +24249,7 @@
                   <a:spcPts val="600"/>
                 </a:spcAft>
               </a:pPr>
-              <a:t>4</a:t>
+              <a:t>34</a:t>
             </a:fld>
             <a:endParaRPr lang="en-US"/>
           </a:p>

</xml_diff>

<commit_message>
create a basic Square class from very beginning.
</commit_message>
<xml_diff>
--- a/doc/Introduction Java.pptx
+++ b/doc/Introduction Java.pptx
@@ -5,7 +5,7 @@
     <p:sldMasterId id="2147483672" r:id="rId1"/>
   </p:sldMasterIdLst>
   <p:notesMasterIdLst>
-    <p:notesMasterId r:id="rId37"/>
+    <p:notesMasterId r:id="rId38"/>
   </p:notesMasterIdLst>
   <p:sldIdLst>
     <p:sldId id="256" r:id="rId2"/>
@@ -36,13 +36,14 @@
     <p:sldId id="285" r:id="rId27"/>
     <p:sldId id="286" r:id="rId28"/>
     <p:sldId id="287" r:id="rId29"/>
-    <p:sldId id="288" r:id="rId30"/>
-    <p:sldId id="289" r:id="rId31"/>
-    <p:sldId id="273" r:id="rId32"/>
-    <p:sldId id="274" r:id="rId33"/>
-    <p:sldId id="290" r:id="rId34"/>
-    <p:sldId id="291" r:id="rId35"/>
-    <p:sldId id="275" r:id="rId36"/>
+    <p:sldId id="292" r:id="rId30"/>
+    <p:sldId id="288" r:id="rId31"/>
+    <p:sldId id="289" r:id="rId32"/>
+    <p:sldId id="273" r:id="rId33"/>
+    <p:sldId id="274" r:id="rId34"/>
+    <p:sldId id="290" r:id="rId35"/>
+    <p:sldId id="291" r:id="rId36"/>
+    <p:sldId id="275" r:id="rId37"/>
   </p:sldIdLst>
   <p:sldSz cx="12192000" cy="6858000"/>
   <p:notesSz cx="6858000" cy="9144000"/>
@@ -2272,16 +2273,6 @@
           <a:bodyPr/>
           <a:lstStyle/>
           <a:p>
-            <a:r>
-              <a:rPr lang="en-US" altLang="zh-CN"/>
-              <a:t>Exercise: write a program named getDaysOfMonth(int month) that return a number of days by given month.</a:t>
-            </a:r>
-          </a:p>
-          <a:p>
-            <a:r>
-              <a:rPr lang="en-US" altLang="zh-CN"/>
-              <a:t>for instance, getDaysOfMonth(3) should return 31, getDaysOfMonth(9) should return 30, and so on so forth.</a:t>
-            </a:r>
             <a:endParaRPr lang="zh-CN" altLang="en-US"/>
           </a:p>
         </p:txBody>
@@ -2312,7 +2303,7 @@
     </p:spTree>
     <p:extLst>
       <p:ext uri="{BB962C8B-B14F-4D97-AF65-F5344CB8AC3E}">
-        <p14:creationId xmlns:p14="http://schemas.microsoft.com/office/powerpoint/2010/main" val="922709794"/>
+        <p14:creationId xmlns:p14="http://schemas.microsoft.com/office/powerpoint/2010/main" val="2609274436"/>
       </p:ext>
     </p:extLst>
   </p:cSld>
@@ -2406,7 +2397,7 @@
     </p:spTree>
     <p:extLst>
       <p:ext uri="{BB962C8B-B14F-4D97-AF65-F5344CB8AC3E}">
-        <p14:creationId xmlns:p14="http://schemas.microsoft.com/office/powerpoint/2010/main" val="2162828012"/>
+        <p14:creationId xmlns:p14="http://schemas.microsoft.com/office/powerpoint/2010/main" val="922709794"/>
       </p:ext>
     </p:extLst>
   </p:cSld>
@@ -2462,7 +2453,13 @@
           <a:p>
             <a:r>
               <a:rPr lang="en-US" altLang="zh-CN"/>
-              <a:t>Blue print. </a:t>
+              <a:t>Exercise: write a program named getDaysOfMonth(int month) that return a number of days by given month.</a:t>
+            </a:r>
+          </a:p>
+          <a:p>
+            <a:r>
+              <a:rPr lang="en-US" altLang="zh-CN"/>
+              <a:t>for instance, getDaysOfMonth(3) should return 31, getDaysOfMonth(9) should return 30, and so on so forth.</a:t>
             </a:r>
             <a:endParaRPr lang="zh-CN" altLang="en-US"/>
           </a:p>
@@ -2494,7 +2491,7 @@
     </p:spTree>
     <p:extLst>
       <p:ext uri="{BB962C8B-B14F-4D97-AF65-F5344CB8AC3E}">
-        <p14:creationId xmlns:p14="http://schemas.microsoft.com/office/powerpoint/2010/main" val="3658850895"/>
+        <p14:creationId xmlns:p14="http://schemas.microsoft.com/office/powerpoint/2010/main" val="2162828012"/>
       </p:ext>
     </p:extLst>
   </p:cSld>
@@ -2548,6 +2545,10 @@
           <a:bodyPr/>
           <a:lstStyle/>
           <a:p>
+            <a:r>
+              <a:rPr lang="en-US" altLang="zh-CN"/>
+              <a:t>Blue print. </a:t>
+            </a:r>
             <a:endParaRPr lang="zh-CN" altLang="en-US"/>
           </a:p>
         </p:txBody>
@@ -2578,7 +2579,7 @@
     </p:spTree>
     <p:extLst>
       <p:ext uri="{BB962C8B-B14F-4D97-AF65-F5344CB8AC3E}">
-        <p14:creationId xmlns:p14="http://schemas.microsoft.com/office/powerpoint/2010/main" val="2977258760"/>
+        <p14:creationId xmlns:p14="http://schemas.microsoft.com/office/powerpoint/2010/main" val="3658850895"/>
       </p:ext>
     </p:extLst>
   </p:cSld>
@@ -2653,7 +2654,7 @@
           <a:p>
             <a:fld id="{56488C3D-0F35-4866-AF88-0C718A72E3CD}" type="slidenum">
               <a:rPr lang="zh-CN" altLang="en-US" smtClean="0"/>
-              <a:t>34</a:t>
+              <a:t>33</a:t>
             </a:fld>
             <a:endParaRPr lang="zh-CN" altLang="en-US"/>
           </a:p>
@@ -2662,7 +2663,7 @@
     </p:spTree>
     <p:extLst>
       <p:ext uri="{BB962C8B-B14F-4D97-AF65-F5344CB8AC3E}">
-        <p14:creationId xmlns:p14="http://schemas.microsoft.com/office/powerpoint/2010/main" val="3802092525"/>
+        <p14:creationId xmlns:p14="http://schemas.microsoft.com/office/powerpoint/2010/main" val="2977258760"/>
       </p:ext>
     </p:extLst>
   </p:cSld>
@@ -2716,84 +2717,6 @@
           <a:bodyPr/>
           <a:lstStyle/>
           <a:p>
-            <a:pPr marL="171450" indent="-171450">
-              <a:buFont typeface="Arial" panose="020B0604020202020204" pitchFamily="34" charset="0"/>
-              <a:buChar char="•"/>
-            </a:pPr>
-            <a:r>
-              <a:rPr lang="en-US" altLang="zh-CN"/>
-              <a:t>Create another instance</a:t>
-            </a:r>
-          </a:p>
-          <a:p>
-            <a:pPr marL="171450" indent="-171450">
-              <a:buFont typeface="Arial" panose="020B0604020202020204" pitchFamily="34" charset="0"/>
-              <a:buChar char="•"/>
-            </a:pPr>
-            <a:r>
-              <a:rPr lang="en-US" altLang="zh-CN"/>
-              <a:t>Add name on Bicycle to differenciate different bike.</a:t>
-            </a:r>
-          </a:p>
-          <a:p>
-            <a:pPr marL="171450" indent="-171450">
-              <a:buFont typeface="Arial" panose="020B0604020202020204" pitchFamily="34" charset="0"/>
-              <a:buChar char="•"/>
-            </a:pPr>
-            <a:r>
-              <a:rPr lang="en-US" altLang="zh-CN"/>
-              <a:t>Override default constructor</a:t>
-            </a:r>
-          </a:p>
-          <a:p>
-            <a:pPr marL="171450" indent="-171450">
-              <a:buFont typeface="Arial" panose="020B0604020202020204" pitchFamily="34" charset="0"/>
-              <a:buChar char="•"/>
-            </a:pPr>
-            <a:r>
-              <a:rPr lang="en-US" altLang="zh-CN"/>
-              <a:t>Create a constructor without attribute</a:t>
-            </a:r>
-          </a:p>
-          <a:p>
-            <a:pPr marL="171450" indent="-171450">
-              <a:buFont typeface="Arial" panose="020B0604020202020204" pitchFamily="34" charset="0"/>
-              <a:buChar char="•"/>
-            </a:pPr>
-            <a:r>
-              <a:rPr lang="en-US" altLang="zh-CN"/>
-              <a:t>Instance Variable === non-static fields</a:t>
-            </a:r>
-          </a:p>
-          <a:p>
-            <a:pPr marL="171450" indent="-171450">
-              <a:buFont typeface="Arial" panose="020B0604020202020204" pitchFamily="34" charset="0"/>
-              <a:buChar char="•"/>
-            </a:pPr>
-            <a:r>
-              <a:rPr lang="en-US" altLang="zh-CN"/>
-              <a:t>Class Variable === Static fields</a:t>
-            </a:r>
-          </a:p>
-          <a:p>
-            <a:pPr marL="171450" indent="-171450">
-              <a:buFont typeface="Arial" panose="020B0604020202020204" pitchFamily="34" charset="0"/>
-              <a:buChar char="•"/>
-            </a:pPr>
-            <a:r>
-              <a:rPr lang="en-US" altLang="zh-CN"/>
-              <a:t>Local Variable === variable defined within method</a:t>
-            </a:r>
-          </a:p>
-          <a:p>
-            <a:pPr marL="171450" indent="-171450">
-              <a:buFont typeface="Arial" panose="020B0604020202020204" pitchFamily="34" charset="0"/>
-              <a:buChar char="•"/>
-            </a:pPr>
-            <a:r>
-              <a:rPr lang="en-US" altLang="zh-CN"/>
-              <a:t>Parameter === argument passed to method</a:t>
-            </a:r>
             <a:endParaRPr lang="zh-CN" altLang="en-US"/>
           </a:p>
         </p:txBody>
@@ -2816,6 +2739,168 @@
             <a:fld id="{56488C3D-0F35-4866-AF88-0C718A72E3CD}" type="slidenum">
               <a:rPr lang="zh-CN" altLang="en-US" smtClean="0"/>
               <a:t>35</a:t>
+            </a:fld>
+            <a:endParaRPr lang="zh-CN" altLang="en-US"/>
+          </a:p>
+        </p:txBody>
+      </p:sp>
+    </p:spTree>
+    <p:extLst>
+      <p:ext uri="{BB962C8B-B14F-4D97-AF65-F5344CB8AC3E}">
+        <p14:creationId xmlns:p14="http://schemas.microsoft.com/office/powerpoint/2010/main" val="3802092525"/>
+      </p:ext>
+    </p:extLst>
+  </p:cSld>
+  <p:clrMapOvr>
+    <a:masterClrMapping/>
+  </p:clrMapOvr>
+</p:notes>
+</file>
+
+<file path=ppt/notesSlides/notesSlide27.xml><?xml version="1.0" encoding="utf-8"?>
+<p:notes xmlns:a="http://schemas.openxmlformats.org/drawingml/2006/main" xmlns:r="http://schemas.openxmlformats.org/officeDocument/2006/relationships" xmlns:p="http://schemas.openxmlformats.org/presentationml/2006/main">
+  <p:cSld>
+    <p:spTree>
+      <p:nvGrpSpPr>
+        <p:cNvPr id="1" name=""/>
+        <p:cNvGrpSpPr/>
+        <p:nvPr/>
+      </p:nvGrpSpPr>
+      <p:grpSpPr>
+        <a:xfrm>
+          <a:off x="0" y="0"/>
+          <a:ext cx="0" cy="0"/>
+          <a:chOff x="0" y="0"/>
+          <a:chExt cx="0" cy="0"/>
+        </a:xfrm>
+      </p:grpSpPr>
+      <p:sp>
+        <p:nvSpPr>
+          <p:cNvPr id="2" name="Slide Image Placeholder 1"/>
+          <p:cNvSpPr>
+            <a:spLocks noGrp="1" noRot="1" noChangeAspect="1"/>
+          </p:cNvSpPr>
+          <p:nvPr>
+            <p:ph type="sldImg"/>
+          </p:nvPr>
+        </p:nvSpPr>
+        <p:spPr/>
+      </p:sp>
+      <p:sp>
+        <p:nvSpPr>
+          <p:cNvPr id="3" name="Notes Placeholder 2"/>
+          <p:cNvSpPr>
+            <a:spLocks noGrp="1"/>
+          </p:cNvSpPr>
+          <p:nvPr>
+            <p:ph type="body" idx="1"/>
+          </p:nvPr>
+        </p:nvSpPr>
+        <p:spPr/>
+        <p:txBody>
+          <a:bodyPr/>
+          <a:lstStyle/>
+          <a:p>
+            <a:pPr marL="171450" indent="-171450">
+              <a:buFont typeface="Arial" panose="020B0604020202020204" pitchFamily="34" charset="0"/>
+              <a:buChar char="•"/>
+            </a:pPr>
+            <a:r>
+              <a:rPr lang="en-US" altLang="zh-CN"/>
+              <a:t>Create another instance</a:t>
+            </a:r>
+          </a:p>
+          <a:p>
+            <a:pPr marL="171450" indent="-171450">
+              <a:buFont typeface="Arial" panose="020B0604020202020204" pitchFamily="34" charset="0"/>
+              <a:buChar char="•"/>
+            </a:pPr>
+            <a:r>
+              <a:rPr lang="en-US" altLang="zh-CN"/>
+              <a:t>Add name on Bicycle to differenciate different bike.</a:t>
+            </a:r>
+          </a:p>
+          <a:p>
+            <a:pPr marL="171450" indent="-171450">
+              <a:buFont typeface="Arial" panose="020B0604020202020204" pitchFamily="34" charset="0"/>
+              <a:buChar char="•"/>
+            </a:pPr>
+            <a:r>
+              <a:rPr lang="en-US" altLang="zh-CN"/>
+              <a:t>Override default constructor</a:t>
+            </a:r>
+          </a:p>
+          <a:p>
+            <a:pPr marL="171450" indent="-171450">
+              <a:buFont typeface="Arial" panose="020B0604020202020204" pitchFamily="34" charset="0"/>
+              <a:buChar char="•"/>
+            </a:pPr>
+            <a:r>
+              <a:rPr lang="en-US" altLang="zh-CN"/>
+              <a:t>Create a constructor without attribute</a:t>
+            </a:r>
+          </a:p>
+          <a:p>
+            <a:pPr marL="171450" indent="-171450">
+              <a:buFont typeface="Arial" panose="020B0604020202020204" pitchFamily="34" charset="0"/>
+              <a:buChar char="•"/>
+            </a:pPr>
+            <a:r>
+              <a:rPr lang="en-US" altLang="zh-CN"/>
+              <a:t>Instance Variable === non-static fields</a:t>
+            </a:r>
+          </a:p>
+          <a:p>
+            <a:pPr marL="171450" indent="-171450">
+              <a:buFont typeface="Arial" panose="020B0604020202020204" pitchFamily="34" charset="0"/>
+              <a:buChar char="•"/>
+            </a:pPr>
+            <a:r>
+              <a:rPr lang="en-US" altLang="zh-CN"/>
+              <a:t>Class Variable === Static fields</a:t>
+            </a:r>
+          </a:p>
+          <a:p>
+            <a:pPr marL="171450" indent="-171450">
+              <a:buFont typeface="Arial" panose="020B0604020202020204" pitchFamily="34" charset="0"/>
+              <a:buChar char="•"/>
+            </a:pPr>
+            <a:r>
+              <a:rPr lang="en-US" altLang="zh-CN"/>
+              <a:t>Local Variable === variable defined within method</a:t>
+            </a:r>
+          </a:p>
+          <a:p>
+            <a:pPr marL="171450" indent="-171450">
+              <a:buFont typeface="Arial" panose="020B0604020202020204" pitchFamily="34" charset="0"/>
+              <a:buChar char="•"/>
+            </a:pPr>
+            <a:r>
+              <a:rPr lang="en-US" altLang="zh-CN"/>
+              <a:t>Parameter === argument passed to method</a:t>
+            </a:r>
+            <a:endParaRPr lang="zh-CN" altLang="en-US"/>
+          </a:p>
+        </p:txBody>
+      </p:sp>
+      <p:sp>
+        <p:nvSpPr>
+          <p:cNvPr id="4" name="Slide Number Placeholder 3"/>
+          <p:cNvSpPr>
+            <a:spLocks noGrp="1"/>
+          </p:cNvSpPr>
+          <p:nvPr>
+            <p:ph type="sldNum" sz="quarter" idx="5"/>
+          </p:nvPr>
+        </p:nvSpPr>
+        <p:spPr/>
+        <p:txBody>
+          <a:bodyPr/>
+          <a:lstStyle/>
+          <a:p>
+            <a:fld id="{56488C3D-0F35-4866-AF88-0C718A72E3CD}" type="slidenum">
+              <a:rPr lang="zh-CN" altLang="en-US" smtClean="0"/>
+              <a:t>36</a:t>
             </a:fld>
             <a:endParaRPr lang="zh-CN" altLang="en-US"/>
           </a:p>
@@ -3934,7 +4019,7 @@
           <a:noFill/>
           <a:extLst>
             <a:ext uri="{909E8E84-426E-40dd-AFC4-6F175D3DCCD1}">
-              <a14:hiddenFill xmlns="" xmlns:a14="http://schemas.microsoft.com/office/drawing/2010/main">
+              <a14:hiddenFill xmlns:a14="http://schemas.microsoft.com/office/drawing/2010/main" xmlns="">
                 <a:solidFill>
                   <a:srgbClr val="FFFFFF"/>
                 </a:solidFill>
@@ -3994,7 +4079,7 @@
             </a:ln>
             <a:extLst>
               <a:ext uri="{91240B29-F687-4f45-9708-019B960494DF}">
-                <a14:hiddenLine xmlns="" xmlns:a14="http://schemas.microsoft.com/office/drawing/2010/main" w="9525">
+                <a14:hiddenLine xmlns:a14="http://schemas.microsoft.com/office/drawing/2010/main" xmlns="" w="9525">
                   <a:solidFill>
                     <a:srgbClr val="000000"/>
                   </a:solidFill>
@@ -4084,7 +4169,7 @@
             </a:ln>
             <a:extLst>
               <a:ext uri="{91240B29-F687-4f45-9708-019B960494DF}">
-                <a14:hiddenLine xmlns="" xmlns:a14="http://schemas.microsoft.com/office/drawing/2010/main" w="9525">
+                <a14:hiddenLine xmlns:a14="http://schemas.microsoft.com/office/drawing/2010/main" xmlns="" w="9525">
                   <a:solidFill>
                     <a:srgbClr val="000000"/>
                   </a:solidFill>
@@ -4174,7 +4259,7 @@
             </a:ln>
             <a:extLst>
               <a:ext uri="{91240B29-F687-4f45-9708-019B960494DF}">
-                <a14:hiddenLine xmlns="" xmlns:a14="http://schemas.microsoft.com/office/drawing/2010/main" w="9525">
+                <a14:hiddenLine xmlns:a14="http://schemas.microsoft.com/office/drawing/2010/main" xmlns="" w="9525">
                   <a:solidFill>
                     <a:srgbClr val="000000"/>
                   </a:solidFill>
@@ -4208,7 +4293,7 @@
             </a:ln>
             <a:extLst>
               <a:ext uri="{91240B29-F687-4f45-9708-019B960494DF}">
-                <a14:hiddenLine xmlns="" xmlns:a14="http://schemas.microsoft.com/office/drawing/2010/main" w="9525">
+                <a14:hiddenLine xmlns:a14="http://schemas.microsoft.com/office/drawing/2010/main" xmlns="" w="9525">
                   <a:solidFill>
                     <a:srgbClr val="000000"/>
                   </a:solidFill>
@@ -4298,7 +4383,7 @@
             </a:ln>
             <a:extLst>
               <a:ext uri="{91240B29-F687-4f45-9708-019B960494DF}">
-                <a14:hiddenLine xmlns="" xmlns:a14="http://schemas.microsoft.com/office/drawing/2010/main" w="9525">
+                <a14:hiddenLine xmlns:a14="http://schemas.microsoft.com/office/drawing/2010/main" xmlns="" w="9525">
                   <a:solidFill>
                     <a:srgbClr val="000000"/>
                   </a:solidFill>
@@ -4360,7 +4445,7 @@
             </a:ln>
             <a:extLst>
               <a:ext uri="{91240B29-F687-4f45-9708-019B960494DF}">
-                <a14:hiddenLine xmlns="" xmlns:a14="http://schemas.microsoft.com/office/drawing/2010/main" w="9525">
+                <a14:hiddenLine xmlns:a14="http://schemas.microsoft.com/office/drawing/2010/main" xmlns="" w="9525">
                   <a:solidFill>
                     <a:srgbClr val="000000"/>
                   </a:solidFill>
@@ -4422,7 +4507,7 @@
             </a:ln>
             <a:extLst>
               <a:ext uri="{91240B29-F687-4f45-9708-019B960494DF}">
-                <a14:hiddenLine xmlns="" xmlns:a14="http://schemas.microsoft.com/office/drawing/2010/main" w="9525">
+                <a14:hiddenLine xmlns:a14="http://schemas.microsoft.com/office/drawing/2010/main" xmlns="" w="9525">
                   <a:solidFill>
                     <a:srgbClr val="000000"/>
                   </a:solidFill>
@@ -4512,7 +4597,7 @@
             </a:ln>
             <a:extLst>
               <a:ext uri="{91240B29-F687-4f45-9708-019B960494DF}">
-                <a14:hiddenLine xmlns="" xmlns:a14="http://schemas.microsoft.com/office/drawing/2010/main" w="9525">
+                <a14:hiddenLine xmlns:a14="http://schemas.microsoft.com/office/drawing/2010/main" xmlns="" w="9525">
                   <a:solidFill>
                     <a:srgbClr val="000000"/>
                   </a:solidFill>
@@ -4574,7 +4659,7 @@
             </a:ln>
             <a:extLst>
               <a:ext uri="{91240B29-F687-4f45-9708-019B960494DF}">
-                <a14:hiddenLine xmlns="" xmlns:a14="http://schemas.microsoft.com/office/drawing/2010/main" w="9525">
+                <a14:hiddenLine xmlns:a14="http://schemas.microsoft.com/office/drawing/2010/main" xmlns="" w="9525">
                   <a:solidFill>
                     <a:srgbClr val="000000"/>
                   </a:solidFill>
@@ -4636,7 +4721,7 @@
             </a:ln>
             <a:extLst>
               <a:ext uri="{91240B29-F687-4f45-9708-019B960494DF}">
-                <a14:hiddenLine xmlns="" xmlns:a14="http://schemas.microsoft.com/office/drawing/2010/main" w="9525">
+                <a14:hiddenLine xmlns:a14="http://schemas.microsoft.com/office/drawing/2010/main" xmlns="" w="9525">
                   <a:solidFill>
                     <a:srgbClr val="000000"/>
                   </a:solidFill>
@@ -4726,7 +4811,7 @@
             </a:ln>
             <a:extLst>
               <a:ext uri="{91240B29-F687-4f45-9708-019B960494DF}">
-                <a14:hiddenLine xmlns="" xmlns:a14="http://schemas.microsoft.com/office/drawing/2010/main" w="9525">
+                <a14:hiddenLine xmlns:a14="http://schemas.microsoft.com/office/drawing/2010/main" xmlns="" w="9525">
                   <a:solidFill>
                     <a:srgbClr val="000000"/>
                   </a:solidFill>
@@ -4816,7 +4901,7 @@
             </a:ln>
             <a:extLst>
               <a:ext uri="{91240B29-F687-4f45-9708-019B960494DF}">
-                <a14:hiddenLine xmlns="" xmlns:a14="http://schemas.microsoft.com/office/drawing/2010/main" w="9525">
+                <a14:hiddenLine xmlns:a14="http://schemas.microsoft.com/office/drawing/2010/main" xmlns="" w="9525">
                   <a:solidFill>
                     <a:srgbClr val="000000"/>
                   </a:solidFill>
@@ -4878,7 +4963,7 @@
             </a:ln>
             <a:extLst>
               <a:ext uri="{91240B29-F687-4f45-9708-019B960494DF}">
-                <a14:hiddenLine xmlns="" xmlns:a14="http://schemas.microsoft.com/office/drawing/2010/main" w="9525">
+                <a14:hiddenLine xmlns:a14="http://schemas.microsoft.com/office/drawing/2010/main" xmlns="" w="9525">
                   <a:solidFill>
                     <a:srgbClr val="000000"/>
                   </a:solidFill>
@@ -4988,7 +5073,7 @@
             </a:ln>
             <a:extLst>
               <a:ext uri="{91240B29-F687-4f45-9708-019B960494DF}">
-                <a14:hiddenLine xmlns="" xmlns:a14="http://schemas.microsoft.com/office/drawing/2010/main" w="9525">
+                <a14:hiddenLine xmlns:a14="http://schemas.microsoft.com/office/drawing/2010/main" xmlns="" w="9525">
                   <a:solidFill>
                     <a:srgbClr val="000000"/>
                   </a:solidFill>
@@ -5050,7 +5135,7 @@
             </a:ln>
             <a:extLst>
               <a:ext uri="{91240B29-F687-4f45-9708-019B960494DF}">
-                <a14:hiddenLine xmlns="" xmlns:a14="http://schemas.microsoft.com/office/drawing/2010/main" w="9525">
+                <a14:hiddenLine xmlns:a14="http://schemas.microsoft.com/office/drawing/2010/main" xmlns="" w="9525">
                   <a:solidFill>
                     <a:srgbClr val="000000"/>
                   </a:solidFill>
@@ -5140,7 +5225,7 @@
             </a:ln>
             <a:extLst>
               <a:ext uri="{91240B29-F687-4f45-9708-019B960494DF}">
-                <a14:hiddenLine xmlns="" xmlns:a14="http://schemas.microsoft.com/office/drawing/2010/main" w="9525">
+                <a14:hiddenLine xmlns:a14="http://schemas.microsoft.com/office/drawing/2010/main" xmlns="" w="9525">
                   <a:solidFill>
                     <a:srgbClr val="000000"/>
                   </a:solidFill>
@@ -5230,7 +5315,7 @@
             </a:ln>
             <a:extLst>
               <a:ext uri="{91240B29-F687-4f45-9708-019B960494DF}">
-                <a14:hiddenLine xmlns="" xmlns:a14="http://schemas.microsoft.com/office/drawing/2010/main" w="9525">
+                <a14:hiddenLine xmlns:a14="http://schemas.microsoft.com/office/drawing/2010/main" xmlns="" w="9525">
                   <a:solidFill>
                     <a:srgbClr val="000000"/>
                   </a:solidFill>
@@ -5292,7 +5377,7 @@
             </a:ln>
             <a:extLst>
               <a:ext uri="{91240B29-F687-4f45-9708-019B960494DF}">
-                <a14:hiddenLine xmlns="" xmlns:a14="http://schemas.microsoft.com/office/drawing/2010/main" w="9525">
+                <a14:hiddenLine xmlns:a14="http://schemas.microsoft.com/office/drawing/2010/main" xmlns="" w="9525">
                   <a:solidFill>
                     <a:srgbClr val="000000"/>
                   </a:solidFill>
@@ -5382,7 +5467,7 @@
             </a:ln>
             <a:extLst>
               <a:ext uri="{91240B29-F687-4f45-9708-019B960494DF}">
-                <a14:hiddenLine xmlns="" xmlns:a14="http://schemas.microsoft.com/office/drawing/2010/main" w="9525">
+                <a14:hiddenLine xmlns:a14="http://schemas.microsoft.com/office/drawing/2010/main" xmlns="" w="9525">
                   <a:solidFill>
                     <a:srgbClr val="000000"/>
                   </a:solidFill>
@@ -5472,7 +5557,7 @@
             </a:ln>
             <a:extLst>
               <a:ext uri="{91240B29-F687-4f45-9708-019B960494DF}">
-                <a14:hiddenLine xmlns="" xmlns:a14="http://schemas.microsoft.com/office/drawing/2010/main" w="9525">
+                <a14:hiddenLine xmlns:a14="http://schemas.microsoft.com/office/drawing/2010/main" xmlns="" w="9525">
                   <a:solidFill>
                     <a:srgbClr val="000000"/>
                   </a:solidFill>
@@ -5528,7 +5613,7 @@
             </a:ln>
             <a:extLst>
               <a:ext uri="{91240B29-F687-4f45-9708-019B960494DF}">
-                <a14:hiddenLine xmlns="" xmlns:a14="http://schemas.microsoft.com/office/drawing/2010/main" w="9525">
+                <a14:hiddenLine xmlns:a14="http://schemas.microsoft.com/office/drawing/2010/main" xmlns="" w="9525">
                   <a:solidFill>
                     <a:srgbClr val="000000"/>
                   </a:solidFill>
@@ -5618,7 +5703,7 @@
             </a:ln>
             <a:extLst>
               <a:ext uri="{91240B29-F687-4f45-9708-019B960494DF}">
-                <a14:hiddenLine xmlns="" xmlns:a14="http://schemas.microsoft.com/office/drawing/2010/main" w="9525">
+                <a14:hiddenLine xmlns:a14="http://schemas.microsoft.com/office/drawing/2010/main" xmlns="" w="9525">
                   <a:solidFill>
                     <a:srgbClr val="000000"/>
                   </a:solidFill>
@@ -5674,7 +5759,7 @@
             </a:ln>
             <a:extLst>
               <a:ext uri="{91240B29-F687-4f45-9708-019B960494DF}">
-                <a14:hiddenLine xmlns="" xmlns:a14="http://schemas.microsoft.com/office/drawing/2010/main" w="9525">
+                <a14:hiddenLine xmlns:a14="http://schemas.microsoft.com/office/drawing/2010/main" xmlns="" w="9525">
                   <a:solidFill>
                     <a:srgbClr val="000000"/>
                   </a:solidFill>
@@ -5764,7 +5849,7 @@
             </a:ln>
             <a:extLst>
               <a:ext uri="{91240B29-F687-4f45-9708-019B960494DF}">
-                <a14:hiddenLine xmlns="" xmlns:a14="http://schemas.microsoft.com/office/drawing/2010/main" w="9525">
+                <a14:hiddenLine xmlns:a14="http://schemas.microsoft.com/office/drawing/2010/main" xmlns="" w="9525">
                   <a:solidFill>
                     <a:srgbClr val="000000"/>
                   </a:solidFill>
@@ -5832,7 +5917,7 @@
             </a:ln>
             <a:extLst>
               <a:ext uri="{91240B29-F687-4f45-9708-019B960494DF}">
-                <a14:hiddenLine xmlns="" xmlns:a14="http://schemas.microsoft.com/office/drawing/2010/main" w="9525">
+                <a14:hiddenLine xmlns:a14="http://schemas.microsoft.com/office/drawing/2010/main" xmlns="" w="9525">
                   <a:solidFill>
                     <a:srgbClr val="000000"/>
                   </a:solidFill>
@@ -5922,7 +6007,7 @@
             </a:ln>
             <a:extLst>
               <a:ext uri="{91240B29-F687-4f45-9708-019B960494DF}">
-                <a14:hiddenLine xmlns="" xmlns:a14="http://schemas.microsoft.com/office/drawing/2010/main" w="9525">
+                <a14:hiddenLine xmlns:a14="http://schemas.microsoft.com/office/drawing/2010/main" xmlns="" w="9525">
                   <a:solidFill>
                     <a:srgbClr val="000000"/>
                   </a:solidFill>
@@ -5990,7 +6075,7 @@
             </a:ln>
             <a:extLst>
               <a:ext uri="{91240B29-F687-4f45-9708-019B960494DF}">
-                <a14:hiddenLine xmlns="" xmlns:a14="http://schemas.microsoft.com/office/drawing/2010/main" w="9525">
+                <a14:hiddenLine xmlns:a14="http://schemas.microsoft.com/office/drawing/2010/main" xmlns="" w="9525">
                   <a:solidFill>
                     <a:srgbClr val="000000"/>
                   </a:solidFill>
@@ -6080,7 +6165,7 @@
             </a:ln>
             <a:extLst>
               <a:ext uri="{91240B29-F687-4f45-9708-019B960494DF}">
-                <a14:hiddenLine xmlns="" xmlns:a14="http://schemas.microsoft.com/office/drawing/2010/main" w="9525">
+                <a14:hiddenLine xmlns:a14="http://schemas.microsoft.com/office/drawing/2010/main" xmlns="" w="9525">
                   <a:solidFill>
                     <a:srgbClr val="000000"/>
                   </a:solidFill>
@@ -6114,7 +6199,7 @@
             </a:ln>
             <a:extLst>
               <a:ext uri="{91240B29-F687-4f45-9708-019B960494DF}">
-                <a14:hiddenLine xmlns="" xmlns:a14="http://schemas.microsoft.com/office/drawing/2010/main" w="9525">
+                <a14:hiddenLine xmlns:a14="http://schemas.microsoft.com/office/drawing/2010/main" xmlns="" w="9525">
                   <a:solidFill>
                     <a:srgbClr val="000000"/>
                   </a:solidFill>
@@ -6204,7 +6289,7 @@
             </a:ln>
             <a:extLst>
               <a:ext uri="{91240B29-F687-4f45-9708-019B960494DF}">
-                <a14:hiddenLine xmlns="" xmlns:a14="http://schemas.microsoft.com/office/drawing/2010/main" w="9525">
+                <a14:hiddenLine xmlns:a14="http://schemas.microsoft.com/office/drawing/2010/main" xmlns="" w="9525">
                   <a:solidFill>
                     <a:srgbClr val="000000"/>
                   </a:solidFill>
@@ -6266,7 +6351,7 @@
             </a:ln>
             <a:extLst>
               <a:ext uri="{91240B29-F687-4f45-9708-019B960494DF}">
-                <a14:hiddenLine xmlns="" xmlns:a14="http://schemas.microsoft.com/office/drawing/2010/main" w="9525">
+                <a14:hiddenLine xmlns:a14="http://schemas.microsoft.com/office/drawing/2010/main" xmlns="" w="9525">
                   <a:solidFill>
                     <a:srgbClr val="000000"/>
                   </a:solidFill>
@@ -6328,7 +6413,7 @@
             </a:ln>
             <a:extLst>
               <a:ext uri="{91240B29-F687-4f45-9708-019B960494DF}">
-                <a14:hiddenLine xmlns="" xmlns:a14="http://schemas.microsoft.com/office/drawing/2010/main" w="9525">
+                <a14:hiddenLine xmlns:a14="http://schemas.microsoft.com/office/drawing/2010/main" xmlns="" w="9525">
                   <a:solidFill>
                     <a:srgbClr val="000000"/>
                   </a:solidFill>
@@ -6418,7 +6503,7 @@
             </a:ln>
             <a:extLst>
               <a:ext uri="{91240B29-F687-4f45-9708-019B960494DF}">
-                <a14:hiddenLine xmlns="" xmlns:a14="http://schemas.microsoft.com/office/drawing/2010/main" w="9525">
+                <a14:hiddenLine xmlns:a14="http://schemas.microsoft.com/office/drawing/2010/main" xmlns="" w="9525">
                   <a:solidFill>
                     <a:srgbClr val="000000"/>
                   </a:solidFill>
@@ -6486,7 +6571,7 @@
             </a:ln>
             <a:extLst>
               <a:ext uri="{91240B29-F687-4f45-9708-019B960494DF}">
-                <a14:hiddenLine xmlns="" xmlns:a14="http://schemas.microsoft.com/office/drawing/2010/main" w="9525">
+                <a14:hiddenLine xmlns:a14="http://schemas.microsoft.com/office/drawing/2010/main" xmlns="" w="9525">
                   <a:solidFill>
                     <a:srgbClr val="000000"/>
                   </a:solidFill>
@@ -6548,7 +6633,7 @@
             </a:ln>
             <a:extLst>
               <a:ext uri="{91240B29-F687-4f45-9708-019B960494DF}">
-                <a14:hiddenLine xmlns="" xmlns:a14="http://schemas.microsoft.com/office/drawing/2010/main" w="9525">
+                <a14:hiddenLine xmlns:a14="http://schemas.microsoft.com/office/drawing/2010/main" xmlns="" w="9525">
                   <a:solidFill>
                     <a:srgbClr val="000000"/>
                   </a:solidFill>
@@ -6638,7 +6723,7 @@
             </a:ln>
             <a:extLst>
               <a:ext uri="{91240B29-F687-4f45-9708-019B960494DF}">
-                <a14:hiddenLine xmlns="" xmlns:a14="http://schemas.microsoft.com/office/drawing/2010/main" w="9525">
+                <a14:hiddenLine xmlns:a14="http://schemas.microsoft.com/office/drawing/2010/main" xmlns="" w="9525">
                   <a:solidFill>
                     <a:srgbClr val="000000"/>
                   </a:solidFill>
@@ -6700,7 +6785,7 @@
             </a:ln>
             <a:extLst>
               <a:ext uri="{91240B29-F687-4f45-9708-019B960494DF}">
-                <a14:hiddenLine xmlns="" xmlns:a14="http://schemas.microsoft.com/office/drawing/2010/main" w="9525">
+                <a14:hiddenLine xmlns:a14="http://schemas.microsoft.com/office/drawing/2010/main" xmlns="" w="9525">
                   <a:solidFill>
                     <a:srgbClr val="000000"/>
                   </a:solidFill>
@@ -6790,7 +6875,7 @@
             </a:ln>
             <a:extLst>
               <a:ext uri="{91240B29-F687-4f45-9708-019B960494DF}">
-                <a14:hiddenLine xmlns="" xmlns:a14="http://schemas.microsoft.com/office/drawing/2010/main" w="9525">
+                <a14:hiddenLine xmlns:a14="http://schemas.microsoft.com/office/drawing/2010/main" xmlns="" w="9525">
                   <a:solidFill>
                     <a:srgbClr val="000000"/>
                   </a:solidFill>
@@ -6852,7 +6937,7 @@
             </a:ln>
             <a:extLst>
               <a:ext uri="{91240B29-F687-4f45-9708-019B960494DF}">
-                <a14:hiddenLine xmlns="" xmlns:a14="http://schemas.microsoft.com/office/drawing/2010/main" w="9525">
+                <a14:hiddenLine xmlns:a14="http://schemas.microsoft.com/office/drawing/2010/main" xmlns="" w="9525">
                   <a:solidFill>
                     <a:srgbClr val="000000"/>
                   </a:solidFill>
@@ -6942,7 +7027,7 @@
             </a:ln>
             <a:extLst>
               <a:ext uri="{91240B29-F687-4f45-9708-019B960494DF}">
-                <a14:hiddenLine xmlns="" xmlns:a14="http://schemas.microsoft.com/office/drawing/2010/main" w="9525">
+                <a14:hiddenLine xmlns:a14="http://schemas.microsoft.com/office/drawing/2010/main" xmlns="" w="9525">
                   <a:solidFill>
                     <a:srgbClr val="000000"/>
                   </a:solidFill>
@@ -6976,7 +7061,7 @@
             </a:ln>
             <a:extLst>
               <a:ext uri="{91240B29-F687-4f45-9708-019B960494DF}">
-                <a14:hiddenLine xmlns="" xmlns:a14="http://schemas.microsoft.com/office/drawing/2010/main" w="9525">
+                <a14:hiddenLine xmlns:a14="http://schemas.microsoft.com/office/drawing/2010/main" xmlns="" w="9525">
                   <a:solidFill>
                     <a:srgbClr val="000000"/>
                   </a:solidFill>
@@ -7041,7 +7126,7 @@
             </a:ln>
             <a:extLst>
               <a:ext uri="{91240B29-F687-4f45-9708-019B960494DF}">
-                <a14:hiddenLine xmlns="" xmlns:a14="http://schemas.microsoft.com/office/drawing/2010/main" w="9525">
+                <a14:hiddenLine xmlns:a14="http://schemas.microsoft.com/office/drawing/2010/main" xmlns="" w="9525">
                   <a:solidFill>
                     <a:srgbClr val="000000"/>
                   </a:solidFill>
@@ -7131,7 +7216,7 @@
             </a:ln>
             <a:extLst>
               <a:ext uri="{91240B29-F687-4f45-9708-019B960494DF}">
-                <a14:hiddenLine xmlns="" xmlns:a14="http://schemas.microsoft.com/office/drawing/2010/main" w="9525">
+                <a14:hiddenLine xmlns:a14="http://schemas.microsoft.com/office/drawing/2010/main" xmlns="" w="9525">
                   <a:solidFill>
                     <a:srgbClr val="000000"/>
                   </a:solidFill>
@@ -7193,7 +7278,7 @@
             </a:ln>
             <a:extLst>
               <a:ext uri="{91240B29-F687-4f45-9708-019B960494DF}">
-                <a14:hiddenLine xmlns="" xmlns:a14="http://schemas.microsoft.com/office/drawing/2010/main" w="9525">
+                <a14:hiddenLine xmlns:a14="http://schemas.microsoft.com/office/drawing/2010/main" xmlns="" w="9525">
                   <a:solidFill>
                     <a:srgbClr val="000000"/>
                   </a:solidFill>
@@ -7283,7 +7368,7 @@
             </a:ln>
             <a:extLst>
               <a:ext uri="{91240B29-F687-4f45-9708-019B960494DF}">
-                <a14:hiddenLine xmlns="" xmlns:a14="http://schemas.microsoft.com/office/drawing/2010/main" w="9525">
+                <a14:hiddenLine xmlns:a14="http://schemas.microsoft.com/office/drawing/2010/main" xmlns="" w="9525">
                   <a:solidFill>
                     <a:srgbClr val="000000"/>
                   </a:solidFill>
@@ -7373,7 +7458,7 @@
             </a:ln>
             <a:extLst>
               <a:ext uri="{91240B29-F687-4f45-9708-019B960494DF}">
-                <a14:hiddenLine xmlns="" xmlns:a14="http://schemas.microsoft.com/office/drawing/2010/main" w="9525">
+                <a14:hiddenLine xmlns:a14="http://schemas.microsoft.com/office/drawing/2010/main" xmlns="" w="9525">
                   <a:solidFill>
                     <a:srgbClr val="000000"/>
                   </a:solidFill>
@@ -7438,7 +7523,7 @@
             </a:ln>
             <a:extLst>
               <a:ext uri="{91240B29-F687-4f45-9708-019B960494DF}">
-                <a14:hiddenLine xmlns="" xmlns:a14="http://schemas.microsoft.com/office/drawing/2010/main" w="9525">
+                <a14:hiddenLine xmlns:a14="http://schemas.microsoft.com/office/drawing/2010/main" xmlns="" w="9525">
                   <a:solidFill>
                     <a:srgbClr val="000000"/>
                   </a:solidFill>
@@ -7500,7 +7585,7 @@
             </a:ln>
             <a:extLst>
               <a:ext uri="{91240B29-F687-4f45-9708-019B960494DF}">
-                <a14:hiddenLine xmlns="" xmlns:a14="http://schemas.microsoft.com/office/drawing/2010/main" w="9525">
+                <a14:hiddenLine xmlns:a14="http://schemas.microsoft.com/office/drawing/2010/main" xmlns="" w="9525">
                   <a:solidFill>
                     <a:srgbClr val="000000"/>
                   </a:solidFill>
@@ -7590,7 +7675,7 @@
             </a:ln>
             <a:extLst>
               <a:ext uri="{91240B29-F687-4f45-9708-019B960494DF}">
-                <a14:hiddenLine xmlns="" xmlns:a14="http://schemas.microsoft.com/office/drawing/2010/main" w="9525">
+                <a14:hiddenLine xmlns:a14="http://schemas.microsoft.com/office/drawing/2010/main" xmlns="" w="9525">
                   <a:solidFill>
                     <a:srgbClr val="000000"/>
                   </a:solidFill>
@@ -7680,7 +7765,7 @@
             </a:ln>
             <a:extLst>
               <a:ext uri="{91240B29-F687-4f45-9708-019B960494DF}">
-                <a14:hiddenLine xmlns="" xmlns:a14="http://schemas.microsoft.com/office/drawing/2010/main" w="9525">
+                <a14:hiddenLine xmlns:a14="http://schemas.microsoft.com/office/drawing/2010/main" xmlns="" w="9525">
                   <a:solidFill>
                     <a:srgbClr val="000000"/>
                   </a:solidFill>
@@ -7742,7 +7827,7 @@
             </a:ln>
             <a:extLst>
               <a:ext uri="{91240B29-F687-4f45-9708-019B960494DF}">
-                <a14:hiddenLine xmlns="" xmlns:a14="http://schemas.microsoft.com/office/drawing/2010/main" w="9525">
+                <a14:hiddenLine xmlns:a14="http://schemas.microsoft.com/office/drawing/2010/main" xmlns="" w="9525">
                   <a:solidFill>
                     <a:srgbClr val="000000"/>
                   </a:solidFill>
@@ -7862,7 +7947,7 @@
             </a:ln>
             <a:extLst>
               <a:ext uri="{91240B29-F687-4f45-9708-019B960494DF}">
-                <a14:hiddenLine xmlns="" xmlns:a14="http://schemas.microsoft.com/office/drawing/2010/main" w="9525">
+                <a14:hiddenLine xmlns:a14="http://schemas.microsoft.com/office/drawing/2010/main" xmlns="" w="9525">
                   <a:solidFill>
                     <a:srgbClr val="000000"/>
                   </a:solidFill>
@@ -7930,7 +8015,7 @@
             </a:ln>
             <a:extLst>
               <a:ext uri="{91240B29-F687-4f45-9708-019B960494DF}">
-                <a14:hiddenLine xmlns="" xmlns:a14="http://schemas.microsoft.com/office/drawing/2010/main" w="9525">
+                <a14:hiddenLine xmlns:a14="http://schemas.microsoft.com/office/drawing/2010/main" xmlns="" w="9525">
                   <a:solidFill>
                     <a:srgbClr val="000000"/>
                   </a:solidFill>
@@ -8020,7 +8105,7 @@
             </a:ln>
             <a:extLst>
               <a:ext uri="{91240B29-F687-4f45-9708-019B960494DF}">
-                <a14:hiddenLine xmlns="" xmlns:a14="http://schemas.microsoft.com/office/drawing/2010/main" w="9525">
+                <a14:hiddenLine xmlns:a14="http://schemas.microsoft.com/office/drawing/2010/main" xmlns="" w="9525">
                   <a:solidFill>
                     <a:srgbClr val="000000"/>
                   </a:solidFill>
@@ -12827,7 +12912,7 @@
           <a:noFill/>
           <a:extLst>
             <a:ext uri="{909E8E84-426E-40dd-AFC4-6F175D3DCCD1}">
-              <a14:hiddenFill xmlns="" xmlns:a14="http://schemas.microsoft.com/office/drawing/2010/main">
+              <a14:hiddenFill xmlns:a14="http://schemas.microsoft.com/office/drawing/2010/main" xmlns="">
                 <a:solidFill>
                   <a:srgbClr val="FFFFFF"/>
                 </a:solidFill>
@@ -12901,7 +12986,7 @@
               </a:ln>
               <a:extLst>
                 <a:ext uri="{91240B29-F687-4f45-9708-019B960494DF}">
-                  <a14:hiddenLine xmlns="" xmlns:a14="http://schemas.microsoft.com/office/drawing/2010/main" w="9525">
+                  <a14:hiddenLine xmlns:a14="http://schemas.microsoft.com/office/drawing/2010/main" xmlns="" w="9525">
                     <a:solidFill>
                       <a:srgbClr val="000000"/>
                     </a:solidFill>
@@ -12991,7 +13076,7 @@
               </a:ln>
               <a:extLst>
                 <a:ext uri="{91240B29-F687-4f45-9708-019B960494DF}">
-                  <a14:hiddenLine xmlns="" xmlns:a14="http://schemas.microsoft.com/office/drawing/2010/main" w="9525">
+                  <a14:hiddenLine xmlns:a14="http://schemas.microsoft.com/office/drawing/2010/main" xmlns="" w="9525">
                     <a:solidFill>
                       <a:srgbClr val="000000"/>
                     </a:solidFill>
@@ -13081,7 +13166,7 @@
               </a:ln>
               <a:extLst>
                 <a:ext uri="{91240B29-F687-4f45-9708-019B960494DF}">
-                  <a14:hiddenLine xmlns="" xmlns:a14="http://schemas.microsoft.com/office/drawing/2010/main" w="9525">
+                  <a14:hiddenLine xmlns:a14="http://schemas.microsoft.com/office/drawing/2010/main" xmlns="" w="9525">
                     <a:solidFill>
                       <a:srgbClr val="000000"/>
                     </a:solidFill>
@@ -13143,7 +13228,7 @@
               </a:ln>
               <a:extLst>
                 <a:ext uri="{91240B29-F687-4f45-9708-019B960494DF}">
-                  <a14:hiddenLine xmlns="" xmlns:a14="http://schemas.microsoft.com/office/drawing/2010/main" w="9525">
+                  <a14:hiddenLine xmlns:a14="http://schemas.microsoft.com/office/drawing/2010/main" xmlns="" w="9525">
                     <a:solidFill>
                       <a:srgbClr val="000000"/>
                     </a:solidFill>
@@ -13233,7 +13318,7 @@
               </a:ln>
               <a:extLst>
                 <a:ext uri="{91240B29-F687-4f45-9708-019B960494DF}">
-                  <a14:hiddenLine xmlns="" xmlns:a14="http://schemas.microsoft.com/office/drawing/2010/main" w="9525">
+                  <a14:hiddenLine xmlns:a14="http://schemas.microsoft.com/office/drawing/2010/main" xmlns="" w="9525">
                     <a:solidFill>
                       <a:srgbClr val="000000"/>
                     </a:solidFill>
@@ -13295,7 +13380,7 @@
               </a:ln>
               <a:extLst>
                 <a:ext uri="{91240B29-F687-4f45-9708-019B960494DF}">
-                  <a14:hiddenLine xmlns="" xmlns:a14="http://schemas.microsoft.com/office/drawing/2010/main" w="9525">
+                  <a14:hiddenLine xmlns:a14="http://schemas.microsoft.com/office/drawing/2010/main" xmlns="" w="9525">
                     <a:solidFill>
                       <a:srgbClr val="000000"/>
                     </a:solidFill>
@@ -13357,7 +13442,7 @@
               </a:ln>
               <a:extLst>
                 <a:ext uri="{91240B29-F687-4f45-9708-019B960494DF}">
-                  <a14:hiddenLine xmlns="" xmlns:a14="http://schemas.microsoft.com/office/drawing/2010/main" w="9525">
+                  <a14:hiddenLine xmlns:a14="http://schemas.microsoft.com/office/drawing/2010/main" xmlns="" w="9525">
                     <a:solidFill>
                       <a:srgbClr val="000000"/>
                     </a:solidFill>
@@ -13447,7 +13532,7 @@
               </a:ln>
               <a:extLst>
                 <a:ext uri="{91240B29-F687-4f45-9708-019B960494DF}">
-                  <a14:hiddenLine xmlns="" xmlns:a14="http://schemas.microsoft.com/office/drawing/2010/main" w="9525">
+                  <a14:hiddenLine xmlns:a14="http://schemas.microsoft.com/office/drawing/2010/main" xmlns="" w="9525">
                     <a:solidFill>
                       <a:srgbClr val="000000"/>
                     </a:solidFill>
@@ -13537,7 +13622,7 @@
               </a:ln>
               <a:extLst>
                 <a:ext uri="{91240B29-F687-4f45-9708-019B960494DF}">
-                  <a14:hiddenLine xmlns="" xmlns:a14="http://schemas.microsoft.com/office/drawing/2010/main" w="9525">
+                  <a14:hiddenLine xmlns:a14="http://schemas.microsoft.com/office/drawing/2010/main" xmlns="" w="9525">
                     <a:solidFill>
                       <a:srgbClr val="000000"/>
                     </a:solidFill>
@@ -13599,7 +13684,7 @@
               </a:ln>
               <a:extLst>
                 <a:ext uri="{91240B29-F687-4f45-9708-019B960494DF}">
-                  <a14:hiddenLine xmlns="" xmlns:a14="http://schemas.microsoft.com/office/drawing/2010/main" w="9525">
+                  <a14:hiddenLine xmlns:a14="http://schemas.microsoft.com/office/drawing/2010/main" xmlns="" w="9525">
                     <a:solidFill>
                       <a:srgbClr val="000000"/>
                     </a:solidFill>
@@ -13709,7 +13794,7 @@
               </a:ln>
               <a:extLst>
                 <a:ext uri="{91240B29-F687-4f45-9708-019B960494DF}">
-                  <a14:hiddenLine xmlns="" xmlns:a14="http://schemas.microsoft.com/office/drawing/2010/main" w="9525">
+                  <a14:hiddenLine xmlns:a14="http://schemas.microsoft.com/office/drawing/2010/main" xmlns="" w="9525">
                     <a:solidFill>
                       <a:srgbClr val="000000"/>
                     </a:solidFill>
@@ -13793,7 +13878,7 @@
               </a:ln>
               <a:extLst>
                 <a:ext uri="{91240B29-F687-4f45-9708-019B960494DF}">
-                  <a14:hiddenLine xmlns="" xmlns:a14="http://schemas.microsoft.com/office/drawing/2010/main" w="9525">
+                  <a14:hiddenLine xmlns:a14="http://schemas.microsoft.com/office/drawing/2010/main" xmlns="" w="9525">
                     <a:solidFill>
                       <a:srgbClr val="000000"/>
                     </a:solidFill>
@@ -13855,7 +13940,7 @@
               </a:ln>
               <a:extLst>
                 <a:ext uri="{91240B29-F687-4f45-9708-019B960494DF}">
-                  <a14:hiddenLine xmlns="" xmlns:a14="http://schemas.microsoft.com/office/drawing/2010/main" w="9525">
+                  <a14:hiddenLine xmlns:a14="http://schemas.microsoft.com/office/drawing/2010/main" xmlns="" w="9525">
                     <a:solidFill>
                       <a:srgbClr val="000000"/>
                     </a:solidFill>
@@ -13917,7 +14002,7 @@
               </a:ln>
               <a:extLst>
                 <a:ext uri="{91240B29-F687-4f45-9708-019B960494DF}">
-                  <a14:hiddenLine xmlns="" xmlns:a14="http://schemas.microsoft.com/office/drawing/2010/main" w="9525">
+                  <a14:hiddenLine xmlns:a14="http://schemas.microsoft.com/office/drawing/2010/main" xmlns="" w="9525">
                     <a:solidFill>
                       <a:srgbClr val="000000"/>
                     </a:solidFill>
@@ -14007,7 +14092,7 @@
               </a:ln>
               <a:extLst>
                 <a:ext uri="{91240B29-F687-4f45-9708-019B960494DF}">
-                  <a14:hiddenLine xmlns="" xmlns:a14="http://schemas.microsoft.com/office/drawing/2010/main" w="9525">
+                  <a14:hiddenLine xmlns:a14="http://schemas.microsoft.com/office/drawing/2010/main" xmlns="" w="9525">
                     <a:solidFill>
                       <a:srgbClr val="000000"/>
                     </a:solidFill>
@@ -14041,7 +14126,7 @@
               </a:ln>
               <a:extLst>
                 <a:ext uri="{91240B29-F687-4f45-9708-019B960494DF}">
-                  <a14:hiddenLine xmlns="" xmlns:a14="http://schemas.microsoft.com/office/drawing/2010/main" w="9525">
+                  <a14:hiddenLine xmlns:a14="http://schemas.microsoft.com/office/drawing/2010/main" xmlns="" w="9525">
                     <a:solidFill>
                       <a:srgbClr val="000000"/>
                     </a:solidFill>
@@ -14106,7 +14191,7 @@
               </a:ln>
               <a:extLst>
                 <a:ext uri="{91240B29-F687-4f45-9708-019B960494DF}">
-                  <a14:hiddenLine xmlns="" xmlns:a14="http://schemas.microsoft.com/office/drawing/2010/main" w="9525">
+                  <a14:hiddenLine xmlns:a14="http://schemas.microsoft.com/office/drawing/2010/main" xmlns="" w="9525">
                     <a:solidFill>
                       <a:srgbClr val="000000"/>
                     </a:solidFill>
@@ -14196,7 +14281,7 @@
               </a:ln>
               <a:extLst>
                 <a:ext uri="{91240B29-F687-4f45-9708-019B960494DF}">
-                  <a14:hiddenLine xmlns="" xmlns:a14="http://schemas.microsoft.com/office/drawing/2010/main" w="9525">
+                  <a14:hiddenLine xmlns:a14="http://schemas.microsoft.com/office/drawing/2010/main" xmlns="" w="9525">
                     <a:solidFill>
                       <a:srgbClr val="000000"/>
                     </a:solidFill>
@@ -14258,7 +14343,7 @@
               </a:ln>
               <a:extLst>
                 <a:ext uri="{91240B29-F687-4f45-9708-019B960494DF}">
-                  <a14:hiddenLine xmlns="" xmlns:a14="http://schemas.microsoft.com/office/drawing/2010/main" w="9525">
+                  <a14:hiddenLine xmlns:a14="http://schemas.microsoft.com/office/drawing/2010/main" xmlns="" w="9525">
                     <a:solidFill>
                       <a:srgbClr val="000000"/>
                     </a:solidFill>
@@ -14348,7 +14433,7 @@
               </a:ln>
               <a:extLst>
                 <a:ext uri="{91240B29-F687-4f45-9708-019B960494DF}">
-                  <a14:hiddenLine xmlns="" xmlns:a14="http://schemas.microsoft.com/office/drawing/2010/main" w="9525">
+                  <a14:hiddenLine xmlns:a14="http://schemas.microsoft.com/office/drawing/2010/main" xmlns="" w="9525">
                     <a:solidFill>
                       <a:srgbClr val="000000"/>
                     </a:solidFill>
@@ -14413,7 +14498,7 @@
               </a:ln>
               <a:extLst>
                 <a:ext uri="{91240B29-F687-4f45-9708-019B960494DF}">
-                  <a14:hiddenLine xmlns="" xmlns:a14="http://schemas.microsoft.com/office/drawing/2010/main" w="9525">
+                  <a14:hiddenLine xmlns:a14="http://schemas.microsoft.com/office/drawing/2010/main" xmlns="" w="9525">
                     <a:solidFill>
                       <a:srgbClr val="000000"/>
                     </a:solidFill>
@@ -14475,7 +14560,7 @@
               </a:ln>
               <a:extLst>
                 <a:ext uri="{91240B29-F687-4f45-9708-019B960494DF}">
-                  <a14:hiddenLine xmlns="" xmlns:a14="http://schemas.microsoft.com/office/drawing/2010/main" w="9525">
+                  <a14:hiddenLine xmlns:a14="http://schemas.microsoft.com/office/drawing/2010/main" xmlns="" w="9525">
                     <a:solidFill>
                       <a:srgbClr val="000000"/>
                     </a:solidFill>
@@ -14565,7 +14650,7 @@
               </a:ln>
               <a:extLst>
                 <a:ext uri="{91240B29-F687-4f45-9708-019B960494DF}">
-                  <a14:hiddenLine xmlns="" xmlns:a14="http://schemas.microsoft.com/office/drawing/2010/main" w="9525">
+                  <a14:hiddenLine xmlns:a14="http://schemas.microsoft.com/office/drawing/2010/main" xmlns="" w="9525">
                     <a:solidFill>
                       <a:srgbClr val="000000"/>
                     </a:solidFill>
@@ -14655,7 +14740,7 @@
               </a:ln>
               <a:extLst>
                 <a:ext uri="{91240B29-F687-4f45-9708-019B960494DF}">
-                  <a14:hiddenLine xmlns="" xmlns:a14="http://schemas.microsoft.com/office/drawing/2010/main" w="9525">
+                  <a14:hiddenLine xmlns:a14="http://schemas.microsoft.com/office/drawing/2010/main" xmlns="" w="9525">
                     <a:solidFill>
                       <a:srgbClr val="000000"/>
                     </a:solidFill>
@@ -14720,7 +14805,7 @@
               </a:ln>
               <a:extLst>
                 <a:ext uri="{91240B29-F687-4f45-9708-019B960494DF}">
-                  <a14:hiddenLine xmlns="" xmlns:a14="http://schemas.microsoft.com/office/drawing/2010/main" w="9525">
+                  <a14:hiddenLine xmlns:a14="http://schemas.microsoft.com/office/drawing/2010/main" xmlns="" w="9525">
                     <a:solidFill>
                       <a:srgbClr val="000000"/>
                     </a:solidFill>
@@ -14840,7 +14925,7 @@
               </a:ln>
               <a:extLst>
                 <a:ext uri="{91240B29-F687-4f45-9708-019B960494DF}">
-                  <a14:hiddenLine xmlns="" xmlns:a14="http://schemas.microsoft.com/office/drawing/2010/main" w="9525">
+                  <a14:hiddenLine xmlns:a14="http://schemas.microsoft.com/office/drawing/2010/main" xmlns="" w="9525">
                     <a:solidFill>
                       <a:srgbClr val="000000"/>
                     </a:solidFill>
@@ -14938,7 +15023,7 @@
               </a:ln>
               <a:extLst>
                 <a:ext uri="{91240B29-F687-4f45-9708-019B960494DF}">
-                  <a14:hiddenLine xmlns="" xmlns:a14="http://schemas.microsoft.com/office/drawing/2010/main" w="9525">
+                  <a14:hiddenLine xmlns:a14="http://schemas.microsoft.com/office/drawing/2010/main" xmlns="" w="9525">
                     <a:solidFill>
                       <a:srgbClr val="000000"/>
                     </a:solidFill>
@@ -15053,7 +15138,7 @@
               </a:ln>
               <a:extLst>
                 <a:ext uri="{91240B29-F687-4f45-9708-019B960494DF}">
-                  <a14:hiddenLine xmlns="" xmlns:a14="http://schemas.microsoft.com/office/drawing/2010/main" w="9525">
+                  <a14:hiddenLine xmlns:a14="http://schemas.microsoft.com/office/drawing/2010/main" xmlns="" w="9525">
                     <a:solidFill>
                       <a:srgbClr val="000000"/>
                     </a:solidFill>
@@ -15143,7 +15228,7 @@
               </a:ln>
               <a:extLst>
                 <a:ext uri="{91240B29-F687-4f45-9708-019B960494DF}">
-                  <a14:hiddenLine xmlns="" xmlns:a14="http://schemas.microsoft.com/office/drawing/2010/main" w="9525">
+                  <a14:hiddenLine xmlns:a14="http://schemas.microsoft.com/office/drawing/2010/main" xmlns="" w="9525">
                     <a:solidFill>
                       <a:srgbClr val="000000"/>
                     </a:solidFill>
@@ -15208,7 +15293,7 @@
               </a:ln>
               <a:extLst>
                 <a:ext uri="{91240B29-F687-4f45-9708-019B960494DF}">
-                  <a14:hiddenLine xmlns="" xmlns:a14="http://schemas.microsoft.com/office/drawing/2010/main" w="9525">
+                  <a14:hiddenLine xmlns:a14="http://schemas.microsoft.com/office/drawing/2010/main" xmlns="" w="9525">
                     <a:solidFill>
                       <a:srgbClr val="000000"/>
                     </a:solidFill>
@@ -15298,7 +15383,7 @@
               </a:ln>
               <a:extLst>
                 <a:ext uri="{91240B29-F687-4f45-9708-019B960494DF}">
-                  <a14:hiddenLine xmlns="" xmlns:a14="http://schemas.microsoft.com/office/drawing/2010/main" w="9525">
+                  <a14:hiddenLine xmlns:a14="http://schemas.microsoft.com/office/drawing/2010/main" xmlns="" w="9525">
                     <a:solidFill>
                       <a:srgbClr val="000000"/>
                     </a:solidFill>
@@ -15366,7 +15451,7 @@
               </a:ln>
               <a:extLst>
                 <a:ext uri="{91240B29-F687-4f45-9708-019B960494DF}">
-                  <a14:hiddenLine xmlns="" xmlns:a14="http://schemas.microsoft.com/office/drawing/2010/main" w="9525">
+                  <a14:hiddenLine xmlns:a14="http://schemas.microsoft.com/office/drawing/2010/main" xmlns="" w="9525">
                     <a:solidFill>
                       <a:srgbClr val="000000"/>
                     </a:solidFill>
@@ -15456,7 +15541,7 @@
               </a:ln>
               <a:extLst>
                 <a:ext uri="{91240B29-F687-4f45-9708-019B960494DF}">
-                  <a14:hiddenLine xmlns="" xmlns:a14="http://schemas.microsoft.com/office/drawing/2010/main" w="9525">
+                  <a14:hiddenLine xmlns:a14="http://schemas.microsoft.com/office/drawing/2010/main" xmlns="" w="9525">
                     <a:solidFill>
                       <a:srgbClr val="000000"/>
                     </a:solidFill>
@@ -15524,7 +15609,7 @@
               </a:ln>
               <a:extLst>
                 <a:ext uri="{91240B29-F687-4f45-9708-019B960494DF}">
-                  <a14:hiddenLine xmlns="" xmlns:a14="http://schemas.microsoft.com/office/drawing/2010/main" w="9525">
+                  <a14:hiddenLine xmlns:a14="http://schemas.microsoft.com/office/drawing/2010/main" xmlns="" w="9525">
                     <a:solidFill>
                       <a:srgbClr val="000000"/>
                     </a:solidFill>
@@ -15614,7 +15699,7 @@
               </a:ln>
               <a:extLst>
                 <a:ext uri="{91240B29-F687-4f45-9708-019B960494DF}">
-                  <a14:hiddenLine xmlns="" xmlns:a14="http://schemas.microsoft.com/office/drawing/2010/main" w="9525">
+                  <a14:hiddenLine xmlns:a14="http://schemas.microsoft.com/office/drawing/2010/main" xmlns="" w="9525">
                     <a:solidFill>
                       <a:srgbClr val="000000"/>
                     </a:solidFill>
@@ -15648,7 +15733,7 @@
               </a:ln>
               <a:extLst>
                 <a:ext uri="{91240B29-F687-4f45-9708-019B960494DF}">
-                  <a14:hiddenLine xmlns="" xmlns:a14="http://schemas.microsoft.com/office/drawing/2010/main" w="9525">
+                  <a14:hiddenLine xmlns:a14="http://schemas.microsoft.com/office/drawing/2010/main" xmlns="" w="9525">
                     <a:solidFill>
                       <a:srgbClr val="000000"/>
                     </a:solidFill>
@@ -22422,20 +22507,20 @@
       </p:grpSpPr>
       <p:sp>
         <p:nvSpPr>
-          <p:cNvPr id="2" name="Rectangle 1">
+          <p:cNvPr id="2" name="TextBox 1">
             <a:extLst>
               <a:ext uri="{FF2B5EF4-FFF2-40B4-BE49-F238E27FC236}">
-                <a16:creationId xmlns:a16="http://schemas.microsoft.com/office/drawing/2014/main" id="{B77E4888-D84D-4262-BC69-7BC0E332DDFF}"/>
+                <a16:creationId xmlns:a16="http://schemas.microsoft.com/office/drawing/2014/main" id="{7848A0A5-F720-4459-9D45-AFA209AAAF7A}"/>
               </a:ext>
             </a:extLst>
           </p:cNvPr>
-          <p:cNvSpPr/>
+          <p:cNvSpPr txBox="1"/>
           <p:nvPr/>
         </p:nvSpPr>
         <p:spPr>
           <a:xfrm>
-            <a:off x="2767247" y="550540"/>
-            <a:ext cx="6657592" cy="923330"/>
+            <a:off x="1981201" y="762001"/>
+            <a:ext cx="8730343" cy="4832092"/>
           </a:xfrm>
           <a:prstGeom prst="rect">
             <a:avLst/>
@@ -22443,159 +22528,210 @@
           <a:noFill/>
         </p:spPr>
         <p:txBody>
-          <a:bodyPr wrap="none" lIns="91440" tIns="45720" rIns="91440" bIns="45720">
-            <a:spAutoFit/>
-            <a:scene3d>
-              <a:camera prst="orthographicFront"/>
-              <a:lightRig rig="harsh" dir="t"/>
-            </a:scene3d>
-            <a:sp3d extrusionH="57150" prstMaterial="matte">
-              <a:bevelT w="63500" h="12700" prst="angle"/>
-              <a:contourClr>
-                <a:schemeClr val="bg1">
-                  <a:lumMod val="65000"/>
-                </a:schemeClr>
-              </a:contourClr>
-            </a:sp3d>
-          </a:bodyPr>
-          <a:lstStyle/>
-          <a:p>
-            <a:pPr algn="ctr"/>
-            <a:r>
-              <a:rPr lang="en-US" altLang="zh-CN" sz="5400" b="1" cap="none" spc="0">
-                <a:ln/>
-                <a:solidFill>
-                  <a:schemeClr val="accent3"/>
-                </a:solidFill>
-                <a:effectLst/>
-              </a:rPr>
-              <a:t>Contol Flow Statement</a:t>
-            </a:r>
-          </a:p>
-        </p:txBody>
-      </p:sp>
-      <p:sp>
-        <p:nvSpPr>
-          <p:cNvPr id="3" name="TextBox 2">
-            <a:extLst>
-              <a:ext uri="{FF2B5EF4-FFF2-40B4-BE49-F238E27FC236}">
-                <a16:creationId xmlns:a16="http://schemas.microsoft.com/office/drawing/2014/main" id="{246CC248-B400-4A67-B11A-61F25F567A33}"/>
-              </a:ext>
-            </a:extLst>
-          </p:cNvPr>
-          <p:cNvSpPr txBox="1"/>
-          <p:nvPr/>
-        </p:nvSpPr>
-        <p:spPr>
-          <a:xfrm>
-            <a:off x="2474260" y="2218473"/>
-            <a:ext cx="2411238" cy="2246769"/>
-          </a:xfrm>
-          <a:prstGeom prst="rect">
-            <a:avLst/>
-          </a:prstGeom>
-          <a:noFill/>
-        </p:spPr>
-        <p:txBody>
-          <a:bodyPr wrap="none" rtlCol="0">
+          <a:bodyPr wrap="square" rtlCol="0">
             <a:spAutoFit/>
           </a:bodyPr>
           <a:lstStyle/>
           <a:p>
+            <a:pPr marL="285750" indent="-285750">
+              <a:buFont typeface="Arial" panose="020B0604020202020204" pitchFamily="34" charset="0"/>
+              <a:buChar char="•"/>
+            </a:pPr>
+            <a:r>
+              <a:rPr lang="zh-CN" altLang="en-US" sz="2800"/>
+              <a:t>制作一个名为</a:t>
+            </a:r>
             <a:r>
               <a:rPr lang="en-US" altLang="zh-CN" sz="2800"/>
-              <a:t>If (expression) {</a:t>
-            </a:r>
-          </a:p>
-          <a:p>
+              <a:t>Square</a:t>
+            </a:r>
+            <a:r>
+              <a:rPr lang="zh-CN" altLang="en-US" sz="2800"/>
+              <a:t>的</a:t>
+            </a:r>
             <a:r>
               <a:rPr lang="en-US" altLang="zh-CN" sz="2800"/>
-              <a:t>...</a:t>
-            </a:r>
-          </a:p>
-          <a:p>
+              <a:t>class</a:t>
+            </a:r>
+            <a:r>
+              <a:rPr lang="zh-CN" altLang="en-US" sz="2800"/>
+              <a:t>类</a:t>
+            </a:r>
+            <a:endParaRPr lang="en-US" altLang="zh-CN" sz="2800"/>
+          </a:p>
+          <a:p>
+            <a:pPr marL="285750" indent="-285750">
+              <a:buFont typeface="Arial" panose="020B0604020202020204" pitchFamily="34" charset="0"/>
+              <a:buChar char="•"/>
+            </a:pPr>
+            <a:r>
+              <a:rPr lang="zh-CN" altLang="en-US" sz="2800"/>
+              <a:t>使用</a:t>
+            </a:r>
             <a:r>
               <a:rPr lang="en-US" altLang="zh-CN" sz="2800"/>
-              <a:t>} else {</a:t>
-            </a:r>
-          </a:p>
-          <a:p>
+              <a:t>default</a:t>
+            </a:r>
+            <a:r>
+              <a:rPr lang="zh-CN" altLang="en-US" sz="2800"/>
+              <a:t>变量</a:t>
+            </a:r>
+            <a:endParaRPr lang="en-US" altLang="zh-CN" sz="2800"/>
+          </a:p>
+          <a:p>
+            <a:pPr marL="285750" indent="-285750">
+              <a:buFont typeface="Arial" panose="020B0604020202020204" pitchFamily="34" charset="0"/>
+              <a:buChar char="•"/>
+            </a:pPr>
+            <a:r>
+              <a:rPr lang="zh-CN" altLang="en-US" sz="2800"/>
+              <a:t>制作一个</a:t>
+            </a:r>
             <a:r>
               <a:rPr lang="en-US" altLang="zh-CN" sz="2800"/>
-              <a:t>...</a:t>
-            </a:r>
-          </a:p>
-          <a:p>
+              <a:t>Tester</a:t>
+            </a:r>
+            <a:r>
+              <a:rPr lang="zh-CN" altLang="en-US" sz="2800"/>
+              <a:t>，使用这个</a:t>
+            </a:r>
             <a:r>
               <a:rPr lang="en-US" altLang="zh-CN" sz="2800"/>
-              <a:t>}</a:t>
-            </a:r>
-            <a:endParaRPr lang="zh-CN" altLang="en-US" sz="2800"/>
-          </a:p>
-        </p:txBody>
-      </p:sp>
-      <p:sp>
-        <p:nvSpPr>
-          <p:cNvPr id="4" name="TextBox 3">
-            <a:extLst>
-              <a:ext uri="{FF2B5EF4-FFF2-40B4-BE49-F238E27FC236}">
-                <a16:creationId xmlns:a16="http://schemas.microsoft.com/office/drawing/2014/main" id="{52A8BEF6-885B-43B4-82B3-AB3900A73DA7}"/>
-              </a:ext>
-            </a:extLst>
-          </p:cNvPr>
-          <p:cNvSpPr txBox="1"/>
-          <p:nvPr/>
-        </p:nvSpPr>
-        <p:spPr>
-          <a:xfrm>
-            <a:off x="6935038" y="2218473"/>
-            <a:ext cx="3042949" cy="2677656"/>
-          </a:xfrm>
-          <a:prstGeom prst="rect">
-            <a:avLst/>
-          </a:prstGeom>
-          <a:noFill/>
-        </p:spPr>
-        <p:txBody>
-          <a:bodyPr wrap="none" rtlCol="0">
-            <a:spAutoFit/>
-          </a:bodyPr>
-          <a:lstStyle/>
-          <a:p>
+              <a:t>Square</a:t>
+            </a:r>
+            <a:r>
+              <a:rPr lang="zh-CN" altLang="en-US" sz="2800"/>
+              <a:t>类来计算面积</a:t>
+            </a:r>
+            <a:endParaRPr lang="en-US" altLang="zh-CN" sz="2800"/>
+          </a:p>
+          <a:p>
+            <a:pPr marL="285750" indent="-285750">
+              <a:buFont typeface="Arial" panose="020B0604020202020204" pitchFamily="34" charset="0"/>
+              <a:buChar char="•"/>
+            </a:pPr>
+            <a:r>
+              <a:rPr lang="zh-CN" altLang="en-US" sz="2800"/>
+              <a:t>增加一个功能块，自行计算面积</a:t>
+            </a:r>
+            <a:endParaRPr lang="en-US" altLang="zh-CN" sz="2800"/>
+          </a:p>
+          <a:p>
+            <a:pPr marL="285750" indent="-285750">
+              <a:buFont typeface="Arial" panose="020B0604020202020204" pitchFamily="34" charset="0"/>
+              <a:buChar char="•"/>
+            </a:pPr>
+            <a:r>
+              <a:rPr lang="zh-CN" altLang="en-US" sz="2800"/>
+              <a:t>增加一个</a:t>
+            </a:r>
             <a:r>
               <a:rPr lang="en-US" altLang="zh-CN" sz="2800"/>
-              <a:t>switch (expression) {</a:t>
-            </a:r>
-          </a:p>
-          <a:p>
+              <a:t>Constructor</a:t>
+            </a:r>
+            <a:r>
+              <a:rPr lang="zh-CN" altLang="en-US" sz="2800"/>
+              <a:t>来简化调用程序</a:t>
+            </a:r>
+            <a:endParaRPr lang="en-US" altLang="zh-CN" sz="2800"/>
+          </a:p>
+          <a:p>
+            <a:pPr marL="285750" indent="-285750">
+              <a:buFont typeface="Arial" panose="020B0604020202020204" pitchFamily="34" charset="0"/>
+              <a:buChar char="•"/>
+            </a:pPr>
+            <a:r>
+              <a:rPr lang="zh-CN" altLang="en-US" sz="2800"/>
+              <a:t>制作一个新的</a:t>
+            </a:r>
             <a:r>
               <a:rPr lang="en-US" altLang="zh-CN" sz="2800"/>
-              <a:t>	case e1: </a:t>
-            </a:r>
-          </a:p>
-          <a:p>
+              <a:t>package</a:t>
+            </a:r>
+            <a:r>
+              <a:rPr lang="zh-CN" altLang="en-US" sz="2800"/>
+              <a:t>来测试同样的</a:t>
+            </a:r>
             <a:r>
               <a:rPr lang="en-US" altLang="zh-CN" sz="2800"/>
-              <a:t>... ...</a:t>
-            </a:r>
-          </a:p>
-          <a:p>
+              <a:t>Square</a:t>
+            </a:r>
+            <a:r>
+              <a:rPr lang="zh-CN" altLang="en-US" sz="2800"/>
+              <a:t>类（理解</a:t>
+            </a:r>
             <a:r>
               <a:rPr lang="en-US" altLang="zh-CN" sz="2800"/>
-              <a:t>	case e2:</a:t>
-            </a:r>
-          </a:p>
-          <a:p>
+              <a:t>public, private</a:t>
+            </a:r>
+            <a:r>
+              <a:rPr lang="zh-CN" altLang="en-US" sz="2800"/>
+              <a:t>的作用）</a:t>
+            </a:r>
+            <a:endParaRPr lang="en-US" altLang="zh-CN" sz="2800"/>
+          </a:p>
+          <a:p>
+            <a:pPr marL="285750" indent="-285750">
+              <a:buFont typeface="Arial" panose="020B0604020202020204" pitchFamily="34" charset="0"/>
+              <a:buChar char="•"/>
+            </a:pPr>
+            <a:r>
+              <a:rPr lang="zh-CN" altLang="en-US" sz="2800"/>
+              <a:t>制作一个名为</a:t>
+            </a:r>
             <a:r>
               <a:rPr lang="en-US" altLang="zh-CN" sz="2800"/>
-              <a:t>... ...</a:t>
-            </a:r>
-          </a:p>
-          <a:p>
+              <a:t>Rectangle</a:t>
+            </a:r>
+            <a:r>
+              <a:rPr lang="zh-CN" altLang="en-US" sz="2800"/>
+              <a:t>的类</a:t>
+            </a:r>
+            <a:endParaRPr lang="en-US" altLang="zh-CN" sz="2800"/>
+          </a:p>
+          <a:p>
+            <a:pPr marL="285750" indent="-285750">
+              <a:buFont typeface="Arial" panose="020B0604020202020204" pitchFamily="34" charset="0"/>
+              <a:buChar char="•"/>
+            </a:pPr>
+            <a:r>
+              <a:rPr lang="zh-CN" altLang="en-US" sz="2800"/>
+              <a:t>同样计算面积</a:t>
+            </a:r>
+            <a:endParaRPr lang="en-US" altLang="zh-CN" sz="2800"/>
+          </a:p>
+          <a:p>
+            <a:pPr marL="285750" indent="-285750">
+              <a:buFont typeface="Arial" panose="020B0604020202020204" pitchFamily="34" charset="0"/>
+              <a:buChar char="•"/>
+            </a:pPr>
+            <a:r>
+              <a:rPr lang="zh-CN" altLang="en-US" sz="2800"/>
+              <a:t>引入</a:t>
+            </a:r>
             <a:r>
               <a:rPr lang="en-US" altLang="zh-CN" sz="2800"/>
-              <a:t>}</a:t>
-            </a:r>
+              <a:t>Interface</a:t>
+            </a:r>
+            <a:r>
+              <a:rPr lang="zh-CN" altLang="en-US" sz="2800"/>
+              <a:t>的概念（</a:t>
+            </a:r>
+            <a:r>
+              <a:rPr lang="en-US" altLang="zh-CN" sz="2800"/>
+              <a:t>Shape</a:t>
+            </a:r>
+            <a:r>
+              <a:rPr lang="zh-CN" altLang="en-US" sz="2800"/>
+              <a:t>）（继承，多样）</a:t>
+            </a:r>
+            <a:endParaRPr lang="en-US" altLang="zh-CN" sz="2800"/>
+          </a:p>
+          <a:p>
+            <a:pPr marL="285750" indent="-285750">
+              <a:buFont typeface="Arial" panose="020B0604020202020204" pitchFamily="34" charset="0"/>
+              <a:buChar char="•"/>
+            </a:pPr>
             <a:endParaRPr lang="zh-CN" altLang="en-US" sz="2800"/>
           </a:p>
         </p:txBody>
@@ -22603,7 +22739,7 @@
     </p:spTree>
     <p:extLst>
       <p:ext uri="{BB962C8B-B14F-4D97-AF65-F5344CB8AC3E}">
-        <p14:creationId xmlns:p14="http://schemas.microsoft.com/office/powerpoint/2010/main" val="1139603387"/>
+        <p14:creationId xmlns:p14="http://schemas.microsoft.com/office/powerpoint/2010/main" val="2884668369"/>
       </p:ext>
     </p:extLst>
   </p:cSld>
@@ -22821,6 +22957,216 @@
         </p:nvSpPr>
         <p:spPr>
           <a:xfrm>
+            <a:off x="2767247" y="550540"/>
+            <a:ext cx="6657592" cy="923330"/>
+          </a:xfrm>
+          <a:prstGeom prst="rect">
+            <a:avLst/>
+          </a:prstGeom>
+          <a:noFill/>
+        </p:spPr>
+        <p:txBody>
+          <a:bodyPr wrap="none" lIns="91440" tIns="45720" rIns="91440" bIns="45720">
+            <a:spAutoFit/>
+            <a:scene3d>
+              <a:camera prst="orthographicFront"/>
+              <a:lightRig rig="harsh" dir="t"/>
+            </a:scene3d>
+            <a:sp3d extrusionH="57150" prstMaterial="matte">
+              <a:bevelT w="63500" h="12700" prst="angle"/>
+              <a:contourClr>
+                <a:schemeClr val="bg1">
+                  <a:lumMod val="65000"/>
+                </a:schemeClr>
+              </a:contourClr>
+            </a:sp3d>
+          </a:bodyPr>
+          <a:lstStyle/>
+          <a:p>
+            <a:pPr algn="ctr"/>
+            <a:r>
+              <a:rPr lang="en-US" altLang="zh-CN" sz="5400" b="1" cap="none" spc="0">
+                <a:ln/>
+                <a:solidFill>
+                  <a:schemeClr val="accent3"/>
+                </a:solidFill>
+                <a:effectLst/>
+              </a:rPr>
+              <a:t>Contol Flow Statement</a:t>
+            </a:r>
+          </a:p>
+        </p:txBody>
+      </p:sp>
+      <p:sp>
+        <p:nvSpPr>
+          <p:cNvPr id="3" name="TextBox 2">
+            <a:extLst>
+              <a:ext uri="{FF2B5EF4-FFF2-40B4-BE49-F238E27FC236}">
+                <a16:creationId xmlns:a16="http://schemas.microsoft.com/office/drawing/2014/main" id="{246CC248-B400-4A67-B11A-61F25F567A33}"/>
+              </a:ext>
+            </a:extLst>
+          </p:cNvPr>
+          <p:cNvSpPr txBox="1"/>
+          <p:nvPr/>
+        </p:nvSpPr>
+        <p:spPr>
+          <a:xfrm>
+            <a:off x="2474260" y="2218473"/>
+            <a:ext cx="2411238" cy="2246769"/>
+          </a:xfrm>
+          <a:prstGeom prst="rect">
+            <a:avLst/>
+          </a:prstGeom>
+          <a:noFill/>
+        </p:spPr>
+        <p:txBody>
+          <a:bodyPr wrap="none" rtlCol="0">
+            <a:spAutoFit/>
+          </a:bodyPr>
+          <a:lstStyle/>
+          <a:p>
+            <a:r>
+              <a:rPr lang="en-US" altLang="zh-CN" sz="2800"/>
+              <a:t>If (expression) {</a:t>
+            </a:r>
+          </a:p>
+          <a:p>
+            <a:r>
+              <a:rPr lang="en-US" altLang="zh-CN" sz="2800"/>
+              <a:t>...</a:t>
+            </a:r>
+          </a:p>
+          <a:p>
+            <a:r>
+              <a:rPr lang="en-US" altLang="zh-CN" sz="2800"/>
+              <a:t>} else {</a:t>
+            </a:r>
+          </a:p>
+          <a:p>
+            <a:r>
+              <a:rPr lang="en-US" altLang="zh-CN" sz="2800"/>
+              <a:t>...</a:t>
+            </a:r>
+          </a:p>
+          <a:p>
+            <a:r>
+              <a:rPr lang="en-US" altLang="zh-CN" sz="2800"/>
+              <a:t>}</a:t>
+            </a:r>
+            <a:endParaRPr lang="zh-CN" altLang="en-US" sz="2800"/>
+          </a:p>
+        </p:txBody>
+      </p:sp>
+      <p:sp>
+        <p:nvSpPr>
+          <p:cNvPr id="4" name="TextBox 3">
+            <a:extLst>
+              <a:ext uri="{FF2B5EF4-FFF2-40B4-BE49-F238E27FC236}">
+                <a16:creationId xmlns:a16="http://schemas.microsoft.com/office/drawing/2014/main" id="{52A8BEF6-885B-43B4-82B3-AB3900A73DA7}"/>
+              </a:ext>
+            </a:extLst>
+          </p:cNvPr>
+          <p:cNvSpPr txBox="1"/>
+          <p:nvPr/>
+        </p:nvSpPr>
+        <p:spPr>
+          <a:xfrm>
+            <a:off x="6935038" y="2218473"/>
+            <a:ext cx="3042949" cy="2677656"/>
+          </a:xfrm>
+          <a:prstGeom prst="rect">
+            <a:avLst/>
+          </a:prstGeom>
+          <a:noFill/>
+        </p:spPr>
+        <p:txBody>
+          <a:bodyPr wrap="none" rtlCol="0">
+            <a:spAutoFit/>
+          </a:bodyPr>
+          <a:lstStyle/>
+          <a:p>
+            <a:r>
+              <a:rPr lang="en-US" altLang="zh-CN" sz="2800"/>
+              <a:t>switch (expression) {</a:t>
+            </a:r>
+          </a:p>
+          <a:p>
+            <a:r>
+              <a:rPr lang="en-US" altLang="zh-CN" sz="2800"/>
+              <a:t>	case e1: </a:t>
+            </a:r>
+          </a:p>
+          <a:p>
+            <a:r>
+              <a:rPr lang="en-US" altLang="zh-CN" sz="2800"/>
+              <a:t>... ...</a:t>
+            </a:r>
+          </a:p>
+          <a:p>
+            <a:r>
+              <a:rPr lang="en-US" altLang="zh-CN" sz="2800"/>
+              <a:t>	case e2:</a:t>
+            </a:r>
+          </a:p>
+          <a:p>
+            <a:r>
+              <a:rPr lang="en-US" altLang="zh-CN" sz="2800"/>
+              <a:t>... ...</a:t>
+            </a:r>
+          </a:p>
+          <a:p>
+            <a:r>
+              <a:rPr lang="en-US" altLang="zh-CN" sz="2800"/>
+              <a:t>}</a:t>
+            </a:r>
+            <a:endParaRPr lang="zh-CN" altLang="en-US" sz="2800"/>
+          </a:p>
+        </p:txBody>
+      </p:sp>
+    </p:spTree>
+    <p:extLst>
+      <p:ext uri="{BB962C8B-B14F-4D97-AF65-F5344CB8AC3E}">
+        <p14:creationId xmlns:p14="http://schemas.microsoft.com/office/powerpoint/2010/main" val="1139603387"/>
+      </p:ext>
+    </p:extLst>
+  </p:cSld>
+  <p:clrMapOvr>
+    <a:masterClrMapping/>
+  </p:clrMapOvr>
+</p:sld>
+</file>
+
+<file path=ppt/slides/slide31.xml><?xml version="1.0" encoding="utf-8"?>
+<p:sld xmlns:a="http://schemas.openxmlformats.org/drawingml/2006/main" xmlns:r="http://schemas.openxmlformats.org/officeDocument/2006/relationships" xmlns:p="http://schemas.openxmlformats.org/presentationml/2006/main">
+  <p:cSld>
+    <p:spTree>
+      <p:nvGrpSpPr>
+        <p:cNvPr id="1" name=""/>
+        <p:cNvGrpSpPr/>
+        <p:nvPr/>
+      </p:nvGrpSpPr>
+      <p:grpSpPr>
+        <a:xfrm>
+          <a:off x="0" y="0"/>
+          <a:ext cx="0" cy="0"/>
+          <a:chOff x="0" y="0"/>
+          <a:chExt cx="0" cy="0"/>
+        </a:xfrm>
+      </p:grpSpPr>
+      <p:sp>
+        <p:nvSpPr>
+          <p:cNvPr id="2" name="Rectangle 1">
+            <a:extLst>
+              <a:ext uri="{FF2B5EF4-FFF2-40B4-BE49-F238E27FC236}">
+                <a16:creationId xmlns:a16="http://schemas.microsoft.com/office/drawing/2014/main" id="{B77E4888-D84D-4262-BC69-7BC0E332DDFF}"/>
+              </a:ext>
+            </a:extLst>
+          </p:cNvPr>
+          <p:cNvSpPr/>
+          <p:nvPr/>
+        </p:nvSpPr>
+        <p:spPr>
+          <a:xfrm>
             <a:off x="2874941" y="550540"/>
             <a:ext cx="6442213" cy="1754326"/>
           </a:xfrm>
@@ -23046,7 +23392,7 @@
 </p:sld>
 </file>
 
-<file path=ppt/slides/slide31.xml><?xml version="1.0" encoding="utf-8"?>
+<file path=ppt/slides/slide32.xml><?xml version="1.0" encoding="utf-8"?>
 <p:sld xmlns:a="http://schemas.openxmlformats.org/drawingml/2006/main" xmlns:r="http://schemas.openxmlformats.org/officeDocument/2006/relationships" xmlns:p="http://schemas.openxmlformats.org/presentationml/2006/main">
   <p:cSld>
     <p:spTree>
@@ -23325,7 +23671,7 @@
 </p:sld>
 </file>
 
-<file path=ppt/slides/slide32.xml><?xml version="1.0" encoding="utf-8"?>
+<file path=ppt/slides/slide33.xml><?xml version="1.0" encoding="utf-8"?>
 <p:sld xmlns:a="http://schemas.openxmlformats.org/drawingml/2006/main" xmlns:r="http://schemas.openxmlformats.org/officeDocument/2006/relationships" xmlns:p="http://schemas.openxmlformats.org/presentationml/2006/main">
   <p:cSld>
     <p:bg>
@@ -23409,7 +23755,7 @@
 </p:sld>
 </file>
 
-<file path=ppt/slides/slide33.xml><?xml version="1.0" encoding="utf-8"?>
+<file path=ppt/slides/slide34.xml><?xml version="1.0" encoding="utf-8"?>
 <p:sld xmlns:a="http://schemas.openxmlformats.org/drawingml/2006/main" xmlns:r="http://schemas.openxmlformats.org/officeDocument/2006/relationships" xmlns:p="http://schemas.openxmlformats.org/presentationml/2006/main">
   <p:cSld>
     <p:spTree>
@@ -23538,7 +23884,7 @@
 </p:sld>
 </file>
 
-<file path=ppt/slides/slide34.xml><?xml version="1.0" encoding="utf-8"?>
+<file path=ppt/slides/slide35.xml><?xml version="1.0" encoding="utf-8"?>
 <p:sld xmlns:a="http://schemas.openxmlformats.org/drawingml/2006/main" xmlns:r="http://schemas.openxmlformats.org/officeDocument/2006/relationships" xmlns:p="http://schemas.openxmlformats.org/presentationml/2006/main">
   <p:cSld>
     <p:bg>
@@ -23628,7 +23974,7 @@
           <a:noFill/>
           <a:extLst>
             <a:ext uri="{909E8E84-426E-40dd-AFC4-6F175D3DCCD1}">
-              <a14:hiddenFill xmlns:a14="http://schemas.microsoft.com/office/drawing/2010/main" xmlns:p14="http://schemas.microsoft.com/office/powerpoint/2010/main" xmlns:a16="http://schemas.microsoft.com/office/drawing/2014/main" xmlns="">
+              <a14:hiddenFill xmlns="" xmlns:a16="http://schemas.microsoft.com/office/drawing/2014/main" xmlns:p14="http://schemas.microsoft.com/office/powerpoint/2010/main" xmlns:a14="http://schemas.microsoft.com/office/drawing/2010/main">
                 <a:solidFill>
                   <a:srgbClr val="FFFFFF"/>
                 </a:solidFill>
@@ -23752,7 +24098,7 @@
           <a:noFill/>
           <a:extLst>
             <a:ext uri="{909E8E84-426E-40dd-AFC4-6F175D3DCCD1}">
-              <a14:hiddenFill xmlns:a14="http://schemas.microsoft.com/office/drawing/2010/main" xmlns:p14="http://schemas.microsoft.com/office/powerpoint/2010/main" xmlns:a16="http://schemas.microsoft.com/office/drawing/2014/main" xmlns="">
+              <a14:hiddenFill xmlns="" xmlns:a16="http://schemas.microsoft.com/office/drawing/2014/main" xmlns:p14="http://schemas.microsoft.com/office/powerpoint/2010/main" xmlns:a14="http://schemas.microsoft.com/office/drawing/2010/main">
                 <a:solidFill>
                   <a:srgbClr val="FFFFFF"/>
                 </a:solidFill>
@@ -24249,7 +24595,7 @@
                   <a:spcPts val="600"/>
                 </a:spcAft>
               </a:pPr>
-              <a:t>34</a:t>
+              <a:t>35</a:t>
             </a:fld>
             <a:endParaRPr lang="en-US"/>
           </a:p>
@@ -24268,7 +24614,7 @@
 </p:sld>
 </file>
 
-<file path=ppt/slides/slide35.xml><?xml version="1.0" encoding="utf-8"?>
+<file path=ppt/slides/slide36.xml><?xml version="1.0" encoding="utf-8"?>
 <p:sld xmlns:a="http://schemas.openxmlformats.org/drawingml/2006/main" xmlns:r="http://schemas.openxmlformats.org/officeDocument/2006/relationships" xmlns:p="http://schemas.openxmlformats.org/presentationml/2006/main">
   <p:cSld>
     <p:spTree>

</xml_diff>

<commit_message>
use Point for position of the Square.
</commit_message>
<xml_diff>
--- a/doc/Introduction Java.pptx
+++ b/doc/Introduction Java.pptx
@@ -232,7 +232,7 @@
           <a:p>
             <a:fld id="{CEF4331A-2CE4-4AB0-A7D5-8B785A83497D}" type="datetimeFigureOut">
               <a:rPr lang="zh-CN" altLang="en-US" smtClean="0"/>
-              <a:t>2019/2/16</a:t>
+              <a:t>2019/2/22</a:t>
             </a:fld>
             <a:endParaRPr lang="zh-CN" altLang="en-US"/>
           </a:p>
@@ -4019,7 +4019,7 @@
           <a:noFill/>
           <a:extLst>
             <a:ext uri="{909E8E84-426E-40dd-AFC4-6F175D3DCCD1}">
-              <a14:hiddenFill xmlns="" xmlns:a14="http://schemas.microsoft.com/office/drawing/2010/main">
+              <a14:hiddenFill xmlns:a14="http://schemas.microsoft.com/office/drawing/2010/main" xmlns="">
                 <a:solidFill>
                   <a:srgbClr val="FFFFFF"/>
                 </a:solidFill>
@@ -4079,7 +4079,7 @@
             </a:ln>
             <a:extLst>
               <a:ext uri="{91240B29-F687-4f45-9708-019B960494DF}">
-                <a14:hiddenLine xmlns="" xmlns:a14="http://schemas.microsoft.com/office/drawing/2010/main" w="9525">
+                <a14:hiddenLine xmlns:a14="http://schemas.microsoft.com/office/drawing/2010/main" xmlns="" w="9525">
                   <a:solidFill>
                     <a:srgbClr val="000000"/>
                   </a:solidFill>
@@ -4169,7 +4169,7 @@
             </a:ln>
             <a:extLst>
               <a:ext uri="{91240B29-F687-4f45-9708-019B960494DF}">
-                <a14:hiddenLine xmlns="" xmlns:a14="http://schemas.microsoft.com/office/drawing/2010/main" w="9525">
+                <a14:hiddenLine xmlns:a14="http://schemas.microsoft.com/office/drawing/2010/main" xmlns="" w="9525">
                   <a:solidFill>
                     <a:srgbClr val="000000"/>
                   </a:solidFill>
@@ -4259,7 +4259,7 @@
             </a:ln>
             <a:extLst>
               <a:ext uri="{91240B29-F687-4f45-9708-019B960494DF}">
-                <a14:hiddenLine xmlns="" xmlns:a14="http://schemas.microsoft.com/office/drawing/2010/main" w="9525">
+                <a14:hiddenLine xmlns:a14="http://schemas.microsoft.com/office/drawing/2010/main" xmlns="" w="9525">
                   <a:solidFill>
                     <a:srgbClr val="000000"/>
                   </a:solidFill>
@@ -4293,7 +4293,7 @@
             </a:ln>
             <a:extLst>
               <a:ext uri="{91240B29-F687-4f45-9708-019B960494DF}">
-                <a14:hiddenLine xmlns="" xmlns:a14="http://schemas.microsoft.com/office/drawing/2010/main" w="9525">
+                <a14:hiddenLine xmlns:a14="http://schemas.microsoft.com/office/drawing/2010/main" xmlns="" w="9525">
                   <a:solidFill>
                     <a:srgbClr val="000000"/>
                   </a:solidFill>
@@ -4383,7 +4383,7 @@
             </a:ln>
             <a:extLst>
               <a:ext uri="{91240B29-F687-4f45-9708-019B960494DF}">
-                <a14:hiddenLine xmlns="" xmlns:a14="http://schemas.microsoft.com/office/drawing/2010/main" w="9525">
+                <a14:hiddenLine xmlns:a14="http://schemas.microsoft.com/office/drawing/2010/main" xmlns="" w="9525">
                   <a:solidFill>
                     <a:srgbClr val="000000"/>
                   </a:solidFill>
@@ -4445,7 +4445,7 @@
             </a:ln>
             <a:extLst>
               <a:ext uri="{91240B29-F687-4f45-9708-019B960494DF}">
-                <a14:hiddenLine xmlns="" xmlns:a14="http://schemas.microsoft.com/office/drawing/2010/main" w="9525">
+                <a14:hiddenLine xmlns:a14="http://schemas.microsoft.com/office/drawing/2010/main" xmlns="" w="9525">
                   <a:solidFill>
                     <a:srgbClr val="000000"/>
                   </a:solidFill>
@@ -4507,7 +4507,7 @@
             </a:ln>
             <a:extLst>
               <a:ext uri="{91240B29-F687-4f45-9708-019B960494DF}">
-                <a14:hiddenLine xmlns="" xmlns:a14="http://schemas.microsoft.com/office/drawing/2010/main" w="9525">
+                <a14:hiddenLine xmlns:a14="http://schemas.microsoft.com/office/drawing/2010/main" xmlns="" w="9525">
                   <a:solidFill>
                     <a:srgbClr val="000000"/>
                   </a:solidFill>
@@ -4597,7 +4597,7 @@
             </a:ln>
             <a:extLst>
               <a:ext uri="{91240B29-F687-4f45-9708-019B960494DF}">
-                <a14:hiddenLine xmlns="" xmlns:a14="http://schemas.microsoft.com/office/drawing/2010/main" w="9525">
+                <a14:hiddenLine xmlns:a14="http://schemas.microsoft.com/office/drawing/2010/main" xmlns="" w="9525">
                   <a:solidFill>
                     <a:srgbClr val="000000"/>
                   </a:solidFill>
@@ -4659,7 +4659,7 @@
             </a:ln>
             <a:extLst>
               <a:ext uri="{91240B29-F687-4f45-9708-019B960494DF}">
-                <a14:hiddenLine xmlns="" xmlns:a14="http://schemas.microsoft.com/office/drawing/2010/main" w="9525">
+                <a14:hiddenLine xmlns:a14="http://schemas.microsoft.com/office/drawing/2010/main" xmlns="" w="9525">
                   <a:solidFill>
                     <a:srgbClr val="000000"/>
                   </a:solidFill>
@@ -4721,7 +4721,7 @@
             </a:ln>
             <a:extLst>
               <a:ext uri="{91240B29-F687-4f45-9708-019B960494DF}">
-                <a14:hiddenLine xmlns="" xmlns:a14="http://schemas.microsoft.com/office/drawing/2010/main" w="9525">
+                <a14:hiddenLine xmlns:a14="http://schemas.microsoft.com/office/drawing/2010/main" xmlns="" w="9525">
                   <a:solidFill>
                     <a:srgbClr val="000000"/>
                   </a:solidFill>
@@ -4811,7 +4811,7 @@
             </a:ln>
             <a:extLst>
               <a:ext uri="{91240B29-F687-4f45-9708-019B960494DF}">
-                <a14:hiddenLine xmlns="" xmlns:a14="http://schemas.microsoft.com/office/drawing/2010/main" w="9525">
+                <a14:hiddenLine xmlns:a14="http://schemas.microsoft.com/office/drawing/2010/main" xmlns="" w="9525">
                   <a:solidFill>
                     <a:srgbClr val="000000"/>
                   </a:solidFill>
@@ -4901,7 +4901,7 @@
             </a:ln>
             <a:extLst>
               <a:ext uri="{91240B29-F687-4f45-9708-019B960494DF}">
-                <a14:hiddenLine xmlns="" xmlns:a14="http://schemas.microsoft.com/office/drawing/2010/main" w="9525">
+                <a14:hiddenLine xmlns:a14="http://schemas.microsoft.com/office/drawing/2010/main" xmlns="" w="9525">
                   <a:solidFill>
                     <a:srgbClr val="000000"/>
                   </a:solidFill>
@@ -4963,7 +4963,7 @@
             </a:ln>
             <a:extLst>
               <a:ext uri="{91240B29-F687-4f45-9708-019B960494DF}">
-                <a14:hiddenLine xmlns="" xmlns:a14="http://schemas.microsoft.com/office/drawing/2010/main" w="9525">
+                <a14:hiddenLine xmlns:a14="http://schemas.microsoft.com/office/drawing/2010/main" xmlns="" w="9525">
                   <a:solidFill>
                     <a:srgbClr val="000000"/>
                   </a:solidFill>
@@ -5073,7 +5073,7 @@
             </a:ln>
             <a:extLst>
               <a:ext uri="{91240B29-F687-4f45-9708-019B960494DF}">
-                <a14:hiddenLine xmlns="" xmlns:a14="http://schemas.microsoft.com/office/drawing/2010/main" w="9525">
+                <a14:hiddenLine xmlns:a14="http://schemas.microsoft.com/office/drawing/2010/main" xmlns="" w="9525">
                   <a:solidFill>
                     <a:srgbClr val="000000"/>
                   </a:solidFill>
@@ -5135,7 +5135,7 @@
             </a:ln>
             <a:extLst>
               <a:ext uri="{91240B29-F687-4f45-9708-019B960494DF}">
-                <a14:hiddenLine xmlns="" xmlns:a14="http://schemas.microsoft.com/office/drawing/2010/main" w="9525">
+                <a14:hiddenLine xmlns:a14="http://schemas.microsoft.com/office/drawing/2010/main" xmlns="" w="9525">
                   <a:solidFill>
                     <a:srgbClr val="000000"/>
                   </a:solidFill>
@@ -5225,7 +5225,7 @@
             </a:ln>
             <a:extLst>
               <a:ext uri="{91240B29-F687-4f45-9708-019B960494DF}">
-                <a14:hiddenLine xmlns="" xmlns:a14="http://schemas.microsoft.com/office/drawing/2010/main" w="9525">
+                <a14:hiddenLine xmlns:a14="http://schemas.microsoft.com/office/drawing/2010/main" xmlns="" w="9525">
                   <a:solidFill>
                     <a:srgbClr val="000000"/>
                   </a:solidFill>
@@ -5315,7 +5315,7 @@
             </a:ln>
             <a:extLst>
               <a:ext uri="{91240B29-F687-4f45-9708-019B960494DF}">
-                <a14:hiddenLine xmlns="" xmlns:a14="http://schemas.microsoft.com/office/drawing/2010/main" w="9525">
+                <a14:hiddenLine xmlns:a14="http://schemas.microsoft.com/office/drawing/2010/main" xmlns="" w="9525">
                   <a:solidFill>
                     <a:srgbClr val="000000"/>
                   </a:solidFill>
@@ -5377,7 +5377,7 @@
             </a:ln>
             <a:extLst>
               <a:ext uri="{91240B29-F687-4f45-9708-019B960494DF}">
-                <a14:hiddenLine xmlns="" xmlns:a14="http://schemas.microsoft.com/office/drawing/2010/main" w="9525">
+                <a14:hiddenLine xmlns:a14="http://schemas.microsoft.com/office/drawing/2010/main" xmlns="" w="9525">
                   <a:solidFill>
                     <a:srgbClr val="000000"/>
                   </a:solidFill>
@@ -5467,7 +5467,7 @@
             </a:ln>
             <a:extLst>
               <a:ext uri="{91240B29-F687-4f45-9708-019B960494DF}">
-                <a14:hiddenLine xmlns="" xmlns:a14="http://schemas.microsoft.com/office/drawing/2010/main" w="9525">
+                <a14:hiddenLine xmlns:a14="http://schemas.microsoft.com/office/drawing/2010/main" xmlns="" w="9525">
                   <a:solidFill>
                     <a:srgbClr val="000000"/>
                   </a:solidFill>
@@ -5557,7 +5557,7 @@
             </a:ln>
             <a:extLst>
               <a:ext uri="{91240B29-F687-4f45-9708-019B960494DF}">
-                <a14:hiddenLine xmlns="" xmlns:a14="http://schemas.microsoft.com/office/drawing/2010/main" w="9525">
+                <a14:hiddenLine xmlns:a14="http://schemas.microsoft.com/office/drawing/2010/main" xmlns="" w="9525">
                   <a:solidFill>
                     <a:srgbClr val="000000"/>
                   </a:solidFill>
@@ -5613,7 +5613,7 @@
             </a:ln>
             <a:extLst>
               <a:ext uri="{91240B29-F687-4f45-9708-019B960494DF}">
-                <a14:hiddenLine xmlns="" xmlns:a14="http://schemas.microsoft.com/office/drawing/2010/main" w="9525">
+                <a14:hiddenLine xmlns:a14="http://schemas.microsoft.com/office/drawing/2010/main" xmlns="" w="9525">
                   <a:solidFill>
                     <a:srgbClr val="000000"/>
                   </a:solidFill>
@@ -5703,7 +5703,7 @@
             </a:ln>
             <a:extLst>
               <a:ext uri="{91240B29-F687-4f45-9708-019B960494DF}">
-                <a14:hiddenLine xmlns="" xmlns:a14="http://schemas.microsoft.com/office/drawing/2010/main" w="9525">
+                <a14:hiddenLine xmlns:a14="http://schemas.microsoft.com/office/drawing/2010/main" xmlns="" w="9525">
                   <a:solidFill>
                     <a:srgbClr val="000000"/>
                   </a:solidFill>
@@ -5759,7 +5759,7 @@
             </a:ln>
             <a:extLst>
               <a:ext uri="{91240B29-F687-4f45-9708-019B960494DF}">
-                <a14:hiddenLine xmlns="" xmlns:a14="http://schemas.microsoft.com/office/drawing/2010/main" w="9525">
+                <a14:hiddenLine xmlns:a14="http://schemas.microsoft.com/office/drawing/2010/main" xmlns="" w="9525">
                   <a:solidFill>
                     <a:srgbClr val="000000"/>
                   </a:solidFill>
@@ -5849,7 +5849,7 @@
             </a:ln>
             <a:extLst>
               <a:ext uri="{91240B29-F687-4f45-9708-019B960494DF}">
-                <a14:hiddenLine xmlns="" xmlns:a14="http://schemas.microsoft.com/office/drawing/2010/main" w="9525">
+                <a14:hiddenLine xmlns:a14="http://schemas.microsoft.com/office/drawing/2010/main" xmlns="" w="9525">
                   <a:solidFill>
                     <a:srgbClr val="000000"/>
                   </a:solidFill>
@@ -5917,7 +5917,7 @@
             </a:ln>
             <a:extLst>
               <a:ext uri="{91240B29-F687-4f45-9708-019B960494DF}">
-                <a14:hiddenLine xmlns="" xmlns:a14="http://schemas.microsoft.com/office/drawing/2010/main" w="9525">
+                <a14:hiddenLine xmlns:a14="http://schemas.microsoft.com/office/drawing/2010/main" xmlns="" w="9525">
                   <a:solidFill>
                     <a:srgbClr val="000000"/>
                   </a:solidFill>
@@ -6007,7 +6007,7 @@
             </a:ln>
             <a:extLst>
               <a:ext uri="{91240B29-F687-4f45-9708-019B960494DF}">
-                <a14:hiddenLine xmlns="" xmlns:a14="http://schemas.microsoft.com/office/drawing/2010/main" w="9525">
+                <a14:hiddenLine xmlns:a14="http://schemas.microsoft.com/office/drawing/2010/main" xmlns="" w="9525">
                   <a:solidFill>
                     <a:srgbClr val="000000"/>
                   </a:solidFill>
@@ -6075,7 +6075,7 @@
             </a:ln>
             <a:extLst>
               <a:ext uri="{91240B29-F687-4f45-9708-019B960494DF}">
-                <a14:hiddenLine xmlns="" xmlns:a14="http://schemas.microsoft.com/office/drawing/2010/main" w="9525">
+                <a14:hiddenLine xmlns:a14="http://schemas.microsoft.com/office/drawing/2010/main" xmlns="" w="9525">
                   <a:solidFill>
                     <a:srgbClr val="000000"/>
                   </a:solidFill>
@@ -6165,7 +6165,7 @@
             </a:ln>
             <a:extLst>
               <a:ext uri="{91240B29-F687-4f45-9708-019B960494DF}">
-                <a14:hiddenLine xmlns="" xmlns:a14="http://schemas.microsoft.com/office/drawing/2010/main" w="9525">
+                <a14:hiddenLine xmlns:a14="http://schemas.microsoft.com/office/drawing/2010/main" xmlns="" w="9525">
                   <a:solidFill>
                     <a:srgbClr val="000000"/>
                   </a:solidFill>
@@ -6199,7 +6199,7 @@
             </a:ln>
             <a:extLst>
               <a:ext uri="{91240B29-F687-4f45-9708-019B960494DF}">
-                <a14:hiddenLine xmlns="" xmlns:a14="http://schemas.microsoft.com/office/drawing/2010/main" w="9525">
+                <a14:hiddenLine xmlns:a14="http://schemas.microsoft.com/office/drawing/2010/main" xmlns="" w="9525">
                   <a:solidFill>
                     <a:srgbClr val="000000"/>
                   </a:solidFill>
@@ -6289,7 +6289,7 @@
             </a:ln>
             <a:extLst>
               <a:ext uri="{91240B29-F687-4f45-9708-019B960494DF}">
-                <a14:hiddenLine xmlns="" xmlns:a14="http://schemas.microsoft.com/office/drawing/2010/main" w="9525">
+                <a14:hiddenLine xmlns:a14="http://schemas.microsoft.com/office/drawing/2010/main" xmlns="" w="9525">
                   <a:solidFill>
                     <a:srgbClr val="000000"/>
                   </a:solidFill>
@@ -6351,7 +6351,7 @@
             </a:ln>
             <a:extLst>
               <a:ext uri="{91240B29-F687-4f45-9708-019B960494DF}">
-                <a14:hiddenLine xmlns="" xmlns:a14="http://schemas.microsoft.com/office/drawing/2010/main" w="9525">
+                <a14:hiddenLine xmlns:a14="http://schemas.microsoft.com/office/drawing/2010/main" xmlns="" w="9525">
                   <a:solidFill>
                     <a:srgbClr val="000000"/>
                   </a:solidFill>
@@ -6413,7 +6413,7 @@
             </a:ln>
             <a:extLst>
               <a:ext uri="{91240B29-F687-4f45-9708-019B960494DF}">
-                <a14:hiddenLine xmlns="" xmlns:a14="http://schemas.microsoft.com/office/drawing/2010/main" w="9525">
+                <a14:hiddenLine xmlns:a14="http://schemas.microsoft.com/office/drawing/2010/main" xmlns="" w="9525">
                   <a:solidFill>
                     <a:srgbClr val="000000"/>
                   </a:solidFill>
@@ -6503,7 +6503,7 @@
             </a:ln>
             <a:extLst>
               <a:ext uri="{91240B29-F687-4f45-9708-019B960494DF}">
-                <a14:hiddenLine xmlns="" xmlns:a14="http://schemas.microsoft.com/office/drawing/2010/main" w="9525">
+                <a14:hiddenLine xmlns:a14="http://schemas.microsoft.com/office/drawing/2010/main" xmlns="" w="9525">
                   <a:solidFill>
                     <a:srgbClr val="000000"/>
                   </a:solidFill>
@@ -6571,7 +6571,7 @@
             </a:ln>
             <a:extLst>
               <a:ext uri="{91240B29-F687-4f45-9708-019B960494DF}">
-                <a14:hiddenLine xmlns="" xmlns:a14="http://schemas.microsoft.com/office/drawing/2010/main" w="9525">
+                <a14:hiddenLine xmlns:a14="http://schemas.microsoft.com/office/drawing/2010/main" xmlns="" w="9525">
                   <a:solidFill>
                     <a:srgbClr val="000000"/>
                   </a:solidFill>
@@ -6633,7 +6633,7 @@
             </a:ln>
             <a:extLst>
               <a:ext uri="{91240B29-F687-4f45-9708-019B960494DF}">
-                <a14:hiddenLine xmlns="" xmlns:a14="http://schemas.microsoft.com/office/drawing/2010/main" w="9525">
+                <a14:hiddenLine xmlns:a14="http://schemas.microsoft.com/office/drawing/2010/main" xmlns="" w="9525">
                   <a:solidFill>
                     <a:srgbClr val="000000"/>
                   </a:solidFill>
@@ -6723,7 +6723,7 @@
             </a:ln>
             <a:extLst>
               <a:ext uri="{91240B29-F687-4f45-9708-019B960494DF}">
-                <a14:hiddenLine xmlns="" xmlns:a14="http://schemas.microsoft.com/office/drawing/2010/main" w="9525">
+                <a14:hiddenLine xmlns:a14="http://schemas.microsoft.com/office/drawing/2010/main" xmlns="" w="9525">
                   <a:solidFill>
                     <a:srgbClr val="000000"/>
                   </a:solidFill>
@@ -6785,7 +6785,7 @@
             </a:ln>
             <a:extLst>
               <a:ext uri="{91240B29-F687-4f45-9708-019B960494DF}">
-                <a14:hiddenLine xmlns="" xmlns:a14="http://schemas.microsoft.com/office/drawing/2010/main" w="9525">
+                <a14:hiddenLine xmlns:a14="http://schemas.microsoft.com/office/drawing/2010/main" xmlns="" w="9525">
                   <a:solidFill>
                     <a:srgbClr val="000000"/>
                   </a:solidFill>
@@ -6875,7 +6875,7 @@
             </a:ln>
             <a:extLst>
               <a:ext uri="{91240B29-F687-4f45-9708-019B960494DF}">
-                <a14:hiddenLine xmlns="" xmlns:a14="http://schemas.microsoft.com/office/drawing/2010/main" w="9525">
+                <a14:hiddenLine xmlns:a14="http://schemas.microsoft.com/office/drawing/2010/main" xmlns="" w="9525">
                   <a:solidFill>
                     <a:srgbClr val="000000"/>
                   </a:solidFill>
@@ -6937,7 +6937,7 @@
             </a:ln>
             <a:extLst>
               <a:ext uri="{91240B29-F687-4f45-9708-019B960494DF}">
-                <a14:hiddenLine xmlns="" xmlns:a14="http://schemas.microsoft.com/office/drawing/2010/main" w="9525">
+                <a14:hiddenLine xmlns:a14="http://schemas.microsoft.com/office/drawing/2010/main" xmlns="" w="9525">
                   <a:solidFill>
                     <a:srgbClr val="000000"/>
                   </a:solidFill>
@@ -7027,7 +7027,7 @@
             </a:ln>
             <a:extLst>
               <a:ext uri="{91240B29-F687-4f45-9708-019B960494DF}">
-                <a14:hiddenLine xmlns="" xmlns:a14="http://schemas.microsoft.com/office/drawing/2010/main" w="9525">
+                <a14:hiddenLine xmlns:a14="http://schemas.microsoft.com/office/drawing/2010/main" xmlns="" w="9525">
                   <a:solidFill>
                     <a:srgbClr val="000000"/>
                   </a:solidFill>
@@ -7061,7 +7061,7 @@
             </a:ln>
             <a:extLst>
               <a:ext uri="{91240B29-F687-4f45-9708-019B960494DF}">
-                <a14:hiddenLine xmlns="" xmlns:a14="http://schemas.microsoft.com/office/drawing/2010/main" w="9525">
+                <a14:hiddenLine xmlns:a14="http://schemas.microsoft.com/office/drawing/2010/main" xmlns="" w="9525">
                   <a:solidFill>
                     <a:srgbClr val="000000"/>
                   </a:solidFill>
@@ -7126,7 +7126,7 @@
             </a:ln>
             <a:extLst>
               <a:ext uri="{91240B29-F687-4f45-9708-019B960494DF}">
-                <a14:hiddenLine xmlns="" xmlns:a14="http://schemas.microsoft.com/office/drawing/2010/main" w="9525">
+                <a14:hiddenLine xmlns:a14="http://schemas.microsoft.com/office/drawing/2010/main" xmlns="" w="9525">
                   <a:solidFill>
                     <a:srgbClr val="000000"/>
                   </a:solidFill>
@@ -7216,7 +7216,7 @@
             </a:ln>
             <a:extLst>
               <a:ext uri="{91240B29-F687-4f45-9708-019B960494DF}">
-                <a14:hiddenLine xmlns="" xmlns:a14="http://schemas.microsoft.com/office/drawing/2010/main" w="9525">
+                <a14:hiddenLine xmlns:a14="http://schemas.microsoft.com/office/drawing/2010/main" xmlns="" w="9525">
                   <a:solidFill>
                     <a:srgbClr val="000000"/>
                   </a:solidFill>
@@ -7278,7 +7278,7 @@
             </a:ln>
             <a:extLst>
               <a:ext uri="{91240B29-F687-4f45-9708-019B960494DF}">
-                <a14:hiddenLine xmlns="" xmlns:a14="http://schemas.microsoft.com/office/drawing/2010/main" w="9525">
+                <a14:hiddenLine xmlns:a14="http://schemas.microsoft.com/office/drawing/2010/main" xmlns="" w="9525">
                   <a:solidFill>
                     <a:srgbClr val="000000"/>
                   </a:solidFill>
@@ -7368,7 +7368,7 @@
             </a:ln>
             <a:extLst>
               <a:ext uri="{91240B29-F687-4f45-9708-019B960494DF}">
-                <a14:hiddenLine xmlns="" xmlns:a14="http://schemas.microsoft.com/office/drawing/2010/main" w="9525">
+                <a14:hiddenLine xmlns:a14="http://schemas.microsoft.com/office/drawing/2010/main" xmlns="" w="9525">
                   <a:solidFill>
                     <a:srgbClr val="000000"/>
                   </a:solidFill>
@@ -7458,7 +7458,7 @@
             </a:ln>
             <a:extLst>
               <a:ext uri="{91240B29-F687-4f45-9708-019B960494DF}">
-                <a14:hiddenLine xmlns="" xmlns:a14="http://schemas.microsoft.com/office/drawing/2010/main" w="9525">
+                <a14:hiddenLine xmlns:a14="http://schemas.microsoft.com/office/drawing/2010/main" xmlns="" w="9525">
                   <a:solidFill>
                     <a:srgbClr val="000000"/>
                   </a:solidFill>
@@ -7523,7 +7523,7 @@
             </a:ln>
             <a:extLst>
               <a:ext uri="{91240B29-F687-4f45-9708-019B960494DF}">
-                <a14:hiddenLine xmlns="" xmlns:a14="http://schemas.microsoft.com/office/drawing/2010/main" w="9525">
+                <a14:hiddenLine xmlns:a14="http://schemas.microsoft.com/office/drawing/2010/main" xmlns="" w="9525">
                   <a:solidFill>
                     <a:srgbClr val="000000"/>
                   </a:solidFill>
@@ -7585,7 +7585,7 @@
             </a:ln>
             <a:extLst>
               <a:ext uri="{91240B29-F687-4f45-9708-019B960494DF}">
-                <a14:hiddenLine xmlns="" xmlns:a14="http://schemas.microsoft.com/office/drawing/2010/main" w="9525">
+                <a14:hiddenLine xmlns:a14="http://schemas.microsoft.com/office/drawing/2010/main" xmlns="" w="9525">
                   <a:solidFill>
                     <a:srgbClr val="000000"/>
                   </a:solidFill>
@@ -7675,7 +7675,7 @@
             </a:ln>
             <a:extLst>
               <a:ext uri="{91240B29-F687-4f45-9708-019B960494DF}">
-                <a14:hiddenLine xmlns="" xmlns:a14="http://schemas.microsoft.com/office/drawing/2010/main" w="9525">
+                <a14:hiddenLine xmlns:a14="http://schemas.microsoft.com/office/drawing/2010/main" xmlns="" w="9525">
                   <a:solidFill>
                     <a:srgbClr val="000000"/>
                   </a:solidFill>
@@ -7765,7 +7765,7 @@
             </a:ln>
             <a:extLst>
               <a:ext uri="{91240B29-F687-4f45-9708-019B960494DF}">
-                <a14:hiddenLine xmlns="" xmlns:a14="http://schemas.microsoft.com/office/drawing/2010/main" w="9525">
+                <a14:hiddenLine xmlns:a14="http://schemas.microsoft.com/office/drawing/2010/main" xmlns="" w="9525">
                   <a:solidFill>
                     <a:srgbClr val="000000"/>
                   </a:solidFill>
@@ -7827,7 +7827,7 @@
             </a:ln>
             <a:extLst>
               <a:ext uri="{91240B29-F687-4f45-9708-019B960494DF}">
-                <a14:hiddenLine xmlns="" xmlns:a14="http://schemas.microsoft.com/office/drawing/2010/main" w="9525">
+                <a14:hiddenLine xmlns:a14="http://schemas.microsoft.com/office/drawing/2010/main" xmlns="" w="9525">
                   <a:solidFill>
                     <a:srgbClr val="000000"/>
                   </a:solidFill>
@@ -7947,7 +7947,7 @@
             </a:ln>
             <a:extLst>
               <a:ext uri="{91240B29-F687-4f45-9708-019B960494DF}">
-                <a14:hiddenLine xmlns="" xmlns:a14="http://schemas.microsoft.com/office/drawing/2010/main" w="9525">
+                <a14:hiddenLine xmlns:a14="http://schemas.microsoft.com/office/drawing/2010/main" xmlns="" w="9525">
                   <a:solidFill>
                     <a:srgbClr val="000000"/>
                   </a:solidFill>
@@ -8015,7 +8015,7 @@
             </a:ln>
             <a:extLst>
               <a:ext uri="{91240B29-F687-4f45-9708-019B960494DF}">
-                <a14:hiddenLine xmlns="" xmlns:a14="http://schemas.microsoft.com/office/drawing/2010/main" w="9525">
+                <a14:hiddenLine xmlns:a14="http://schemas.microsoft.com/office/drawing/2010/main" xmlns="" w="9525">
                   <a:solidFill>
                     <a:srgbClr val="000000"/>
                   </a:solidFill>
@@ -8105,7 +8105,7 @@
             </a:ln>
             <a:extLst>
               <a:ext uri="{91240B29-F687-4f45-9708-019B960494DF}">
-                <a14:hiddenLine xmlns="" xmlns:a14="http://schemas.microsoft.com/office/drawing/2010/main" w="9525">
+                <a14:hiddenLine xmlns:a14="http://schemas.microsoft.com/office/drawing/2010/main" xmlns="" w="9525">
                   <a:solidFill>
                     <a:srgbClr val="000000"/>
                   </a:solidFill>
@@ -8245,7 +8245,7 @@
           <a:p>
             <a:fld id="{D840643F-1791-474B-B0E8-F4C29BE3B528}" type="datetimeFigureOut">
               <a:rPr lang="zh-CN" altLang="en-US" smtClean="0"/>
-              <a:t>2019/2/16</a:t>
+              <a:t>2019/2/22</a:t>
             </a:fld>
             <a:endParaRPr lang="zh-CN" altLang="en-US"/>
           </a:p>
@@ -8512,7 +8512,7 @@
           <a:p>
             <a:fld id="{D840643F-1791-474B-B0E8-F4C29BE3B528}" type="datetimeFigureOut">
               <a:rPr lang="zh-CN" altLang="en-US" smtClean="0"/>
-              <a:t>2019/2/16</a:t>
+              <a:t>2019/2/22</a:t>
             </a:fld>
             <a:endParaRPr lang="zh-CN" altLang="en-US"/>
           </a:p>
@@ -8708,7 +8708,7 @@
           <a:p>
             <a:fld id="{D840643F-1791-474B-B0E8-F4C29BE3B528}" type="datetimeFigureOut">
               <a:rPr lang="zh-CN" altLang="en-US" smtClean="0"/>
-              <a:t>2019/2/16</a:t>
+              <a:t>2019/2/22</a:t>
             </a:fld>
             <a:endParaRPr lang="zh-CN" altLang="en-US"/>
           </a:p>
@@ -8971,7 +8971,7 @@
           <a:p>
             <a:fld id="{D840643F-1791-474B-B0E8-F4C29BE3B528}" type="datetimeFigureOut">
               <a:rPr lang="zh-CN" altLang="en-US" smtClean="0"/>
-              <a:t>2019/2/16</a:t>
+              <a:t>2019/2/22</a:t>
             </a:fld>
             <a:endParaRPr lang="zh-CN" altLang="en-US"/>
           </a:p>
@@ -9405,7 +9405,7 @@
           <a:p>
             <a:fld id="{D840643F-1791-474B-B0E8-F4C29BE3B528}" type="datetimeFigureOut">
               <a:rPr lang="zh-CN" altLang="en-US" smtClean="0"/>
-              <a:t>2019/2/16</a:t>
+              <a:t>2019/2/22</a:t>
             </a:fld>
             <a:endParaRPr lang="zh-CN" altLang="en-US"/>
           </a:p>
@@ -9951,7 +9951,7 @@
           <a:p>
             <a:fld id="{D840643F-1791-474B-B0E8-F4C29BE3B528}" type="datetimeFigureOut">
               <a:rPr lang="zh-CN" altLang="en-US" smtClean="0"/>
-              <a:t>2019/2/16</a:t>
+              <a:t>2019/2/22</a:t>
             </a:fld>
             <a:endParaRPr lang="zh-CN" altLang="en-US"/>
           </a:p>
@@ -10671,7 +10671,7 @@
           <a:p>
             <a:fld id="{D840643F-1791-474B-B0E8-F4C29BE3B528}" type="datetimeFigureOut">
               <a:rPr lang="zh-CN" altLang="en-US" smtClean="0"/>
-              <a:t>2019/2/16</a:t>
+              <a:t>2019/2/22</a:t>
             </a:fld>
             <a:endParaRPr lang="zh-CN" altLang="en-US"/>
           </a:p>
@@ -10841,7 +10841,7 @@
           <a:p>
             <a:fld id="{D840643F-1791-474B-B0E8-F4C29BE3B528}" type="datetimeFigureOut">
               <a:rPr lang="zh-CN" altLang="en-US" smtClean="0"/>
-              <a:t>2019/2/16</a:t>
+              <a:t>2019/2/22</a:t>
             </a:fld>
             <a:endParaRPr lang="zh-CN" altLang="en-US"/>
           </a:p>
@@ -11021,7 +11021,7 @@
           <a:p>
             <a:fld id="{D840643F-1791-474B-B0E8-F4C29BE3B528}" type="datetimeFigureOut">
               <a:rPr lang="zh-CN" altLang="en-US" smtClean="0"/>
-              <a:t>2019/2/16</a:t>
+              <a:t>2019/2/22</a:t>
             </a:fld>
             <a:endParaRPr lang="zh-CN" altLang="en-US"/>
           </a:p>
@@ -11191,7 +11191,7 @@
           <a:p>
             <a:fld id="{D840643F-1791-474B-B0E8-F4C29BE3B528}" type="datetimeFigureOut">
               <a:rPr lang="zh-CN" altLang="en-US" smtClean="0"/>
-              <a:t>2019/2/16</a:t>
+              <a:t>2019/2/22</a:t>
             </a:fld>
             <a:endParaRPr lang="zh-CN" altLang="en-US"/>
           </a:p>
@@ -11441,7 +11441,7 @@
           <a:p>
             <a:fld id="{D840643F-1791-474B-B0E8-F4C29BE3B528}" type="datetimeFigureOut">
               <a:rPr lang="zh-CN" altLang="en-US" smtClean="0"/>
-              <a:t>2019/2/16</a:t>
+              <a:t>2019/2/22</a:t>
             </a:fld>
             <a:endParaRPr lang="zh-CN" altLang="en-US"/>
           </a:p>
@@ -11673,7 +11673,7 @@
           <a:p>
             <a:fld id="{D840643F-1791-474B-B0E8-F4C29BE3B528}" type="datetimeFigureOut">
               <a:rPr lang="zh-CN" altLang="en-US" smtClean="0"/>
-              <a:t>2019/2/16</a:t>
+              <a:t>2019/2/22</a:t>
             </a:fld>
             <a:endParaRPr lang="zh-CN" altLang="en-US"/>
           </a:p>
@@ -12054,7 +12054,7 @@
           <a:p>
             <a:fld id="{D840643F-1791-474B-B0E8-F4C29BE3B528}" type="datetimeFigureOut">
               <a:rPr lang="zh-CN" altLang="en-US" smtClean="0"/>
-              <a:t>2019/2/16</a:t>
+              <a:t>2019/2/22</a:t>
             </a:fld>
             <a:endParaRPr lang="zh-CN" altLang="en-US"/>
           </a:p>
@@ -12172,7 +12172,7 @@
           <a:p>
             <a:fld id="{D840643F-1791-474B-B0E8-F4C29BE3B528}" type="datetimeFigureOut">
               <a:rPr lang="zh-CN" altLang="en-US" smtClean="0"/>
-              <a:t>2019/2/16</a:t>
+              <a:t>2019/2/22</a:t>
             </a:fld>
             <a:endParaRPr lang="zh-CN" altLang="en-US"/>
           </a:p>
@@ -12267,7 +12267,7 @@
           <a:p>
             <a:fld id="{D840643F-1791-474B-B0E8-F4C29BE3B528}" type="datetimeFigureOut">
               <a:rPr lang="zh-CN" altLang="en-US" smtClean="0"/>
-              <a:t>2019/2/16</a:t>
+              <a:t>2019/2/22</a:t>
             </a:fld>
             <a:endParaRPr lang="zh-CN" altLang="en-US"/>
           </a:p>
@@ -12516,7 +12516,7 @@
           <a:p>
             <a:fld id="{D840643F-1791-474B-B0E8-F4C29BE3B528}" type="datetimeFigureOut">
               <a:rPr lang="zh-CN" altLang="en-US" smtClean="0"/>
-              <a:t>2019/2/16</a:t>
+              <a:t>2019/2/22</a:t>
             </a:fld>
             <a:endParaRPr lang="zh-CN" altLang="en-US"/>
           </a:p>
@@ -12796,7 +12796,7 @@
           <a:p>
             <a:fld id="{D840643F-1791-474B-B0E8-F4C29BE3B528}" type="datetimeFigureOut">
               <a:rPr lang="zh-CN" altLang="en-US" smtClean="0"/>
-              <a:t>2019/2/16</a:t>
+              <a:t>2019/2/22</a:t>
             </a:fld>
             <a:endParaRPr lang="zh-CN" altLang="en-US"/>
           </a:p>
@@ -12912,7 +12912,7 @@
           <a:noFill/>
           <a:extLst>
             <a:ext uri="{909E8E84-426E-40dd-AFC4-6F175D3DCCD1}">
-              <a14:hiddenFill xmlns="" xmlns:a14="http://schemas.microsoft.com/office/drawing/2010/main">
+              <a14:hiddenFill xmlns:a14="http://schemas.microsoft.com/office/drawing/2010/main" xmlns="">
                 <a:solidFill>
                   <a:srgbClr val="FFFFFF"/>
                 </a:solidFill>
@@ -12986,7 +12986,7 @@
               </a:ln>
               <a:extLst>
                 <a:ext uri="{91240B29-F687-4f45-9708-019B960494DF}">
-                  <a14:hiddenLine xmlns="" xmlns:a14="http://schemas.microsoft.com/office/drawing/2010/main" w="9525">
+                  <a14:hiddenLine xmlns:a14="http://schemas.microsoft.com/office/drawing/2010/main" xmlns="" w="9525">
                     <a:solidFill>
                       <a:srgbClr val="000000"/>
                     </a:solidFill>
@@ -13076,7 +13076,7 @@
               </a:ln>
               <a:extLst>
                 <a:ext uri="{91240B29-F687-4f45-9708-019B960494DF}">
-                  <a14:hiddenLine xmlns="" xmlns:a14="http://schemas.microsoft.com/office/drawing/2010/main" w="9525">
+                  <a14:hiddenLine xmlns:a14="http://schemas.microsoft.com/office/drawing/2010/main" xmlns="" w="9525">
                     <a:solidFill>
                       <a:srgbClr val="000000"/>
                     </a:solidFill>
@@ -13166,7 +13166,7 @@
               </a:ln>
               <a:extLst>
                 <a:ext uri="{91240B29-F687-4f45-9708-019B960494DF}">
-                  <a14:hiddenLine xmlns="" xmlns:a14="http://schemas.microsoft.com/office/drawing/2010/main" w="9525">
+                  <a14:hiddenLine xmlns:a14="http://schemas.microsoft.com/office/drawing/2010/main" xmlns="" w="9525">
                     <a:solidFill>
                       <a:srgbClr val="000000"/>
                     </a:solidFill>
@@ -13228,7 +13228,7 @@
               </a:ln>
               <a:extLst>
                 <a:ext uri="{91240B29-F687-4f45-9708-019B960494DF}">
-                  <a14:hiddenLine xmlns="" xmlns:a14="http://schemas.microsoft.com/office/drawing/2010/main" w="9525">
+                  <a14:hiddenLine xmlns:a14="http://schemas.microsoft.com/office/drawing/2010/main" xmlns="" w="9525">
                     <a:solidFill>
                       <a:srgbClr val="000000"/>
                     </a:solidFill>
@@ -13318,7 +13318,7 @@
               </a:ln>
               <a:extLst>
                 <a:ext uri="{91240B29-F687-4f45-9708-019B960494DF}">
-                  <a14:hiddenLine xmlns="" xmlns:a14="http://schemas.microsoft.com/office/drawing/2010/main" w="9525">
+                  <a14:hiddenLine xmlns:a14="http://schemas.microsoft.com/office/drawing/2010/main" xmlns="" w="9525">
                     <a:solidFill>
                       <a:srgbClr val="000000"/>
                     </a:solidFill>
@@ -13380,7 +13380,7 @@
               </a:ln>
               <a:extLst>
                 <a:ext uri="{91240B29-F687-4f45-9708-019B960494DF}">
-                  <a14:hiddenLine xmlns="" xmlns:a14="http://schemas.microsoft.com/office/drawing/2010/main" w="9525">
+                  <a14:hiddenLine xmlns:a14="http://schemas.microsoft.com/office/drawing/2010/main" xmlns="" w="9525">
                     <a:solidFill>
                       <a:srgbClr val="000000"/>
                     </a:solidFill>
@@ -13442,7 +13442,7 @@
               </a:ln>
               <a:extLst>
                 <a:ext uri="{91240B29-F687-4f45-9708-019B960494DF}">
-                  <a14:hiddenLine xmlns="" xmlns:a14="http://schemas.microsoft.com/office/drawing/2010/main" w="9525">
+                  <a14:hiddenLine xmlns:a14="http://schemas.microsoft.com/office/drawing/2010/main" xmlns="" w="9525">
                     <a:solidFill>
                       <a:srgbClr val="000000"/>
                     </a:solidFill>
@@ -13532,7 +13532,7 @@
               </a:ln>
               <a:extLst>
                 <a:ext uri="{91240B29-F687-4f45-9708-019B960494DF}">
-                  <a14:hiddenLine xmlns="" xmlns:a14="http://schemas.microsoft.com/office/drawing/2010/main" w="9525">
+                  <a14:hiddenLine xmlns:a14="http://schemas.microsoft.com/office/drawing/2010/main" xmlns="" w="9525">
                     <a:solidFill>
                       <a:srgbClr val="000000"/>
                     </a:solidFill>
@@ -13622,7 +13622,7 @@
               </a:ln>
               <a:extLst>
                 <a:ext uri="{91240B29-F687-4f45-9708-019B960494DF}">
-                  <a14:hiddenLine xmlns="" xmlns:a14="http://schemas.microsoft.com/office/drawing/2010/main" w="9525">
+                  <a14:hiddenLine xmlns:a14="http://schemas.microsoft.com/office/drawing/2010/main" xmlns="" w="9525">
                     <a:solidFill>
                       <a:srgbClr val="000000"/>
                     </a:solidFill>
@@ -13684,7 +13684,7 @@
               </a:ln>
               <a:extLst>
                 <a:ext uri="{91240B29-F687-4f45-9708-019B960494DF}">
-                  <a14:hiddenLine xmlns="" xmlns:a14="http://schemas.microsoft.com/office/drawing/2010/main" w="9525">
+                  <a14:hiddenLine xmlns:a14="http://schemas.microsoft.com/office/drawing/2010/main" xmlns="" w="9525">
                     <a:solidFill>
                       <a:srgbClr val="000000"/>
                     </a:solidFill>
@@ -13794,7 +13794,7 @@
               </a:ln>
               <a:extLst>
                 <a:ext uri="{91240B29-F687-4f45-9708-019B960494DF}">
-                  <a14:hiddenLine xmlns="" xmlns:a14="http://schemas.microsoft.com/office/drawing/2010/main" w="9525">
+                  <a14:hiddenLine xmlns:a14="http://schemas.microsoft.com/office/drawing/2010/main" xmlns="" w="9525">
                     <a:solidFill>
                       <a:srgbClr val="000000"/>
                     </a:solidFill>
@@ -13878,7 +13878,7 @@
               </a:ln>
               <a:extLst>
                 <a:ext uri="{91240B29-F687-4f45-9708-019B960494DF}">
-                  <a14:hiddenLine xmlns="" xmlns:a14="http://schemas.microsoft.com/office/drawing/2010/main" w="9525">
+                  <a14:hiddenLine xmlns:a14="http://schemas.microsoft.com/office/drawing/2010/main" xmlns="" w="9525">
                     <a:solidFill>
                       <a:srgbClr val="000000"/>
                     </a:solidFill>
@@ -13940,7 +13940,7 @@
               </a:ln>
               <a:extLst>
                 <a:ext uri="{91240B29-F687-4f45-9708-019B960494DF}">
-                  <a14:hiddenLine xmlns="" xmlns:a14="http://schemas.microsoft.com/office/drawing/2010/main" w="9525">
+                  <a14:hiddenLine xmlns:a14="http://schemas.microsoft.com/office/drawing/2010/main" xmlns="" w="9525">
                     <a:solidFill>
                       <a:srgbClr val="000000"/>
                     </a:solidFill>
@@ -14002,7 +14002,7 @@
               </a:ln>
               <a:extLst>
                 <a:ext uri="{91240B29-F687-4f45-9708-019B960494DF}">
-                  <a14:hiddenLine xmlns="" xmlns:a14="http://schemas.microsoft.com/office/drawing/2010/main" w="9525">
+                  <a14:hiddenLine xmlns:a14="http://schemas.microsoft.com/office/drawing/2010/main" xmlns="" w="9525">
                     <a:solidFill>
                       <a:srgbClr val="000000"/>
                     </a:solidFill>
@@ -14092,7 +14092,7 @@
               </a:ln>
               <a:extLst>
                 <a:ext uri="{91240B29-F687-4f45-9708-019B960494DF}">
-                  <a14:hiddenLine xmlns="" xmlns:a14="http://schemas.microsoft.com/office/drawing/2010/main" w="9525">
+                  <a14:hiddenLine xmlns:a14="http://schemas.microsoft.com/office/drawing/2010/main" xmlns="" w="9525">
                     <a:solidFill>
                       <a:srgbClr val="000000"/>
                     </a:solidFill>
@@ -14126,7 +14126,7 @@
               </a:ln>
               <a:extLst>
                 <a:ext uri="{91240B29-F687-4f45-9708-019B960494DF}">
-                  <a14:hiddenLine xmlns="" xmlns:a14="http://schemas.microsoft.com/office/drawing/2010/main" w="9525">
+                  <a14:hiddenLine xmlns:a14="http://schemas.microsoft.com/office/drawing/2010/main" xmlns="" w="9525">
                     <a:solidFill>
                       <a:srgbClr val="000000"/>
                     </a:solidFill>
@@ -14191,7 +14191,7 @@
               </a:ln>
               <a:extLst>
                 <a:ext uri="{91240B29-F687-4f45-9708-019B960494DF}">
-                  <a14:hiddenLine xmlns="" xmlns:a14="http://schemas.microsoft.com/office/drawing/2010/main" w="9525">
+                  <a14:hiddenLine xmlns:a14="http://schemas.microsoft.com/office/drawing/2010/main" xmlns="" w="9525">
                     <a:solidFill>
                       <a:srgbClr val="000000"/>
                     </a:solidFill>
@@ -14281,7 +14281,7 @@
               </a:ln>
               <a:extLst>
                 <a:ext uri="{91240B29-F687-4f45-9708-019B960494DF}">
-                  <a14:hiddenLine xmlns="" xmlns:a14="http://schemas.microsoft.com/office/drawing/2010/main" w="9525">
+                  <a14:hiddenLine xmlns:a14="http://schemas.microsoft.com/office/drawing/2010/main" xmlns="" w="9525">
                     <a:solidFill>
                       <a:srgbClr val="000000"/>
                     </a:solidFill>
@@ -14343,7 +14343,7 @@
               </a:ln>
               <a:extLst>
                 <a:ext uri="{91240B29-F687-4f45-9708-019B960494DF}">
-                  <a14:hiddenLine xmlns="" xmlns:a14="http://schemas.microsoft.com/office/drawing/2010/main" w="9525">
+                  <a14:hiddenLine xmlns:a14="http://schemas.microsoft.com/office/drawing/2010/main" xmlns="" w="9525">
                     <a:solidFill>
                       <a:srgbClr val="000000"/>
                     </a:solidFill>
@@ -14433,7 +14433,7 @@
               </a:ln>
               <a:extLst>
                 <a:ext uri="{91240B29-F687-4f45-9708-019B960494DF}">
-                  <a14:hiddenLine xmlns="" xmlns:a14="http://schemas.microsoft.com/office/drawing/2010/main" w="9525">
+                  <a14:hiddenLine xmlns:a14="http://schemas.microsoft.com/office/drawing/2010/main" xmlns="" w="9525">
                     <a:solidFill>
                       <a:srgbClr val="000000"/>
                     </a:solidFill>
@@ -14498,7 +14498,7 @@
               </a:ln>
               <a:extLst>
                 <a:ext uri="{91240B29-F687-4f45-9708-019B960494DF}">
-                  <a14:hiddenLine xmlns="" xmlns:a14="http://schemas.microsoft.com/office/drawing/2010/main" w="9525">
+                  <a14:hiddenLine xmlns:a14="http://schemas.microsoft.com/office/drawing/2010/main" xmlns="" w="9525">
                     <a:solidFill>
                       <a:srgbClr val="000000"/>
                     </a:solidFill>
@@ -14560,7 +14560,7 @@
               </a:ln>
               <a:extLst>
                 <a:ext uri="{91240B29-F687-4f45-9708-019B960494DF}">
-                  <a14:hiddenLine xmlns="" xmlns:a14="http://schemas.microsoft.com/office/drawing/2010/main" w="9525">
+                  <a14:hiddenLine xmlns:a14="http://schemas.microsoft.com/office/drawing/2010/main" xmlns="" w="9525">
                     <a:solidFill>
                       <a:srgbClr val="000000"/>
                     </a:solidFill>
@@ -14650,7 +14650,7 @@
               </a:ln>
               <a:extLst>
                 <a:ext uri="{91240B29-F687-4f45-9708-019B960494DF}">
-                  <a14:hiddenLine xmlns="" xmlns:a14="http://schemas.microsoft.com/office/drawing/2010/main" w="9525">
+                  <a14:hiddenLine xmlns:a14="http://schemas.microsoft.com/office/drawing/2010/main" xmlns="" w="9525">
                     <a:solidFill>
                       <a:srgbClr val="000000"/>
                     </a:solidFill>
@@ -14740,7 +14740,7 @@
               </a:ln>
               <a:extLst>
                 <a:ext uri="{91240B29-F687-4f45-9708-019B960494DF}">
-                  <a14:hiddenLine xmlns="" xmlns:a14="http://schemas.microsoft.com/office/drawing/2010/main" w="9525">
+                  <a14:hiddenLine xmlns:a14="http://schemas.microsoft.com/office/drawing/2010/main" xmlns="" w="9525">
                     <a:solidFill>
                       <a:srgbClr val="000000"/>
                     </a:solidFill>
@@ -14805,7 +14805,7 @@
               </a:ln>
               <a:extLst>
                 <a:ext uri="{91240B29-F687-4f45-9708-019B960494DF}">
-                  <a14:hiddenLine xmlns="" xmlns:a14="http://schemas.microsoft.com/office/drawing/2010/main" w="9525">
+                  <a14:hiddenLine xmlns:a14="http://schemas.microsoft.com/office/drawing/2010/main" xmlns="" w="9525">
                     <a:solidFill>
                       <a:srgbClr val="000000"/>
                     </a:solidFill>
@@ -14925,7 +14925,7 @@
               </a:ln>
               <a:extLst>
                 <a:ext uri="{91240B29-F687-4f45-9708-019B960494DF}">
-                  <a14:hiddenLine xmlns="" xmlns:a14="http://schemas.microsoft.com/office/drawing/2010/main" w="9525">
+                  <a14:hiddenLine xmlns:a14="http://schemas.microsoft.com/office/drawing/2010/main" xmlns="" w="9525">
                     <a:solidFill>
                       <a:srgbClr val="000000"/>
                     </a:solidFill>
@@ -15023,7 +15023,7 @@
               </a:ln>
               <a:extLst>
                 <a:ext uri="{91240B29-F687-4f45-9708-019B960494DF}">
-                  <a14:hiddenLine xmlns="" xmlns:a14="http://schemas.microsoft.com/office/drawing/2010/main" w="9525">
+                  <a14:hiddenLine xmlns:a14="http://schemas.microsoft.com/office/drawing/2010/main" xmlns="" w="9525">
                     <a:solidFill>
                       <a:srgbClr val="000000"/>
                     </a:solidFill>
@@ -15138,7 +15138,7 @@
               </a:ln>
               <a:extLst>
                 <a:ext uri="{91240B29-F687-4f45-9708-019B960494DF}">
-                  <a14:hiddenLine xmlns="" xmlns:a14="http://schemas.microsoft.com/office/drawing/2010/main" w="9525">
+                  <a14:hiddenLine xmlns:a14="http://schemas.microsoft.com/office/drawing/2010/main" xmlns="" w="9525">
                     <a:solidFill>
                       <a:srgbClr val="000000"/>
                     </a:solidFill>
@@ -15228,7 +15228,7 @@
               </a:ln>
               <a:extLst>
                 <a:ext uri="{91240B29-F687-4f45-9708-019B960494DF}">
-                  <a14:hiddenLine xmlns="" xmlns:a14="http://schemas.microsoft.com/office/drawing/2010/main" w="9525">
+                  <a14:hiddenLine xmlns:a14="http://schemas.microsoft.com/office/drawing/2010/main" xmlns="" w="9525">
                     <a:solidFill>
                       <a:srgbClr val="000000"/>
                     </a:solidFill>
@@ -15293,7 +15293,7 @@
               </a:ln>
               <a:extLst>
                 <a:ext uri="{91240B29-F687-4f45-9708-019B960494DF}">
-                  <a14:hiddenLine xmlns="" xmlns:a14="http://schemas.microsoft.com/office/drawing/2010/main" w="9525">
+                  <a14:hiddenLine xmlns:a14="http://schemas.microsoft.com/office/drawing/2010/main" xmlns="" w="9525">
                     <a:solidFill>
                       <a:srgbClr val="000000"/>
                     </a:solidFill>
@@ -15383,7 +15383,7 @@
               </a:ln>
               <a:extLst>
                 <a:ext uri="{91240B29-F687-4f45-9708-019B960494DF}">
-                  <a14:hiddenLine xmlns="" xmlns:a14="http://schemas.microsoft.com/office/drawing/2010/main" w="9525">
+                  <a14:hiddenLine xmlns:a14="http://schemas.microsoft.com/office/drawing/2010/main" xmlns="" w="9525">
                     <a:solidFill>
                       <a:srgbClr val="000000"/>
                     </a:solidFill>
@@ -15451,7 +15451,7 @@
               </a:ln>
               <a:extLst>
                 <a:ext uri="{91240B29-F687-4f45-9708-019B960494DF}">
-                  <a14:hiddenLine xmlns="" xmlns:a14="http://schemas.microsoft.com/office/drawing/2010/main" w="9525">
+                  <a14:hiddenLine xmlns:a14="http://schemas.microsoft.com/office/drawing/2010/main" xmlns="" w="9525">
                     <a:solidFill>
                       <a:srgbClr val="000000"/>
                     </a:solidFill>
@@ -15541,7 +15541,7 @@
               </a:ln>
               <a:extLst>
                 <a:ext uri="{91240B29-F687-4f45-9708-019B960494DF}">
-                  <a14:hiddenLine xmlns="" xmlns:a14="http://schemas.microsoft.com/office/drawing/2010/main" w="9525">
+                  <a14:hiddenLine xmlns:a14="http://schemas.microsoft.com/office/drawing/2010/main" xmlns="" w="9525">
                     <a:solidFill>
                       <a:srgbClr val="000000"/>
                     </a:solidFill>
@@ -15609,7 +15609,7 @@
               </a:ln>
               <a:extLst>
                 <a:ext uri="{91240B29-F687-4f45-9708-019B960494DF}">
-                  <a14:hiddenLine xmlns="" xmlns:a14="http://schemas.microsoft.com/office/drawing/2010/main" w="9525">
+                  <a14:hiddenLine xmlns:a14="http://schemas.microsoft.com/office/drawing/2010/main" xmlns="" w="9525">
                     <a:solidFill>
                       <a:srgbClr val="000000"/>
                     </a:solidFill>
@@ -15699,7 +15699,7 @@
               </a:ln>
               <a:extLst>
                 <a:ext uri="{91240B29-F687-4f45-9708-019B960494DF}">
-                  <a14:hiddenLine xmlns="" xmlns:a14="http://schemas.microsoft.com/office/drawing/2010/main" w="9525">
+                  <a14:hiddenLine xmlns:a14="http://schemas.microsoft.com/office/drawing/2010/main" xmlns="" w="9525">
                     <a:solidFill>
                       <a:srgbClr val="000000"/>
                     </a:solidFill>
@@ -15733,7 +15733,7 @@
               </a:ln>
               <a:extLst>
                 <a:ext uri="{91240B29-F687-4f45-9708-019B960494DF}">
-                  <a14:hiddenLine xmlns="" xmlns:a14="http://schemas.microsoft.com/office/drawing/2010/main" w="9525">
+                  <a14:hiddenLine xmlns:a14="http://schemas.microsoft.com/office/drawing/2010/main" xmlns="" w="9525">
                     <a:solidFill>
                       <a:srgbClr val="000000"/>
                     </a:solidFill>
@@ -15873,7 +15873,7 @@
           <a:p>
             <a:fld id="{D840643F-1791-474B-B0E8-F4C29BE3B528}" type="datetimeFigureOut">
               <a:rPr lang="zh-CN" altLang="en-US" smtClean="0"/>
-              <a:t>2019/2/16</a:t>
+              <a:t>2019/2/22</a:t>
             </a:fld>
             <a:endParaRPr lang="zh-CN" altLang="en-US"/>
           </a:p>
@@ -22520,7 +22520,7 @@
         <p:spPr>
           <a:xfrm>
             <a:off x="1981201" y="762001"/>
-            <a:ext cx="8730343" cy="4832092"/>
+            <a:ext cx="8730343" cy="5262979"/>
           </a:xfrm>
           <a:prstGeom prst="rect">
             <a:avLst/>
@@ -22570,7 +22570,15 @@
             </a:r>
             <a:r>
               <a:rPr lang="en-US" altLang="zh-CN" sz="2800"/>
-              <a:t>default</a:t>
+              <a:t>default(</a:t>
+            </a:r>
+            <a:r>
+              <a:rPr lang="zh-CN" altLang="en-US" sz="2800"/>
+              <a:t>没有区域修饰</a:t>
+            </a:r>
+            <a:r>
+              <a:rPr lang="en-US" altLang="zh-CN" sz="2800"/>
+              <a:t>)</a:t>
             </a:r>
             <a:r>
               <a:rPr lang="zh-CN" altLang="en-US" sz="2800"/>
@@ -22613,6 +22621,25 @@
             <a:r>
               <a:rPr lang="zh-CN" altLang="en-US" sz="2800"/>
               <a:t>增加一个功能块，自行计算面积</a:t>
+            </a:r>
+            <a:endParaRPr lang="en-US" altLang="zh-CN" sz="2800"/>
+          </a:p>
+          <a:p>
+            <a:pPr marL="285750" indent="-285750">
+              <a:buFont typeface="Arial" panose="020B0604020202020204" pitchFamily="34" charset="0"/>
+              <a:buChar char="•"/>
+            </a:pPr>
+            <a:r>
+              <a:rPr lang="zh-CN" altLang="en-US" sz="2800"/>
+              <a:t>增加一个</a:t>
+            </a:r>
+            <a:r>
+              <a:rPr lang="en-US" altLang="zh-CN" sz="2800"/>
+              <a:t>Point</a:t>
+            </a:r>
+            <a:r>
+              <a:rPr lang="zh-CN" altLang="en-US" sz="2800"/>
+              <a:t>类；</a:t>
             </a:r>
             <a:endParaRPr lang="en-US" altLang="zh-CN" sz="2800"/>
           </a:p>
@@ -23974,7 +24001,7 @@
           <a:noFill/>
           <a:extLst>
             <a:ext uri="{909E8E84-426E-40dd-AFC4-6F175D3DCCD1}">
-              <a14:hiddenFill xmlns:a14="http://schemas.microsoft.com/office/drawing/2010/main" xmlns:p14="http://schemas.microsoft.com/office/powerpoint/2010/main" xmlns:a16="http://schemas.microsoft.com/office/drawing/2014/main" xmlns="">
+              <a14:hiddenFill xmlns="" xmlns:a16="http://schemas.microsoft.com/office/drawing/2014/main" xmlns:p14="http://schemas.microsoft.com/office/powerpoint/2010/main" xmlns:a14="http://schemas.microsoft.com/office/drawing/2010/main">
                 <a:solidFill>
                   <a:srgbClr val="FFFFFF"/>
                 </a:solidFill>
@@ -24098,7 +24125,7 @@
           <a:noFill/>
           <a:extLst>
             <a:ext uri="{909E8E84-426E-40dd-AFC4-6F175D3DCCD1}">
-              <a14:hiddenFill xmlns:a14="http://schemas.microsoft.com/office/drawing/2010/main" xmlns:p14="http://schemas.microsoft.com/office/powerpoint/2010/main" xmlns:a16="http://schemas.microsoft.com/office/drawing/2014/main" xmlns="">
+              <a14:hiddenFill xmlns="" xmlns:a16="http://schemas.microsoft.com/office/drawing/2014/main" xmlns:p14="http://schemas.microsoft.com/office/powerpoint/2010/main" xmlns:a14="http://schemas.microsoft.com/office/drawing/2010/main">
                 <a:solidFill>
                   <a:srgbClr val="FFFFFF"/>
                 </a:solidFill>
@@ -24445,7 +24472,7 @@
                   <a:spcPts val="600"/>
                 </a:spcAft>
               </a:pPr>
-              <a:t>2/16/2019</a:t>
+              <a:t>2/22/2019</a:t>
             </a:fld>
             <a:endParaRPr lang="en-US" dirty="0"/>
           </a:p>

</xml_diff>